<commit_message>
Updated document and presentation
Minor presentation updates to pneumatics and control
Re-added controls section to design report
</commit_message>
<xml_diff>
--- a/Documentation/Presentation/Design Presentation/Design Presentation.pptx
+++ b/Documentation/Presentation/Design Presentation/Design Presentation.pptx
@@ -203,7 +203,7 @@
           <a:noFill/>
           <a:extLst>
             <a:ext uri="{909E8E84-426E-40dd-AFC4-6F175D3DCCD1}">
-              <a14:hiddenFill xmlns:a14="http://schemas.microsoft.com/office/drawing/2010/main" xmlns="">
+              <a14:hiddenFill xmlns="" xmlns:a14="http://schemas.microsoft.com/office/drawing/2010/main">
                 <a:solidFill>
                   <a:srgbClr val="FFFFFF"/>
                 </a:solidFill>
@@ -262,7 +262,7 @@
             </a:ln>
             <a:extLst>
               <a:ext uri="{91240B29-F687-4f45-9708-019B960494DF}">
-                <a14:hiddenLine xmlns:a14="http://schemas.microsoft.com/office/drawing/2010/main" xmlns="" w="9525">
+                <a14:hiddenLine xmlns="" xmlns:a14="http://schemas.microsoft.com/office/drawing/2010/main" w="9525">
                   <a:solidFill>
                     <a:srgbClr val="000000"/>
                   </a:solidFill>
@@ -352,7 +352,7 @@
             </a:ln>
             <a:extLst>
               <a:ext uri="{91240B29-F687-4f45-9708-019B960494DF}">
-                <a14:hiddenLine xmlns:a14="http://schemas.microsoft.com/office/drawing/2010/main" xmlns="" w="9525">
+                <a14:hiddenLine xmlns="" xmlns:a14="http://schemas.microsoft.com/office/drawing/2010/main" w="9525">
                   <a:solidFill>
                     <a:srgbClr val="000000"/>
                   </a:solidFill>
@@ -442,7 +442,7 @@
             </a:ln>
             <a:extLst>
               <a:ext uri="{91240B29-F687-4f45-9708-019B960494DF}">
-                <a14:hiddenLine xmlns:a14="http://schemas.microsoft.com/office/drawing/2010/main" xmlns="" w="9525">
+                <a14:hiddenLine xmlns="" xmlns:a14="http://schemas.microsoft.com/office/drawing/2010/main" w="9525">
                   <a:solidFill>
                     <a:srgbClr val="000000"/>
                   </a:solidFill>
@@ -476,7 +476,7 @@
             </a:ln>
             <a:extLst>
               <a:ext uri="{91240B29-F687-4f45-9708-019B960494DF}">
-                <a14:hiddenLine xmlns:a14="http://schemas.microsoft.com/office/drawing/2010/main" xmlns="" w="9525">
+                <a14:hiddenLine xmlns="" xmlns:a14="http://schemas.microsoft.com/office/drawing/2010/main" w="9525">
                   <a:solidFill>
                     <a:srgbClr val="000000"/>
                   </a:solidFill>
@@ -566,7 +566,7 @@
             </a:ln>
             <a:extLst>
               <a:ext uri="{91240B29-F687-4f45-9708-019B960494DF}">
-                <a14:hiddenLine xmlns:a14="http://schemas.microsoft.com/office/drawing/2010/main" xmlns="" w="9525">
+                <a14:hiddenLine xmlns="" xmlns:a14="http://schemas.microsoft.com/office/drawing/2010/main" w="9525">
                   <a:solidFill>
                     <a:srgbClr val="000000"/>
                   </a:solidFill>
@@ -628,7 +628,7 @@
             </a:ln>
             <a:extLst>
               <a:ext uri="{91240B29-F687-4f45-9708-019B960494DF}">
-                <a14:hiddenLine xmlns:a14="http://schemas.microsoft.com/office/drawing/2010/main" xmlns="" w="9525">
+                <a14:hiddenLine xmlns="" xmlns:a14="http://schemas.microsoft.com/office/drawing/2010/main" w="9525">
                   <a:solidFill>
                     <a:srgbClr val="000000"/>
                   </a:solidFill>
@@ -690,7 +690,7 @@
             </a:ln>
             <a:extLst>
               <a:ext uri="{91240B29-F687-4f45-9708-019B960494DF}">
-                <a14:hiddenLine xmlns:a14="http://schemas.microsoft.com/office/drawing/2010/main" xmlns="" w="9525">
+                <a14:hiddenLine xmlns="" xmlns:a14="http://schemas.microsoft.com/office/drawing/2010/main" w="9525">
                   <a:solidFill>
                     <a:srgbClr val="000000"/>
                   </a:solidFill>
@@ -780,7 +780,7 @@
             </a:ln>
             <a:extLst>
               <a:ext uri="{91240B29-F687-4f45-9708-019B960494DF}">
-                <a14:hiddenLine xmlns:a14="http://schemas.microsoft.com/office/drawing/2010/main" xmlns="" w="9525">
+                <a14:hiddenLine xmlns="" xmlns:a14="http://schemas.microsoft.com/office/drawing/2010/main" w="9525">
                   <a:solidFill>
                     <a:srgbClr val="000000"/>
                   </a:solidFill>
@@ -842,7 +842,7 @@
             </a:ln>
             <a:extLst>
               <a:ext uri="{91240B29-F687-4f45-9708-019B960494DF}">
-                <a14:hiddenLine xmlns:a14="http://schemas.microsoft.com/office/drawing/2010/main" xmlns="" w="9525">
+                <a14:hiddenLine xmlns="" xmlns:a14="http://schemas.microsoft.com/office/drawing/2010/main" w="9525">
                   <a:solidFill>
                     <a:srgbClr val="000000"/>
                   </a:solidFill>
@@ -904,7 +904,7 @@
             </a:ln>
             <a:extLst>
               <a:ext uri="{91240B29-F687-4f45-9708-019B960494DF}">
-                <a14:hiddenLine xmlns:a14="http://schemas.microsoft.com/office/drawing/2010/main" xmlns="" w="9525">
+                <a14:hiddenLine xmlns="" xmlns:a14="http://schemas.microsoft.com/office/drawing/2010/main" w="9525">
                   <a:solidFill>
                     <a:srgbClr val="000000"/>
                   </a:solidFill>
@@ -994,7 +994,7 @@
             </a:ln>
             <a:extLst>
               <a:ext uri="{91240B29-F687-4f45-9708-019B960494DF}">
-                <a14:hiddenLine xmlns:a14="http://schemas.microsoft.com/office/drawing/2010/main" xmlns="" w="9525">
+                <a14:hiddenLine xmlns="" xmlns:a14="http://schemas.microsoft.com/office/drawing/2010/main" w="9525">
                   <a:solidFill>
                     <a:srgbClr val="000000"/>
                   </a:solidFill>
@@ -1084,7 +1084,7 @@
             </a:ln>
             <a:extLst>
               <a:ext uri="{91240B29-F687-4f45-9708-019B960494DF}">
-                <a14:hiddenLine xmlns:a14="http://schemas.microsoft.com/office/drawing/2010/main" xmlns="" w="9525">
+                <a14:hiddenLine xmlns="" xmlns:a14="http://schemas.microsoft.com/office/drawing/2010/main" w="9525">
                   <a:solidFill>
                     <a:srgbClr val="000000"/>
                   </a:solidFill>
@@ -1146,7 +1146,7 @@
             </a:ln>
             <a:extLst>
               <a:ext uri="{91240B29-F687-4f45-9708-019B960494DF}">
-                <a14:hiddenLine xmlns:a14="http://schemas.microsoft.com/office/drawing/2010/main" xmlns="" w="9525">
+                <a14:hiddenLine xmlns="" xmlns:a14="http://schemas.microsoft.com/office/drawing/2010/main" w="9525">
                   <a:solidFill>
                     <a:srgbClr val="000000"/>
                   </a:solidFill>
@@ -1256,7 +1256,7 @@
             </a:ln>
             <a:extLst>
               <a:ext uri="{91240B29-F687-4f45-9708-019B960494DF}">
-                <a14:hiddenLine xmlns:a14="http://schemas.microsoft.com/office/drawing/2010/main" xmlns="" w="9525">
+                <a14:hiddenLine xmlns="" xmlns:a14="http://schemas.microsoft.com/office/drawing/2010/main" w="9525">
                   <a:solidFill>
                     <a:srgbClr val="000000"/>
                   </a:solidFill>
@@ -1318,7 +1318,7 @@
             </a:ln>
             <a:extLst>
               <a:ext uri="{91240B29-F687-4f45-9708-019B960494DF}">
-                <a14:hiddenLine xmlns:a14="http://schemas.microsoft.com/office/drawing/2010/main" xmlns="" w="9525">
+                <a14:hiddenLine xmlns="" xmlns:a14="http://schemas.microsoft.com/office/drawing/2010/main" w="9525">
                   <a:solidFill>
                     <a:srgbClr val="000000"/>
                   </a:solidFill>
@@ -1408,7 +1408,7 @@
             </a:ln>
             <a:extLst>
               <a:ext uri="{91240B29-F687-4f45-9708-019B960494DF}">
-                <a14:hiddenLine xmlns:a14="http://schemas.microsoft.com/office/drawing/2010/main" xmlns="" w="9525">
+                <a14:hiddenLine xmlns="" xmlns:a14="http://schemas.microsoft.com/office/drawing/2010/main" w="9525">
                   <a:solidFill>
                     <a:srgbClr val="000000"/>
                   </a:solidFill>
@@ -1498,7 +1498,7 @@
             </a:ln>
             <a:extLst>
               <a:ext uri="{91240B29-F687-4f45-9708-019B960494DF}">
-                <a14:hiddenLine xmlns:a14="http://schemas.microsoft.com/office/drawing/2010/main" xmlns="" w="9525">
+                <a14:hiddenLine xmlns="" xmlns:a14="http://schemas.microsoft.com/office/drawing/2010/main" w="9525">
                   <a:solidFill>
                     <a:srgbClr val="000000"/>
                   </a:solidFill>
@@ -1560,7 +1560,7 @@
             </a:ln>
             <a:extLst>
               <a:ext uri="{91240B29-F687-4f45-9708-019B960494DF}">
-                <a14:hiddenLine xmlns:a14="http://schemas.microsoft.com/office/drawing/2010/main" xmlns="" w="9525">
+                <a14:hiddenLine xmlns="" xmlns:a14="http://schemas.microsoft.com/office/drawing/2010/main" w="9525">
                   <a:solidFill>
                     <a:srgbClr val="000000"/>
                   </a:solidFill>
@@ -1650,7 +1650,7 @@
             </a:ln>
             <a:extLst>
               <a:ext uri="{91240B29-F687-4f45-9708-019B960494DF}">
-                <a14:hiddenLine xmlns:a14="http://schemas.microsoft.com/office/drawing/2010/main" xmlns="" w="9525">
+                <a14:hiddenLine xmlns="" xmlns:a14="http://schemas.microsoft.com/office/drawing/2010/main" w="9525">
                   <a:solidFill>
                     <a:srgbClr val="000000"/>
                   </a:solidFill>
@@ -1740,7 +1740,7 @@
             </a:ln>
             <a:extLst>
               <a:ext uri="{91240B29-F687-4f45-9708-019B960494DF}">
-                <a14:hiddenLine xmlns:a14="http://schemas.microsoft.com/office/drawing/2010/main" xmlns="" w="9525">
+                <a14:hiddenLine xmlns="" xmlns:a14="http://schemas.microsoft.com/office/drawing/2010/main" w="9525">
                   <a:solidFill>
                     <a:srgbClr val="000000"/>
                   </a:solidFill>
@@ -1796,7 +1796,7 @@
             </a:ln>
             <a:extLst>
               <a:ext uri="{91240B29-F687-4f45-9708-019B960494DF}">
-                <a14:hiddenLine xmlns:a14="http://schemas.microsoft.com/office/drawing/2010/main" xmlns="" w="9525">
+                <a14:hiddenLine xmlns="" xmlns:a14="http://schemas.microsoft.com/office/drawing/2010/main" w="9525">
                   <a:solidFill>
                     <a:srgbClr val="000000"/>
                   </a:solidFill>
@@ -1886,7 +1886,7 @@
             </a:ln>
             <a:extLst>
               <a:ext uri="{91240B29-F687-4f45-9708-019B960494DF}">
-                <a14:hiddenLine xmlns:a14="http://schemas.microsoft.com/office/drawing/2010/main" xmlns="" w="9525">
+                <a14:hiddenLine xmlns="" xmlns:a14="http://schemas.microsoft.com/office/drawing/2010/main" w="9525">
                   <a:solidFill>
                     <a:srgbClr val="000000"/>
                   </a:solidFill>
@@ -1942,7 +1942,7 @@
             </a:ln>
             <a:extLst>
               <a:ext uri="{91240B29-F687-4f45-9708-019B960494DF}">
-                <a14:hiddenLine xmlns:a14="http://schemas.microsoft.com/office/drawing/2010/main" xmlns="" w="9525">
+                <a14:hiddenLine xmlns="" xmlns:a14="http://schemas.microsoft.com/office/drawing/2010/main" w="9525">
                   <a:solidFill>
                     <a:srgbClr val="000000"/>
                   </a:solidFill>
@@ -2032,7 +2032,7 @@
             </a:ln>
             <a:extLst>
               <a:ext uri="{91240B29-F687-4f45-9708-019B960494DF}">
-                <a14:hiddenLine xmlns:a14="http://schemas.microsoft.com/office/drawing/2010/main" xmlns="" w="9525">
+                <a14:hiddenLine xmlns="" xmlns:a14="http://schemas.microsoft.com/office/drawing/2010/main" w="9525">
                   <a:solidFill>
                     <a:srgbClr val="000000"/>
                   </a:solidFill>
@@ -2100,7 +2100,7 @@
             </a:ln>
             <a:extLst>
               <a:ext uri="{91240B29-F687-4f45-9708-019B960494DF}">
-                <a14:hiddenLine xmlns:a14="http://schemas.microsoft.com/office/drawing/2010/main" xmlns="" w="9525">
+                <a14:hiddenLine xmlns="" xmlns:a14="http://schemas.microsoft.com/office/drawing/2010/main" w="9525">
                   <a:solidFill>
                     <a:srgbClr val="000000"/>
                   </a:solidFill>
@@ -2190,7 +2190,7 @@
             </a:ln>
             <a:extLst>
               <a:ext uri="{91240B29-F687-4f45-9708-019B960494DF}">
-                <a14:hiddenLine xmlns:a14="http://schemas.microsoft.com/office/drawing/2010/main" xmlns="" w="9525">
+                <a14:hiddenLine xmlns="" xmlns:a14="http://schemas.microsoft.com/office/drawing/2010/main" w="9525">
                   <a:solidFill>
                     <a:srgbClr val="000000"/>
                   </a:solidFill>
@@ -2258,7 +2258,7 @@
             </a:ln>
             <a:extLst>
               <a:ext uri="{91240B29-F687-4f45-9708-019B960494DF}">
-                <a14:hiddenLine xmlns:a14="http://schemas.microsoft.com/office/drawing/2010/main" xmlns="" w="9525">
+                <a14:hiddenLine xmlns="" xmlns:a14="http://schemas.microsoft.com/office/drawing/2010/main" w="9525">
                   <a:solidFill>
                     <a:srgbClr val="000000"/>
                   </a:solidFill>
@@ -2348,7 +2348,7 @@
             </a:ln>
             <a:extLst>
               <a:ext uri="{91240B29-F687-4f45-9708-019B960494DF}">
-                <a14:hiddenLine xmlns:a14="http://schemas.microsoft.com/office/drawing/2010/main" xmlns="" w="9525">
+                <a14:hiddenLine xmlns="" xmlns:a14="http://schemas.microsoft.com/office/drawing/2010/main" w="9525">
                   <a:solidFill>
                     <a:srgbClr val="000000"/>
                   </a:solidFill>
@@ -2382,7 +2382,7 @@
             </a:ln>
             <a:extLst>
               <a:ext uri="{91240B29-F687-4f45-9708-019B960494DF}">
-                <a14:hiddenLine xmlns:a14="http://schemas.microsoft.com/office/drawing/2010/main" xmlns="" w="9525">
+                <a14:hiddenLine xmlns="" xmlns:a14="http://schemas.microsoft.com/office/drawing/2010/main" w="9525">
                   <a:solidFill>
                     <a:srgbClr val="000000"/>
                   </a:solidFill>
@@ -2472,7 +2472,7 @@
             </a:ln>
             <a:extLst>
               <a:ext uri="{91240B29-F687-4f45-9708-019B960494DF}">
-                <a14:hiddenLine xmlns:a14="http://schemas.microsoft.com/office/drawing/2010/main" xmlns="" w="9525">
+                <a14:hiddenLine xmlns="" xmlns:a14="http://schemas.microsoft.com/office/drawing/2010/main" w="9525">
                   <a:solidFill>
                     <a:srgbClr val="000000"/>
                   </a:solidFill>
@@ -2534,7 +2534,7 @@
             </a:ln>
             <a:extLst>
               <a:ext uri="{91240B29-F687-4f45-9708-019B960494DF}">
-                <a14:hiddenLine xmlns:a14="http://schemas.microsoft.com/office/drawing/2010/main" xmlns="" w="9525">
+                <a14:hiddenLine xmlns="" xmlns:a14="http://schemas.microsoft.com/office/drawing/2010/main" w="9525">
                   <a:solidFill>
                     <a:srgbClr val="000000"/>
                   </a:solidFill>
@@ -2596,7 +2596,7 @@
             </a:ln>
             <a:extLst>
               <a:ext uri="{91240B29-F687-4f45-9708-019B960494DF}">
-                <a14:hiddenLine xmlns:a14="http://schemas.microsoft.com/office/drawing/2010/main" xmlns="" w="9525">
+                <a14:hiddenLine xmlns="" xmlns:a14="http://schemas.microsoft.com/office/drawing/2010/main" w="9525">
                   <a:solidFill>
                     <a:srgbClr val="000000"/>
                   </a:solidFill>
@@ -2686,7 +2686,7 @@
             </a:ln>
             <a:extLst>
               <a:ext uri="{91240B29-F687-4f45-9708-019B960494DF}">
-                <a14:hiddenLine xmlns:a14="http://schemas.microsoft.com/office/drawing/2010/main" xmlns="" w="9525">
+                <a14:hiddenLine xmlns="" xmlns:a14="http://schemas.microsoft.com/office/drawing/2010/main" w="9525">
                   <a:solidFill>
                     <a:srgbClr val="000000"/>
                   </a:solidFill>
@@ -2754,7 +2754,7 @@
             </a:ln>
             <a:extLst>
               <a:ext uri="{91240B29-F687-4f45-9708-019B960494DF}">
-                <a14:hiddenLine xmlns:a14="http://schemas.microsoft.com/office/drawing/2010/main" xmlns="" w="9525">
+                <a14:hiddenLine xmlns="" xmlns:a14="http://schemas.microsoft.com/office/drawing/2010/main" w="9525">
                   <a:solidFill>
                     <a:srgbClr val="000000"/>
                   </a:solidFill>
@@ -2816,7 +2816,7 @@
             </a:ln>
             <a:extLst>
               <a:ext uri="{91240B29-F687-4f45-9708-019B960494DF}">
-                <a14:hiddenLine xmlns:a14="http://schemas.microsoft.com/office/drawing/2010/main" xmlns="" w="9525">
+                <a14:hiddenLine xmlns="" xmlns:a14="http://schemas.microsoft.com/office/drawing/2010/main" w="9525">
                   <a:solidFill>
                     <a:srgbClr val="000000"/>
                   </a:solidFill>
@@ -2906,7 +2906,7 @@
             </a:ln>
             <a:extLst>
               <a:ext uri="{91240B29-F687-4f45-9708-019B960494DF}">
-                <a14:hiddenLine xmlns:a14="http://schemas.microsoft.com/office/drawing/2010/main" xmlns="" w="9525">
+                <a14:hiddenLine xmlns="" xmlns:a14="http://schemas.microsoft.com/office/drawing/2010/main" w="9525">
                   <a:solidFill>
                     <a:srgbClr val="000000"/>
                   </a:solidFill>
@@ -2968,7 +2968,7 @@
             </a:ln>
             <a:extLst>
               <a:ext uri="{91240B29-F687-4f45-9708-019B960494DF}">
-                <a14:hiddenLine xmlns:a14="http://schemas.microsoft.com/office/drawing/2010/main" xmlns="" w="9525">
+                <a14:hiddenLine xmlns="" xmlns:a14="http://schemas.microsoft.com/office/drawing/2010/main" w="9525">
                   <a:solidFill>
                     <a:srgbClr val="000000"/>
                   </a:solidFill>
@@ -3058,7 +3058,7 @@
             </a:ln>
             <a:extLst>
               <a:ext uri="{91240B29-F687-4f45-9708-019B960494DF}">
-                <a14:hiddenLine xmlns:a14="http://schemas.microsoft.com/office/drawing/2010/main" xmlns="" w="9525">
+                <a14:hiddenLine xmlns="" xmlns:a14="http://schemas.microsoft.com/office/drawing/2010/main" w="9525">
                   <a:solidFill>
                     <a:srgbClr val="000000"/>
                   </a:solidFill>
@@ -3120,7 +3120,7 @@
             </a:ln>
             <a:extLst>
               <a:ext uri="{91240B29-F687-4f45-9708-019B960494DF}">
-                <a14:hiddenLine xmlns:a14="http://schemas.microsoft.com/office/drawing/2010/main" xmlns="" w="9525">
+                <a14:hiddenLine xmlns="" xmlns:a14="http://schemas.microsoft.com/office/drawing/2010/main" w="9525">
                   <a:solidFill>
                     <a:srgbClr val="000000"/>
                   </a:solidFill>
@@ -3210,7 +3210,7 @@
             </a:ln>
             <a:extLst>
               <a:ext uri="{91240B29-F687-4f45-9708-019B960494DF}">
-                <a14:hiddenLine xmlns:a14="http://schemas.microsoft.com/office/drawing/2010/main" xmlns="" w="9525">
+                <a14:hiddenLine xmlns="" xmlns:a14="http://schemas.microsoft.com/office/drawing/2010/main" w="9525">
                   <a:solidFill>
                     <a:srgbClr val="000000"/>
                   </a:solidFill>
@@ -3244,7 +3244,7 @@
             </a:ln>
             <a:extLst>
               <a:ext uri="{91240B29-F687-4f45-9708-019B960494DF}">
-                <a14:hiddenLine xmlns:a14="http://schemas.microsoft.com/office/drawing/2010/main" xmlns="" w="9525">
+                <a14:hiddenLine xmlns="" xmlns:a14="http://schemas.microsoft.com/office/drawing/2010/main" w="9525">
                   <a:solidFill>
                     <a:srgbClr val="000000"/>
                   </a:solidFill>
@@ -3309,7 +3309,7 @@
             </a:ln>
             <a:extLst>
               <a:ext uri="{91240B29-F687-4f45-9708-019B960494DF}">
-                <a14:hiddenLine xmlns:a14="http://schemas.microsoft.com/office/drawing/2010/main" xmlns="" w="9525">
+                <a14:hiddenLine xmlns="" xmlns:a14="http://schemas.microsoft.com/office/drawing/2010/main" w="9525">
                   <a:solidFill>
                     <a:srgbClr val="000000"/>
                   </a:solidFill>
@@ -3399,7 +3399,7 @@
             </a:ln>
             <a:extLst>
               <a:ext uri="{91240B29-F687-4f45-9708-019B960494DF}">
-                <a14:hiddenLine xmlns:a14="http://schemas.microsoft.com/office/drawing/2010/main" xmlns="" w="9525">
+                <a14:hiddenLine xmlns="" xmlns:a14="http://schemas.microsoft.com/office/drawing/2010/main" w="9525">
                   <a:solidFill>
                     <a:srgbClr val="000000"/>
                   </a:solidFill>
@@ -3461,7 +3461,7 @@
             </a:ln>
             <a:extLst>
               <a:ext uri="{91240B29-F687-4f45-9708-019B960494DF}">
-                <a14:hiddenLine xmlns:a14="http://schemas.microsoft.com/office/drawing/2010/main" xmlns="" w="9525">
+                <a14:hiddenLine xmlns="" xmlns:a14="http://schemas.microsoft.com/office/drawing/2010/main" w="9525">
                   <a:solidFill>
                     <a:srgbClr val="000000"/>
                   </a:solidFill>
@@ -3551,7 +3551,7 @@
             </a:ln>
             <a:extLst>
               <a:ext uri="{91240B29-F687-4f45-9708-019B960494DF}">
-                <a14:hiddenLine xmlns:a14="http://schemas.microsoft.com/office/drawing/2010/main" xmlns="" w="9525">
+                <a14:hiddenLine xmlns="" xmlns:a14="http://schemas.microsoft.com/office/drawing/2010/main" w="9525">
                   <a:solidFill>
                     <a:srgbClr val="000000"/>
                   </a:solidFill>
@@ -3641,7 +3641,7 @@
             </a:ln>
             <a:extLst>
               <a:ext uri="{91240B29-F687-4f45-9708-019B960494DF}">
-                <a14:hiddenLine xmlns:a14="http://schemas.microsoft.com/office/drawing/2010/main" xmlns="" w="9525">
+                <a14:hiddenLine xmlns="" xmlns:a14="http://schemas.microsoft.com/office/drawing/2010/main" w="9525">
                   <a:solidFill>
                     <a:srgbClr val="000000"/>
                   </a:solidFill>
@@ -3706,7 +3706,7 @@
             </a:ln>
             <a:extLst>
               <a:ext uri="{91240B29-F687-4f45-9708-019B960494DF}">
-                <a14:hiddenLine xmlns:a14="http://schemas.microsoft.com/office/drawing/2010/main" xmlns="" w="9525">
+                <a14:hiddenLine xmlns="" xmlns:a14="http://schemas.microsoft.com/office/drawing/2010/main" w="9525">
                   <a:solidFill>
                     <a:srgbClr val="000000"/>
                   </a:solidFill>
@@ -3768,7 +3768,7 @@
             </a:ln>
             <a:extLst>
               <a:ext uri="{91240B29-F687-4f45-9708-019B960494DF}">
-                <a14:hiddenLine xmlns:a14="http://schemas.microsoft.com/office/drawing/2010/main" xmlns="" w="9525">
+                <a14:hiddenLine xmlns="" xmlns:a14="http://schemas.microsoft.com/office/drawing/2010/main" w="9525">
                   <a:solidFill>
                     <a:srgbClr val="000000"/>
                   </a:solidFill>
@@ -3858,7 +3858,7 @@
             </a:ln>
             <a:extLst>
               <a:ext uri="{91240B29-F687-4f45-9708-019B960494DF}">
-                <a14:hiddenLine xmlns:a14="http://schemas.microsoft.com/office/drawing/2010/main" xmlns="" w="9525">
+                <a14:hiddenLine xmlns="" xmlns:a14="http://schemas.microsoft.com/office/drawing/2010/main" w="9525">
                   <a:solidFill>
                     <a:srgbClr val="000000"/>
                   </a:solidFill>
@@ -3948,7 +3948,7 @@
             </a:ln>
             <a:extLst>
               <a:ext uri="{91240B29-F687-4f45-9708-019B960494DF}">
-                <a14:hiddenLine xmlns:a14="http://schemas.microsoft.com/office/drawing/2010/main" xmlns="" w="9525">
+                <a14:hiddenLine xmlns="" xmlns:a14="http://schemas.microsoft.com/office/drawing/2010/main" w="9525">
                   <a:solidFill>
                     <a:srgbClr val="000000"/>
                   </a:solidFill>
@@ -4010,7 +4010,7 @@
             </a:ln>
             <a:extLst>
               <a:ext uri="{91240B29-F687-4f45-9708-019B960494DF}">
-                <a14:hiddenLine xmlns:a14="http://schemas.microsoft.com/office/drawing/2010/main" xmlns="" w="9525">
+                <a14:hiddenLine xmlns="" xmlns:a14="http://schemas.microsoft.com/office/drawing/2010/main" w="9525">
                   <a:solidFill>
                     <a:srgbClr val="000000"/>
                   </a:solidFill>
@@ -4130,7 +4130,7 @@
             </a:ln>
             <a:extLst>
               <a:ext uri="{91240B29-F687-4f45-9708-019B960494DF}">
-                <a14:hiddenLine xmlns:a14="http://schemas.microsoft.com/office/drawing/2010/main" xmlns="" w="9525">
+                <a14:hiddenLine xmlns="" xmlns:a14="http://schemas.microsoft.com/office/drawing/2010/main" w="9525">
                   <a:solidFill>
                     <a:srgbClr val="000000"/>
                   </a:solidFill>
@@ -4198,7 +4198,7 @@
             </a:ln>
             <a:extLst>
               <a:ext uri="{91240B29-F687-4f45-9708-019B960494DF}">
-                <a14:hiddenLine xmlns:a14="http://schemas.microsoft.com/office/drawing/2010/main" xmlns="" w="9525">
+                <a14:hiddenLine xmlns="" xmlns:a14="http://schemas.microsoft.com/office/drawing/2010/main" w="9525">
                   <a:solidFill>
                     <a:srgbClr val="000000"/>
                   </a:solidFill>
@@ -4288,7 +4288,7 @@
             </a:ln>
             <a:extLst>
               <a:ext uri="{91240B29-F687-4f45-9708-019B960494DF}">
-                <a14:hiddenLine xmlns:a14="http://schemas.microsoft.com/office/drawing/2010/main" xmlns="" w="9525">
+                <a14:hiddenLine xmlns="" xmlns:a14="http://schemas.microsoft.com/office/drawing/2010/main" w="9525">
                   <a:solidFill>
                     <a:srgbClr val="000000"/>
                   </a:solidFill>
@@ -4428,7 +4428,7 @@
           <a:p>
             <a:fld id="{48A87A34-81AB-432B-8DAE-1953F412C126}" type="datetimeFigureOut">
               <a:rPr lang="en-US" dirty="0"/>
-              <a:t>2/25/2015</a:t>
+              <a:t>2/26/2015</a:t>
             </a:fld>
             <a:endParaRPr lang="en-US" dirty="0"/>
           </a:p>
@@ -4690,7 +4690,7 @@
           <a:p>
             <a:fld id="{48A87A34-81AB-432B-8DAE-1953F412C126}" type="datetimeFigureOut">
               <a:rPr lang="en-US" dirty="0"/>
-              <a:t>2/25/2015</a:t>
+              <a:t>2/26/2015</a:t>
             </a:fld>
             <a:endParaRPr lang="en-US" dirty="0"/>
           </a:p>
@@ -4881,7 +4881,7 @@
           <a:p>
             <a:fld id="{48A87A34-81AB-432B-8DAE-1953F412C126}" type="datetimeFigureOut">
               <a:rPr lang="en-US" dirty="0"/>
-              <a:t>2/25/2015</a:t>
+              <a:t>2/26/2015</a:t>
             </a:fld>
             <a:endParaRPr lang="en-US" dirty="0"/>
           </a:p>
@@ -5139,7 +5139,7 @@
           <a:p>
             <a:fld id="{48A87A34-81AB-432B-8DAE-1953F412C126}" type="datetimeFigureOut">
               <a:rPr lang="en-US" dirty="0"/>
-              <a:t>2/25/2015</a:t>
+              <a:t>2/26/2015</a:t>
             </a:fld>
             <a:endParaRPr lang="en-US" dirty="0"/>
           </a:p>
@@ -5568,7 +5568,7 @@
           <a:p>
             <a:fld id="{48A87A34-81AB-432B-8DAE-1953F412C126}" type="datetimeFigureOut">
               <a:rPr lang="en-US" dirty="0"/>
-              <a:t>2/25/2015</a:t>
+              <a:t>2/26/2015</a:t>
             </a:fld>
             <a:endParaRPr lang="en-US" dirty="0"/>
           </a:p>
@@ -6109,7 +6109,7 @@
           <a:p>
             <a:fld id="{48A87A34-81AB-432B-8DAE-1953F412C126}" type="datetimeFigureOut">
               <a:rPr lang="en-US" dirty="0"/>
-              <a:t>2/25/2015</a:t>
+              <a:t>2/26/2015</a:t>
             </a:fld>
             <a:endParaRPr lang="en-US" dirty="0"/>
           </a:p>
@@ -6824,7 +6824,7 @@
           <a:p>
             <a:fld id="{48A87A34-81AB-432B-8DAE-1953F412C126}" type="datetimeFigureOut">
               <a:rPr lang="en-US" dirty="0"/>
-              <a:t>2/25/2015</a:t>
+              <a:t>2/26/2015</a:t>
             </a:fld>
             <a:endParaRPr lang="en-US" dirty="0"/>
           </a:p>
@@ -6989,7 +6989,7 @@
           <a:p>
             <a:fld id="{48A87A34-81AB-432B-8DAE-1953F412C126}" type="datetimeFigureOut">
               <a:rPr lang="en-US" dirty="0"/>
-              <a:t>2/25/2015</a:t>
+              <a:t>2/26/2015</a:t>
             </a:fld>
             <a:endParaRPr lang="en-US" dirty="0"/>
           </a:p>
@@ -7164,7 +7164,7 @@
           <a:p>
             <a:fld id="{48A87A34-81AB-432B-8DAE-1953F412C126}" type="datetimeFigureOut">
               <a:rPr lang="en-US" dirty="0"/>
-              <a:t>2/25/2015</a:t>
+              <a:t>2/26/2015</a:t>
             </a:fld>
             <a:endParaRPr lang="en-US" dirty="0"/>
           </a:p>
@@ -7329,7 +7329,7 @@
           <a:p>
             <a:fld id="{48A87A34-81AB-432B-8DAE-1953F412C126}" type="datetimeFigureOut">
               <a:rPr lang="en-US" dirty="0"/>
-              <a:t>2/25/2015</a:t>
+              <a:t>2/26/2015</a:t>
             </a:fld>
             <a:endParaRPr lang="en-US" dirty="0"/>
           </a:p>
@@ -7574,7 +7574,7 @@
           <a:p>
             <a:fld id="{48A87A34-81AB-432B-8DAE-1953F412C126}" type="datetimeFigureOut">
               <a:rPr lang="en-US" dirty="0"/>
-              <a:t>2/25/2015</a:t>
+              <a:t>2/26/2015</a:t>
             </a:fld>
             <a:endParaRPr lang="en-US" dirty="0"/>
           </a:p>
@@ -7801,7 +7801,7 @@
           <a:p>
             <a:fld id="{48A87A34-81AB-432B-8DAE-1953F412C126}" type="datetimeFigureOut">
               <a:rPr lang="en-US" dirty="0"/>
-              <a:t>2/25/2015</a:t>
+              <a:t>2/26/2015</a:t>
             </a:fld>
             <a:endParaRPr lang="en-US" dirty="0"/>
           </a:p>
@@ -8177,7 +8177,7 @@
           <a:p>
             <a:fld id="{48A87A34-81AB-432B-8DAE-1953F412C126}" type="datetimeFigureOut">
               <a:rPr lang="en-US" dirty="0"/>
-              <a:t>2/25/2015</a:t>
+              <a:t>2/26/2015</a:t>
             </a:fld>
             <a:endParaRPr lang="en-US" dirty="0"/>
           </a:p>
@@ -8290,7 +8290,7 @@
           <a:p>
             <a:fld id="{48A87A34-81AB-432B-8DAE-1953F412C126}" type="datetimeFigureOut">
               <a:rPr lang="en-US" dirty="0"/>
-              <a:t>2/25/2015</a:t>
+              <a:t>2/26/2015</a:t>
             </a:fld>
             <a:endParaRPr lang="en-US" dirty="0"/>
           </a:p>
@@ -8380,7 +8380,7 @@
           <a:p>
             <a:fld id="{48A87A34-81AB-432B-8DAE-1953F412C126}" type="datetimeFigureOut">
               <a:rPr lang="en-US" dirty="0"/>
-              <a:t>2/25/2015</a:t>
+              <a:t>2/26/2015</a:t>
             </a:fld>
             <a:endParaRPr lang="en-US" dirty="0"/>
           </a:p>
@@ -8624,7 +8624,7 @@
           <a:p>
             <a:fld id="{48A87A34-81AB-432B-8DAE-1953F412C126}" type="datetimeFigureOut">
               <a:rPr lang="en-US" dirty="0"/>
-              <a:t>2/25/2015</a:t>
+              <a:t>2/26/2015</a:t>
             </a:fld>
             <a:endParaRPr lang="en-US" dirty="0"/>
           </a:p>
@@ -8899,7 +8899,7 @@
           <a:p>
             <a:fld id="{48A87A34-81AB-432B-8DAE-1953F412C126}" type="datetimeFigureOut">
               <a:rPr lang="en-US" dirty="0"/>
-              <a:t>2/25/2015</a:t>
+              <a:t>2/26/2015</a:t>
             </a:fld>
             <a:endParaRPr lang="en-US" dirty="0"/>
           </a:p>
@@ -9017,7 +9017,7 @@
           <a:noFill/>
           <a:extLst>
             <a:ext uri="{909E8E84-426E-40dd-AFC4-6F175D3DCCD1}">
-              <a14:hiddenFill xmlns:a14="http://schemas.microsoft.com/office/drawing/2010/main" xmlns="">
+              <a14:hiddenFill xmlns="" xmlns:a14="http://schemas.microsoft.com/office/drawing/2010/main">
                 <a:solidFill>
                   <a:srgbClr val="FFFFFF"/>
                 </a:solidFill>
@@ -9091,7 +9091,7 @@
               </a:ln>
               <a:extLst>
                 <a:ext uri="{91240B29-F687-4f45-9708-019B960494DF}">
-                  <a14:hiddenLine xmlns:a14="http://schemas.microsoft.com/office/drawing/2010/main" xmlns="" w="9525">
+                  <a14:hiddenLine xmlns="" xmlns:a14="http://schemas.microsoft.com/office/drawing/2010/main" w="9525">
                     <a:solidFill>
                       <a:srgbClr val="000000"/>
                     </a:solidFill>
@@ -9181,7 +9181,7 @@
               </a:ln>
               <a:extLst>
                 <a:ext uri="{91240B29-F687-4f45-9708-019B960494DF}">
-                  <a14:hiddenLine xmlns:a14="http://schemas.microsoft.com/office/drawing/2010/main" xmlns="" w="9525">
+                  <a14:hiddenLine xmlns="" xmlns:a14="http://schemas.microsoft.com/office/drawing/2010/main" w="9525">
                     <a:solidFill>
                       <a:srgbClr val="000000"/>
                     </a:solidFill>
@@ -9271,7 +9271,7 @@
               </a:ln>
               <a:extLst>
                 <a:ext uri="{91240B29-F687-4f45-9708-019B960494DF}">
-                  <a14:hiddenLine xmlns:a14="http://schemas.microsoft.com/office/drawing/2010/main" xmlns="" w="9525">
+                  <a14:hiddenLine xmlns="" xmlns:a14="http://schemas.microsoft.com/office/drawing/2010/main" w="9525">
                     <a:solidFill>
                       <a:srgbClr val="000000"/>
                     </a:solidFill>
@@ -9333,7 +9333,7 @@
               </a:ln>
               <a:extLst>
                 <a:ext uri="{91240B29-F687-4f45-9708-019B960494DF}">
-                  <a14:hiddenLine xmlns:a14="http://schemas.microsoft.com/office/drawing/2010/main" xmlns="" w="9525">
+                  <a14:hiddenLine xmlns="" xmlns:a14="http://schemas.microsoft.com/office/drawing/2010/main" w="9525">
                     <a:solidFill>
                       <a:srgbClr val="000000"/>
                     </a:solidFill>
@@ -9423,7 +9423,7 @@
               </a:ln>
               <a:extLst>
                 <a:ext uri="{91240B29-F687-4f45-9708-019B960494DF}">
-                  <a14:hiddenLine xmlns:a14="http://schemas.microsoft.com/office/drawing/2010/main" xmlns="" w="9525">
+                  <a14:hiddenLine xmlns="" xmlns:a14="http://schemas.microsoft.com/office/drawing/2010/main" w="9525">
                     <a:solidFill>
                       <a:srgbClr val="000000"/>
                     </a:solidFill>
@@ -9485,7 +9485,7 @@
               </a:ln>
               <a:extLst>
                 <a:ext uri="{91240B29-F687-4f45-9708-019B960494DF}">
-                  <a14:hiddenLine xmlns:a14="http://schemas.microsoft.com/office/drawing/2010/main" xmlns="" w="9525">
+                  <a14:hiddenLine xmlns="" xmlns:a14="http://schemas.microsoft.com/office/drawing/2010/main" w="9525">
                     <a:solidFill>
                       <a:srgbClr val="000000"/>
                     </a:solidFill>
@@ -9547,7 +9547,7 @@
               </a:ln>
               <a:extLst>
                 <a:ext uri="{91240B29-F687-4f45-9708-019B960494DF}">
-                  <a14:hiddenLine xmlns:a14="http://schemas.microsoft.com/office/drawing/2010/main" xmlns="" w="9525">
+                  <a14:hiddenLine xmlns="" xmlns:a14="http://schemas.microsoft.com/office/drawing/2010/main" w="9525">
                     <a:solidFill>
                       <a:srgbClr val="000000"/>
                     </a:solidFill>
@@ -9637,7 +9637,7 @@
               </a:ln>
               <a:extLst>
                 <a:ext uri="{91240B29-F687-4f45-9708-019B960494DF}">
-                  <a14:hiddenLine xmlns:a14="http://schemas.microsoft.com/office/drawing/2010/main" xmlns="" w="9525">
+                  <a14:hiddenLine xmlns="" xmlns:a14="http://schemas.microsoft.com/office/drawing/2010/main" w="9525">
                     <a:solidFill>
                       <a:srgbClr val="000000"/>
                     </a:solidFill>
@@ -9727,7 +9727,7 @@
               </a:ln>
               <a:extLst>
                 <a:ext uri="{91240B29-F687-4f45-9708-019B960494DF}">
-                  <a14:hiddenLine xmlns:a14="http://schemas.microsoft.com/office/drawing/2010/main" xmlns="" w="9525">
+                  <a14:hiddenLine xmlns="" xmlns:a14="http://schemas.microsoft.com/office/drawing/2010/main" w="9525">
                     <a:solidFill>
                       <a:srgbClr val="000000"/>
                     </a:solidFill>
@@ -9789,7 +9789,7 @@
               </a:ln>
               <a:extLst>
                 <a:ext uri="{91240B29-F687-4f45-9708-019B960494DF}">
-                  <a14:hiddenLine xmlns:a14="http://schemas.microsoft.com/office/drawing/2010/main" xmlns="" w="9525">
+                  <a14:hiddenLine xmlns="" xmlns:a14="http://schemas.microsoft.com/office/drawing/2010/main" w="9525">
                     <a:solidFill>
                       <a:srgbClr val="000000"/>
                     </a:solidFill>
@@ -9899,7 +9899,7 @@
               </a:ln>
               <a:extLst>
                 <a:ext uri="{91240B29-F687-4f45-9708-019B960494DF}">
-                  <a14:hiddenLine xmlns:a14="http://schemas.microsoft.com/office/drawing/2010/main" xmlns="" w="9525">
+                  <a14:hiddenLine xmlns="" xmlns:a14="http://schemas.microsoft.com/office/drawing/2010/main" w="9525">
                     <a:solidFill>
                       <a:srgbClr val="000000"/>
                     </a:solidFill>
@@ -9983,7 +9983,7 @@
               </a:ln>
               <a:extLst>
                 <a:ext uri="{91240B29-F687-4f45-9708-019B960494DF}">
-                  <a14:hiddenLine xmlns:a14="http://schemas.microsoft.com/office/drawing/2010/main" xmlns="" w="9525">
+                  <a14:hiddenLine xmlns="" xmlns:a14="http://schemas.microsoft.com/office/drawing/2010/main" w="9525">
                     <a:solidFill>
                       <a:srgbClr val="000000"/>
                     </a:solidFill>
@@ -10045,7 +10045,7 @@
               </a:ln>
               <a:extLst>
                 <a:ext uri="{91240B29-F687-4f45-9708-019B960494DF}">
-                  <a14:hiddenLine xmlns:a14="http://schemas.microsoft.com/office/drawing/2010/main" xmlns="" w="9525">
+                  <a14:hiddenLine xmlns="" xmlns:a14="http://schemas.microsoft.com/office/drawing/2010/main" w="9525">
                     <a:solidFill>
                       <a:srgbClr val="000000"/>
                     </a:solidFill>
@@ -10107,7 +10107,7 @@
               </a:ln>
               <a:extLst>
                 <a:ext uri="{91240B29-F687-4f45-9708-019B960494DF}">
-                  <a14:hiddenLine xmlns:a14="http://schemas.microsoft.com/office/drawing/2010/main" xmlns="" w="9525">
+                  <a14:hiddenLine xmlns="" xmlns:a14="http://schemas.microsoft.com/office/drawing/2010/main" w="9525">
                     <a:solidFill>
                       <a:srgbClr val="000000"/>
                     </a:solidFill>
@@ -10197,7 +10197,7 @@
               </a:ln>
               <a:extLst>
                 <a:ext uri="{91240B29-F687-4f45-9708-019B960494DF}">
-                  <a14:hiddenLine xmlns:a14="http://schemas.microsoft.com/office/drawing/2010/main" xmlns="" w="9525">
+                  <a14:hiddenLine xmlns="" xmlns:a14="http://schemas.microsoft.com/office/drawing/2010/main" w="9525">
                     <a:solidFill>
                       <a:srgbClr val="000000"/>
                     </a:solidFill>
@@ -10231,7 +10231,7 @@
               </a:ln>
               <a:extLst>
                 <a:ext uri="{91240B29-F687-4f45-9708-019B960494DF}">
-                  <a14:hiddenLine xmlns:a14="http://schemas.microsoft.com/office/drawing/2010/main" xmlns="" w="9525">
+                  <a14:hiddenLine xmlns="" xmlns:a14="http://schemas.microsoft.com/office/drawing/2010/main" w="9525">
                     <a:solidFill>
                       <a:srgbClr val="000000"/>
                     </a:solidFill>
@@ -10296,7 +10296,7 @@
               </a:ln>
               <a:extLst>
                 <a:ext uri="{91240B29-F687-4f45-9708-019B960494DF}">
-                  <a14:hiddenLine xmlns:a14="http://schemas.microsoft.com/office/drawing/2010/main" xmlns="" w="9525">
+                  <a14:hiddenLine xmlns="" xmlns:a14="http://schemas.microsoft.com/office/drawing/2010/main" w="9525">
                     <a:solidFill>
                       <a:srgbClr val="000000"/>
                     </a:solidFill>
@@ -10386,7 +10386,7 @@
               </a:ln>
               <a:extLst>
                 <a:ext uri="{91240B29-F687-4f45-9708-019B960494DF}">
-                  <a14:hiddenLine xmlns:a14="http://schemas.microsoft.com/office/drawing/2010/main" xmlns="" w="9525">
+                  <a14:hiddenLine xmlns="" xmlns:a14="http://schemas.microsoft.com/office/drawing/2010/main" w="9525">
                     <a:solidFill>
                       <a:srgbClr val="000000"/>
                     </a:solidFill>
@@ -10448,7 +10448,7 @@
               </a:ln>
               <a:extLst>
                 <a:ext uri="{91240B29-F687-4f45-9708-019B960494DF}">
-                  <a14:hiddenLine xmlns:a14="http://schemas.microsoft.com/office/drawing/2010/main" xmlns="" w="9525">
+                  <a14:hiddenLine xmlns="" xmlns:a14="http://schemas.microsoft.com/office/drawing/2010/main" w="9525">
                     <a:solidFill>
                       <a:srgbClr val="000000"/>
                     </a:solidFill>
@@ -10538,7 +10538,7 @@
               </a:ln>
               <a:extLst>
                 <a:ext uri="{91240B29-F687-4f45-9708-019B960494DF}">
-                  <a14:hiddenLine xmlns:a14="http://schemas.microsoft.com/office/drawing/2010/main" xmlns="" w="9525">
+                  <a14:hiddenLine xmlns="" xmlns:a14="http://schemas.microsoft.com/office/drawing/2010/main" w="9525">
                     <a:solidFill>
                       <a:srgbClr val="000000"/>
                     </a:solidFill>
@@ -10603,7 +10603,7 @@
               </a:ln>
               <a:extLst>
                 <a:ext uri="{91240B29-F687-4f45-9708-019B960494DF}">
-                  <a14:hiddenLine xmlns:a14="http://schemas.microsoft.com/office/drawing/2010/main" xmlns="" w="9525">
+                  <a14:hiddenLine xmlns="" xmlns:a14="http://schemas.microsoft.com/office/drawing/2010/main" w="9525">
                     <a:solidFill>
                       <a:srgbClr val="000000"/>
                     </a:solidFill>
@@ -10665,7 +10665,7 @@
               </a:ln>
               <a:extLst>
                 <a:ext uri="{91240B29-F687-4f45-9708-019B960494DF}">
-                  <a14:hiddenLine xmlns:a14="http://schemas.microsoft.com/office/drawing/2010/main" xmlns="" w="9525">
+                  <a14:hiddenLine xmlns="" xmlns:a14="http://schemas.microsoft.com/office/drawing/2010/main" w="9525">
                     <a:solidFill>
                       <a:srgbClr val="000000"/>
                     </a:solidFill>
@@ -10755,7 +10755,7 @@
               </a:ln>
               <a:extLst>
                 <a:ext uri="{91240B29-F687-4f45-9708-019B960494DF}">
-                  <a14:hiddenLine xmlns:a14="http://schemas.microsoft.com/office/drawing/2010/main" xmlns="" w="9525">
+                  <a14:hiddenLine xmlns="" xmlns:a14="http://schemas.microsoft.com/office/drawing/2010/main" w="9525">
                     <a:solidFill>
                       <a:srgbClr val="000000"/>
                     </a:solidFill>
@@ -10845,7 +10845,7 @@
               </a:ln>
               <a:extLst>
                 <a:ext uri="{91240B29-F687-4f45-9708-019B960494DF}">
-                  <a14:hiddenLine xmlns:a14="http://schemas.microsoft.com/office/drawing/2010/main" xmlns="" w="9525">
+                  <a14:hiddenLine xmlns="" xmlns:a14="http://schemas.microsoft.com/office/drawing/2010/main" w="9525">
                     <a:solidFill>
                       <a:srgbClr val="000000"/>
                     </a:solidFill>
@@ -10910,7 +10910,7 @@
               </a:ln>
               <a:extLst>
                 <a:ext uri="{91240B29-F687-4f45-9708-019B960494DF}">
-                  <a14:hiddenLine xmlns:a14="http://schemas.microsoft.com/office/drawing/2010/main" xmlns="" w="9525">
+                  <a14:hiddenLine xmlns="" xmlns:a14="http://schemas.microsoft.com/office/drawing/2010/main" w="9525">
                     <a:solidFill>
                       <a:srgbClr val="000000"/>
                     </a:solidFill>
@@ -11030,7 +11030,7 @@
               </a:ln>
               <a:extLst>
                 <a:ext uri="{91240B29-F687-4f45-9708-019B960494DF}">
-                  <a14:hiddenLine xmlns:a14="http://schemas.microsoft.com/office/drawing/2010/main" xmlns="" w="9525">
+                  <a14:hiddenLine xmlns="" xmlns:a14="http://schemas.microsoft.com/office/drawing/2010/main" w="9525">
                     <a:solidFill>
                       <a:srgbClr val="000000"/>
                     </a:solidFill>
@@ -11111,7 +11111,7 @@
               </a:ln>
               <a:extLst>
                 <a:ext uri="{91240B29-F687-4f45-9708-019B960494DF}">
-                  <a14:hiddenLine xmlns:a14="http://schemas.microsoft.com/office/drawing/2010/main" xmlns="" w="9525">
+                  <a14:hiddenLine xmlns="" xmlns:a14="http://schemas.microsoft.com/office/drawing/2010/main" w="9525">
                     <a:solidFill>
                       <a:srgbClr val="000000"/>
                     </a:solidFill>
@@ -11226,7 +11226,7 @@
               </a:ln>
               <a:extLst>
                 <a:ext uri="{91240B29-F687-4f45-9708-019B960494DF}">
-                  <a14:hiddenLine xmlns:a14="http://schemas.microsoft.com/office/drawing/2010/main" xmlns="" w="9525">
+                  <a14:hiddenLine xmlns="" xmlns:a14="http://schemas.microsoft.com/office/drawing/2010/main" w="9525">
                     <a:solidFill>
                       <a:srgbClr val="000000"/>
                     </a:solidFill>
@@ -11316,7 +11316,7 @@
               </a:ln>
               <a:extLst>
                 <a:ext uri="{91240B29-F687-4f45-9708-019B960494DF}">
-                  <a14:hiddenLine xmlns:a14="http://schemas.microsoft.com/office/drawing/2010/main" xmlns="" w="9525">
+                  <a14:hiddenLine xmlns="" xmlns:a14="http://schemas.microsoft.com/office/drawing/2010/main" w="9525">
                     <a:solidFill>
                       <a:srgbClr val="000000"/>
                     </a:solidFill>
@@ -11381,7 +11381,7 @@
               </a:ln>
               <a:extLst>
                 <a:ext uri="{91240B29-F687-4f45-9708-019B960494DF}">
-                  <a14:hiddenLine xmlns:a14="http://schemas.microsoft.com/office/drawing/2010/main" xmlns="" w="9525">
+                  <a14:hiddenLine xmlns="" xmlns:a14="http://schemas.microsoft.com/office/drawing/2010/main" w="9525">
                     <a:solidFill>
                       <a:srgbClr val="000000"/>
                     </a:solidFill>
@@ -11471,7 +11471,7 @@
               </a:ln>
               <a:extLst>
                 <a:ext uri="{91240B29-F687-4f45-9708-019B960494DF}">
-                  <a14:hiddenLine xmlns:a14="http://schemas.microsoft.com/office/drawing/2010/main" xmlns="" w="9525">
+                  <a14:hiddenLine xmlns="" xmlns:a14="http://schemas.microsoft.com/office/drawing/2010/main" w="9525">
                     <a:solidFill>
                       <a:srgbClr val="000000"/>
                     </a:solidFill>
@@ -11539,7 +11539,7 @@
               </a:ln>
               <a:extLst>
                 <a:ext uri="{91240B29-F687-4f45-9708-019B960494DF}">
-                  <a14:hiddenLine xmlns:a14="http://schemas.microsoft.com/office/drawing/2010/main" xmlns="" w="9525">
+                  <a14:hiddenLine xmlns="" xmlns:a14="http://schemas.microsoft.com/office/drawing/2010/main" w="9525">
                     <a:solidFill>
                       <a:srgbClr val="000000"/>
                     </a:solidFill>
@@ -11629,7 +11629,7 @@
               </a:ln>
               <a:extLst>
                 <a:ext uri="{91240B29-F687-4f45-9708-019B960494DF}">
-                  <a14:hiddenLine xmlns:a14="http://schemas.microsoft.com/office/drawing/2010/main" xmlns="" w="9525">
+                  <a14:hiddenLine xmlns="" xmlns:a14="http://schemas.microsoft.com/office/drawing/2010/main" w="9525">
                     <a:solidFill>
                       <a:srgbClr val="000000"/>
                     </a:solidFill>
@@ -11697,7 +11697,7 @@
               </a:ln>
               <a:extLst>
                 <a:ext uri="{91240B29-F687-4f45-9708-019B960494DF}">
-                  <a14:hiddenLine xmlns:a14="http://schemas.microsoft.com/office/drawing/2010/main" xmlns="" w="9525">
+                  <a14:hiddenLine xmlns="" xmlns:a14="http://schemas.microsoft.com/office/drawing/2010/main" w="9525">
                     <a:solidFill>
                       <a:srgbClr val="000000"/>
                     </a:solidFill>
@@ -11787,7 +11787,7 @@
               </a:ln>
               <a:extLst>
                 <a:ext uri="{91240B29-F687-4f45-9708-019B960494DF}">
-                  <a14:hiddenLine xmlns:a14="http://schemas.microsoft.com/office/drawing/2010/main" xmlns="" w="9525">
+                  <a14:hiddenLine xmlns="" xmlns:a14="http://schemas.microsoft.com/office/drawing/2010/main" w="9525">
                     <a:solidFill>
                       <a:srgbClr val="000000"/>
                     </a:solidFill>
@@ -11821,7 +11821,7 @@
               </a:ln>
               <a:extLst>
                 <a:ext uri="{91240B29-F687-4f45-9708-019B960494DF}">
-                  <a14:hiddenLine xmlns:a14="http://schemas.microsoft.com/office/drawing/2010/main" xmlns="" w="9525">
+                  <a14:hiddenLine xmlns="" xmlns:a14="http://schemas.microsoft.com/office/drawing/2010/main" w="9525">
                     <a:solidFill>
                       <a:srgbClr val="000000"/>
                     </a:solidFill>
@@ -11962,7 +11962,7 @@
             <a:fld id="{48A87A34-81AB-432B-8DAE-1953F412C126}" type="datetimeFigureOut">
               <a:rPr lang="en-US" dirty="0"/>
               <a:pPr/>
-              <a:t>2/25/2015</a:t>
+              <a:t>2/26/2015</a:t>
             </a:fld>
             <a:endParaRPr lang="en-US" dirty="0"/>
           </a:p>
@@ -17236,8 +17236,8 @@
           </a:p>
         </p:txBody>
       </p:sp>
-      <mc:AlternateContent xmlns:mc="http://schemas.openxmlformats.org/markup-compatibility/2006" xmlns:a14="http://schemas.microsoft.com/office/drawing/2010/main">
-        <mc:Choice Requires="a14">
+      <mc:AlternateContent xmlns:mc="http://schemas.openxmlformats.org/markup-compatibility/2006">
+        <mc:Choice xmlns:a14="http://schemas.microsoft.com/office/drawing/2010/main" Requires="a14">
           <p:sp>
             <p:nvSpPr>
               <p:cNvPr id="3" name="Content Placeholder 2"/>
@@ -17262,8 +17262,13 @@
               <a:p>
                 <a:r>
                   <a:rPr lang="en-US" dirty="0" smtClean="0"/>
-                  <a:t>Calculated using impulse and conservation of momentum on foot</a:t>
+                  <a:t>Calculated using impulse and conservation of momentum on </a:t>
                 </a:r>
+                <a:r>
+                  <a:rPr lang="en-US" dirty="0" smtClean="0"/>
+                  <a:t>leg</a:t>
+                </a:r>
+                <a:endParaRPr lang="en-US" dirty="0" smtClean="0"/>
               </a:p>
               <a:p>
                 <a:pPr lvl="1"/>
@@ -17276,7 +17281,19 @@
                 <a:pPr lvl="1"/>
                 <a:r>
                   <a:rPr lang="en-US" dirty="0" smtClean="0"/>
-                  <a:t>Assuming other leg forces are same as the swing phase</a:t>
+                  <a:t>Assuming other leg forces are </a:t>
+                </a:r>
+                <a:r>
+                  <a:rPr lang="en-US" dirty="0" smtClean="0"/>
+                  <a:t>unchanged from the </a:t>
+                </a:r>
+                <a:r>
+                  <a:rPr lang="en-US" dirty="0" smtClean="0"/>
+                  <a:t>swing </a:t>
+                </a:r>
+                <a:r>
+                  <a:rPr lang="en-US" dirty="0" smtClean="0"/>
+                  <a:t>phase</a:t>
                 </a:r>
               </a:p>
               <a:p>
@@ -17557,7 +17574,7 @@
             </p:txBody>
           </p:sp>
         </mc:Choice>
-        <mc:Fallback xmlns="">
+        <mc:Fallback>
           <p:sp>
             <p:nvSpPr>
               <p:cNvPr id="3" name="Content Placeholder 2"/>
@@ -17576,7 +17593,7 @@
               <a:blipFill rotWithShape="0">
                 <a:blip r:embed="rId2"/>
                 <a:stretch>
-                  <a:fillRect l="-2086" t="-1893" r="-1472"/>
+                  <a:fillRect l="-2086" t="-1893"/>
                 </a:stretch>
               </a:blipFill>
             </p:spPr>
@@ -18385,7 +18402,44 @@
           <a:bodyPr/>
           <a:lstStyle/>
           <a:p>
-            <a:endParaRPr lang="en-US"/>
+            <a:r>
+              <a:rPr lang="en-US" dirty="0" smtClean="0"/>
+              <a:t>Benefits of pneumatics over other power sources</a:t>
+            </a:r>
+          </a:p>
+          <a:p>
+            <a:r>
+              <a:rPr lang="en-US" dirty="0" smtClean="0"/>
+              <a:t>Component Specifications</a:t>
+            </a:r>
+          </a:p>
+          <a:p>
+            <a:pPr lvl="1"/>
+            <a:r>
+              <a:rPr lang="en-US" dirty="0" smtClean="0"/>
+              <a:t>Air Cylinders</a:t>
+            </a:r>
+          </a:p>
+          <a:p>
+            <a:pPr lvl="1"/>
+            <a:r>
+              <a:rPr lang="en-US" dirty="0" smtClean="0"/>
+              <a:t>Directional Control Valves</a:t>
+            </a:r>
+          </a:p>
+          <a:p>
+            <a:pPr lvl="1"/>
+            <a:r>
+              <a:rPr lang="en-US" dirty="0" smtClean="0"/>
+              <a:t>Air Compressors</a:t>
+            </a:r>
+          </a:p>
+          <a:p>
+            <a:r>
+              <a:rPr lang="en-US" dirty="0" smtClean="0"/>
+              <a:t>Other circuit components</a:t>
+            </a:r>
+            <a:endParaRPr lang="en-US" dirty="0"/>
           </a:p>
         </p:txBody>
       </p:sp>
@@ -19934,7 +19988,7 @@
         </p:nvSpPr>
         <p:spPr>
           <a:xfrm>
-            <a:off x="609600" y="274638"/>
+            <a:off x="609600" y="255141"/>
             <a:ext cx="10972800" cy="563562"/>
           </a:xfrm>
         </p:spPr>
@@ -19952,8 +20006,8 @@
           </a:p>
         </p:txBody>
       </p:sp>
-      <mc:AlternateContent xmlns:mc="http://schemas.openxmlformats.org/markup-compatibility/2006" xmlns:a14="http://schemas.microsoft.com/office/drawing/2010/main">
-        <mc:Choice Requires="a14">
+      <mc:AlternateContent xmlns:mc="http://schemas.openxmlformats.org/markup-compatibility/2006">
+        <mc:Choice xmlns:a14="http://schemas.microsoft.com/office/drawing/2010/main" Requires="a14">
           <p:sp>
             <p:nvSpPr>
               <p:cNvPr id="3" name="Content Placeholder 2"/>
@@ -19966,8 +20020,8 @@
             </p:nvSpPr>
             <p:spPr>
               <a:xfrm>
-                <a:off x="203200" y="1066800"/>
-                <a:ext cx="11887200" cy="5410200"/>
+                <a:off x="152400" y="1026452"/>
+                <a:ext cx="11887200" cy="5678785"/>
               </a:xfrm>
             </p:spPr>
             <p:txBody>
@@ -19980,51 +20034,16 @@
                   <a:buNone/>
                 </a:pPr>
                 <a:r>
-                  <a:rPr lang="en-US" sz="2000" dirty="0" smtClean="0"/>
-                  <a:t>Required force: 178 </a:t>
-                </a:r>
-                <a:r>
-                  <a:rPr lang="en-US" sz="2000" dirty="0" err="1" smtClean="0"/>
-                  <a:t>lbf</a:t>
-                </a:r>
-                <a:r>
-                  <a:rPr lang="en-US" sz="2000" dirty="0" smtClean="0"/>
-                  <a:t> 	Stroke length: 4 inch	Rod diameter: 0.5 inch</a:t>
-                </a:r>
-              </a:p>
-              <a:p>
-                <a:pPr marL="0" indent="0">
-                  <a:buNone/>
-                </a:pPr>
-                <a:r>
-                  <a:rPr lang="en-US" sz="2000" dirty="0" smtClean="0"/>
-                  <a:t>Bore diameter: 2 inches	Cycles: 60 per minute</a:t>
-                </a:r>
-              </a:p>
-              <a:p>
-                <a:pPr marL="0" indent="0">
-                  <a:buNone/>
-                </a:pPr>
-                <a:r>
-                  <a:rPr lang="en-US" sz="2200" dirty="0" smtClean="0"/>
-                  <a:t>	</a:t>
-                </a:r>
-              </a:p>
-              <a:p>
-                <a:pPr marL="0" indent="0">
-                  <a:buNone/>
-                </a:pPr>
-                <a:r>
                   <a:rPr lang="en-US" sz="2200" b="1" dirty="0" smtClean="0"/>
-                  <a:t>Extend phase:</a:t>
-                </a:r>
-                <a:r>
-                  <a:rPr lang="en-US" sz="2200" dirty="0" smtClean="0"/>
-                  <a:t>			</a:t>
+                  <a:t>Extend </a:t>
                 </a:r>
                 <a:r>
                   <a:rPr lang="en-US" sz="2200" b="1" dirty="0" smtClean="0"/>
-                  <a:t>Retract Phase:</a:t>
+                  <a:t>phase</a:t>
+                </a:r>
+                <a:r>
+                  <a:rPr lang="en-US" sz="2200" b="1" dirty="0" smtClean="0"/>
+                  <a:t>:</a:t>
                 </a:r>
               </a:p>
               <a:p>
@@ -20224,9 +20243,29 @@
                   <a:rPr lang="en-US" sz="1800" b="1" dirty="0" smtClean="0"/>
                   <a:t> </a:t>
                 </a:r>
+                <a:endParaRPr lang="en-US" sz="1800" b="1" dirty="0" smtClean="0"/>
+              </a:p>
+              <a:p>
+                <a:pPr marL="0" indent="0">
+                  <a:buNone/>
+                </a:pPr>
+                <a:r>
+                  <a:rPr lang="en-US" sz="2200" b="1" dirty="0"/>
+                  <a:t>Retract Phase</a:t>
+                </a:r>
                 <a:r>
                   <a:rPr lang="en-US" sz="2200" b="1" dirty="0" smtClean="0"/>
-                  <a:t>	 </a:t>
+                  <a:t>:</a:t>
+                </a:r>
+                <a:endParaRPr lang="en-US" sz="2200" b="1" dirty="0" smtClean="0"/>
+              </a:p>
+              <a:p>
+                <a:pPr marL="0" indent="0">
+                  <a:buNone/>
+                </a:pPr>
+                <a:r>
+                  <a:rPr lang="en-US" sz="2200" b="1" dirty="0" smtClean="0"/>
+                  <a:t> </a:t>
                 </a:r>
                 <a14:m>
                   <m:oMath xmlns:m="http://schemas.openxmlformats.org/officeDocument/2006/math">
@@ -20640,36 +20679,78 @@
                         </a:rPr>
                         <m:t>=</m:t>
                       </m:r>
-                      <m:d>
-                        <m:dPr>
+                      <m:f>
+                        <m:fPr>
                           <m:ctrlPr>
                             <a:rPr lang="en-US" sz="2000" b="0" i="1" smtClean="0">
                               <a:latin typeface="Cambria Math" panose="02040503050406030204" pitchFamily="18" charset="0"/>
                             </a:rPr>
                           </m:ctrlPr>
-                        </m:dPr>
-                        <m:e>
-                          <m:r>
-                            <a:rPr lang="en-US" sz="2000" i="1" smtClean="0">
-                              <a:latin typeface="Cambria Math"/>
-                            </a:rPr>
-                            <m:t>3</m:t>
-                          </m:r>
-                          <m:r>
-                            <a:rPr lang="en-US" sz="2000" b="0" i="1" smtClean="0">
-                              <a:latin typeface="Cambria Math"/>
-                            </a:rPr>
-                            <m:t>.1416 </m:t>
-                          </m:r>
-                          <m:sSup>
-                            <m:sSupPr>
+                        </m:fPr>
+                        <m:num>
+                          <m:d>
+                            <m:dPr>
                               <m:ctrlPr>
                                 <a:rPr lang="en-US" sz="2000" b="0" i="1" smtClean="0">
                                   <a:latin typeface="Cambria Math" panose="02040503050406030204" pitchFamily="18" charset="0"/>
                                 </a:rPr>
                               </m:ctrlPr>
-                            </m:sSupPr>
+                            </m:dPr>
                             <m:e>
+                              <m:r>
+                                <a:rPr lang="en-US" sz="2000" i="1" smtClean="0">
+                                  <a:latin typeface="Cambria Math"/>
+                                </a:rPr>
+                                <m:t>3</m:t>
+                              </m:r>
+                              <m:r>
+                                <a:rPr lang="en-US" sz="2000" b="0" i="1" smtClean="0">
+                                  <a:latin typeface="Cambria Math"/>
+                                </a:rPr>
+                                <m:t>.1416 </m:t>
+                              </m:r>
+                              <m:sSup>
+                                <m:sSupPr>
+                                  <m:ctrlPr>
+                                    <a:rPr lang="en-US" sz="2000" b="0" i="1" smtClean="0">
+                                      <a:latin typeface="Cambria Math" panose="02040503050406030204" pitchFamily="18" charset="0"/>
+                                    </a:rPr>
+                                  </m:ctrlPr>
+                                </m:sSupPr>
+                                <m:e>
+                                  <m:r>
+                                    <a:rPr lang="en-US" sz="2000" b="0" i="1" smtClean="0">
+                                      <a:latin typeface="Cambria Math"/>
+                                    </a:rPr>
+                                    <m:t>𝑖𝑛</m:t>
+                                  </m:r>
+                                </m:e>
+                                <m:sup>
+                                  <m:r>
+                                    <a:rPr lang="en-US" sz="2000" b="0" i="1" smtClean="0">
+                                      <a:latin typeface="Cambria Math"/>
+                                    </a:rPr>
+                                    <m:t>2</m:t>
+                                  </m:r>
+                                </m:sup>
+                              </m:sSup>
+                            </m:e>
+                          </m:d>
+                          <m:d>
+                            <m:dPr>
+                              <m:ctrlPr>
+                                <a:rPr lang="en-US" sz="2000" b="0" i="1" smtClean="0">
+                                  <a:latin typeface="Cambria Math" panose="02040503050406030204" pitchFamily="18" charset="0"/>
+                                </a:rPr>
+                              </m:ctrlPr>
+                            </m:dPr>
+                            <m:e>
+                              <m:r>
+                                <a:rPr lang="en-US" sz="2000" b="0" i="1" smtClean="0">
+                                  <a:latin typeface="Cambria Math"/>
+                                </a:rPr>
+                                <m:t>8 </m:t>
+                              </m:r>
                               <m:r>
                                 <a:rPr lang="en-US" sz="2000" b="0" i="1" smtClean="0">
                                   <a:latin typeface="Cambria Math"/>
@@ -20677,117 +20758,180 @@
                                 <m:t>𝑖𝑛</m:t>
                               </m:r>
                             </m:e>
-                            <m:sup>
-                              <m:r>
-                                <a:rPr lang="en-US" sz="2000" b="0" i="1" smtClean="0">
-                                  <a:latin typeface="Cambria Math"/>
-                                </a:rPr>
-                                <m:t>2</m:t>
-                              </m:r>
-                            </m:sup>
-                          </m:sSup>
-                        </m:e>
-                      </m:d>
-                      <m:d>
-                        <m:dPr>
-                          <m:ctrlPr>
-                            <a:rPr lang="en-US" sz="2000" b="0" i="1" smtClean="0">
-                              <a:latin typeface="Cambria Math" panose="02040503050406030204" pitchFamily="18" charset="0"/>
-                            </a:rPr>
-                          </m:ctrlPr>
-                        </m:dPr>
-                        <m:e>
-                          <m:r>
-                            <a:rPr lang="en-US" sz="2000" b="0" i="1" smtClean="0">
-                              <a:latin typeface="Cambria Math"/>
-                            </a:rPr>
-                            <m:t>8 </m:t>
-                          </m:r>
-                          <m:r>
-                            <a:rPr lang="en-US" sz="2000" b="0" i="1" smtClean="0">
-                              <a:latin typeface="Cambria Math"/>
-                            </a:rPr>
-                            <m:t>𝑖𝑛</m:t>
-                          </m:r>
-                        </m:e>
-                      </m:d>
-                      <m:d>
-                        <m:dPr>
-                          <m:ctrlPr>
-                            <a:rPr lang="en-US" sz="2000" b="0" i="1" smtClean="0">
-                              <a:latin typeface="Cambria Math" panose="02040503050406030204" pitchFamily="18" charset="0"/>
-                            </a:rPr>
-                          </m:ctrlPr>
-                        </m:dPr>
-                        <m:e>
-                          <m:r>
-                            <a:rPr lang="en-US" sz="2000" b="0" i="1" smtClean="0">
-                              <a:latin typeface="Cambria Math"/>
-                            </a:rPr>
-                            <m:t>60</m:t>
-                          </m:r>
-                        </m:e>
-                      </m:d>
-                      <m:d>
-                        <m:dPr>
-                          <m:ctrlPr>
-                            <a:rPr lang="en-US" sz="2000" b="0" i="1" smtClean="0">
-                              <a:latin typeface="Cambria Math" panose="02040503050406030204" pitchFamily="18" charset="0"/>
-                            </a:rPr>
-                          </m:ctrlPr>
-                        </m:dPr>
-                        <m:e>
-                          <m:f>
-                            <m:fPr>
+                          </m:d>
+                          <m:d>
+                            <m:dPr>
                               <m:ctrlPr>
                                 <a:rPr lang="en-US" sz="2000" b="0" i="1" smtClean="0">
                                   <a:latin typeface="Cambria Math" panose="02040503050406030204" pitchFamily="18" charset="0"/>
                                 </a:rPr>
                               </m:ctrlPr>
-                            </m:fPr>
-                            <m:num>
+                            </m:dPr>
+                            <m:e>
                               <m:r>
                                 <a:rPr lang="en-US" sz="2000" b="0" i="1" smtClean="0">
                                   <a:latin typeface="Cambria Math"/>
                                 </a:rPr>
-                                <m:t>56.73</m:t>
+                                <m:t>60</m:t>
                               </m:r>
+                            </m:e>
+                          </m:d>
+                          <m:d>
+                            <m:dPr>
+                              <m:ctrlPr>
+                                <a:rPr lang="en-US" sz="2000" b="0" i="1" smtClean="0">
+                                  <a:latin typeface="Cambria Math" panose="02040503050406030204" pitchFamily="18" charset="0"/>
+                                </a:rPr>
+                              </m:ctrlPr>
+                            </m:dPr>
+                            <m:e>
+                              <m:f>
+                                <m:fPr>
+                                  <m:ctrlPr>
+                                    <a:rPr lang="en-US" sz="2000" b="0" i="1" smtClean="0">
+                                      <a:latin typeface="Cambria Math" panose="02040503050406030204" pitchFamily="18" charset="0"/>
+                                    </a:rPr>
+                                  </m:ctrlPr>
+                                </m:fPr>
+                                <m:num>
+                                  <m:r>
+                                    <a:rPr lang="en-US" sz="2000" b="0" i="1" smtClean="0">
+                                      <a:latin typeface="Cambria Math"/>
+                                    </a:rPr>
+                                    <m:t>56.73</m:t>
+                                  </m:r>
+                                  <m:r>
+                                    <a:rPr lang="en-US" sz="2000" b="0" i="1" smtClean="0">
+                                      <a:latin typeface="Cambria Math"/>
+                                    </a:rPr>
+                                    <m:t>𝑝𝑠𝑖</m:t>
+                                  </m:r>
+                                  <m:r>
+                                    <a:rPr lang="en-US" sz="2000" b="0" i="1" smtClean="0">
+                                      <a:latin typeface="Cambria Math"/>
+                                    </a:rPr>
+                                    <m:t>+14.7</m:t>
+                                  </m:r>
+                                  <m:r>
+                                    <a:rPr lang="en-US" sz="2000" b="0" i="1" smtClean="0">
+                                      <a:latin typeface="Cambria Math"/>
+                                    </a:rPr>
+                                    <m:t>𝑝𝑠𝑖</m:t>
+                                  </m:r>
+                                </m:num>
+                                <m:den>
+                                  <m:r>
+                                    <a:rPr lang="en-US" sz="2000" b="0" i="1" smtClean="0">
+                                      <a:latin typeface="Cambria Math"/>
+                                    </a:rPr>
+                                    <m:t>14.7</m:t>
+                                  </m:r>
+                                  <m:r>
+                                    <a:rPr lang="en-US" sz="2000" b="0" i="1" smtClean="0">
+                                      <a:latin typeface="Cambria Math"/>
+                                    </a:rPr>
+                                    <m:t>𝑝𝑠𝑖</m:t>
+                                  </m:r>
+                                </m:den>
+                              </m:f>
+                            </m:e>
+                          </m:d>
+                        </m:num>
+                        <m:den>
+                          <m:d>
+                            <m:dPr>
+                              <m:ctrlPr>
+                                <a:rPr lang="en-US" sz="2000" i="1">
+                                  <a:latin typeface="Cambria Math" panose="02040503050406030204" pitchFamily="18" charset="0"/>
+                                </a:rPr>
+                              </m:ctrlPr>
+                            </m:dPr>
+                            <m:e>
                               <m:r>
-                                <a:rPr lang="en-US" sz="2000" b="0" i="1" smtClean="0">
-                                  <a:latin typeface="Cambria Math"/>
+                                <a:rPr lang="en-US" sz="2000" i="1">
+                                  <a:latin typeface="Cambria Math" panose="02040503050406030204" pitchFamily="18" charset="0"/>
                                 </a:rPr>
-                                <m:t>𝑝𝑠𝑖</m:t>
+                                <m:t>1728</m:t>
                               </m:r>
-                              <m:r>
-                                <a:rPr lang="en-US" sz="2000" b="0" i="1" smtClean="0">
-                                  <a:latin typeface="Cambria Math"/>
-                                </a:rPr>
-                                <m:t>+14.7</m:t>
-                              </m:r>
-                              <m:r>
-                                <a:rPr lang="en-US" sz="2000" b="0" i="1" smtClean="0">
-                                  <a:latin typeface="Cambria Math"/>
-                                </a:rPr>
-                                <m:t>𝑝𝑠𝑖</m:t>
-                              </m:r>
-                            </m:num>
-                            <m:den>
-                              <m:r>
-                                <a:rPr lang="en-US" sz="2000" b="0" i="1" smtClean="0">
-                                  <a:latin typeface="Cambria Math"/>
-                                </a:rPr>
-                                <m:t>14.7</m:t>
-                              </m:r>
-                              <m:r>
-                                <a:rPr lang="en-US" sz="2000" b="0" i="1" smtClean="0">
-                                  <a:latin typeface="Cambria Math"/>
-                                </a:rPr>
-                                <m:t>𝑝𝑠𝑖</m:t>
-                              </m:r>
-                            </m:den>
-                          </m:f>
-                        </m:e>
-                      </m:d>
+                              <m:f>
+                                <m:fPr>
+                                  <m:ctrlPr>
+                                    <a:rPr lang="en-US" sz="2000" i="1">
+                                      <a:latin typeface="Cambria Math" panose="02040503050406030204" pitchFamily="18" charset="0"/>
+                                    </a:rPr>
+                                  </m:ctrlPr>
+                                </m:fPr>
+                                <m:num>
+                                  <m:r>
+                                    <a:rPr lang="en-US" sz="2000" i="1">
+                                      <a:latin typeface="Cambria Math" panose="02040503050406030204" pitchFamily="18" charset="0"/>
+                                    </a:rPr>
+                                    <m:t>𝑖</m:t>
+                                  </m:r>
+                                  <m:sSup>
+                                    <m:sSupPr>
+                                      <m:ctrlPr>
+                                        <a:rPr lang="en-US" sz="2000" i="1">
+                                          <a:latin typeface="Cambria Math" panose="02040503050406030204" pitchFamily="18" charset="0"/>
+                                        </a:rPr>
+                                      </m:ctrlPr>
+                                    </m:sSupPr>
+                                    <m:e>
+                                      <m:r>
+                                        <a:rPr lang="en-US" sz="2000" i="1">
+                                          <a:latin typeface="Cambria Math" panose="02040503050406030204" pitchFamily="18" charset="0"/>
+                                        </a:rPr>
+                                        <m:t>𝑛</m:t>
+                                      </m:r>
+                                    </m:e>
+                                    <m:sup>
+                                      <m:r>
+                                        <a:rPr lang="en-US" sz="2000" i="1">
+                                          <a:latin typeface="Cambria Math" panose="02040503050406030204" pitchFamily="18" charset="0"/>
+                                        </a:rPr>
+                                        <m:t>3</m:t>
+                                      </m:r>
+                                    </m:sup>
+                                  </m:sSup>
+                                </m:num>
+                                <m:den>
+                                  <m:r>
+                                    <a:rPr lang="en-US" sz="2000" i="1">
+                                      <a:latin typeface="Cambria Math" panose="02040503050406030204" pitchFamily="18" charset="0"/>
+                                    </a:rPr>
+                                    <m:t>𝑓</m:t>
+                                  </m:r>
+                                  <m:sSup>
+                                    <m:sSupPr>
+                                      <m:ctrlPr>
+                                        <a:rPr lang="en-US" sz="2000" i="1">
+                                          <a:latin typeface="Cambria Math" panose="02040503050406030204" pitchFamily="18" charset="0"/>
+                                        </a:rPr>
+                                      </m:ctrlPr>
+                                    </m:sSupPr>
+                                    <m:e>
+                                      <m:r>
+                                        <a:rPr lang="en-US" sz="2000" i="1">
+                                          <a:latin typeface="Cambria Math" panose="02040503050406030204" pitchFamily="18" charset="0"/>
+                                        </a:rPr>
+                                        <m:t>𝑡</m:t>
+                                      </m:r>
+                                    </m:e>
+                                    <m:sup>
+                                      <m:r>
+                                        <a:rPr lang="en-US" sz="2000" i="1">
+                                          <a:latin typeface="Cambria Math" panose="02040503050406030204" pitchFamily="18" charset="0"/>
+                                        </a:rPr>
+                                        <m:t>3</m:t>
+                                      </m:r>
+                                    </m:sup>
+                                  </m:sSup>
+                                </m:den>
+                              </m:f>
+                            </m:e>
+                          </m:d>
+                        </m:den>
+                      </m:f>
                     </m:oMath>
                   </m:oMathPara>
                 </a14:m>
@@ -20897,7 +21041,7 @@
             </p:txBody>
           </p:sp>
         </mc:Choice>
-        <mc:Fallback xmlns="">
+        <mc:Fallback>
           <p:sp>
             <p:nvSpPr>
               <p:cNvPr id="3" name="Content Placeholder 2"/>
@@ -20910,13 +21054,13 @@
             </p:nvSpPr>
             <p:spPr>
               <a:xfrm>
-                <a:off x="203200" y="1066800"/>
-                <a:ext cx="11887200" cy="5410200"/>
+                <a:off x="152400" y="1026452"/>
+                <a:ext cx="11887200" cy="5678785"/>
               </a:xfrm>
               <a:blipFill rotWithShape="0">
                 <a:blip r:embed="rId2"/>
                 <a:stretch>
-                  <a:fillRect l="-513" t="-450"/>
+                  <a:fillRect l="-513" t="-322"/>
                 </a:stretch>
               </a:blipFill>
             </p:spPr>
@@ -20943,8 +21087,8 @@
         </p:nvSpPr>
         <p:spPr>
           <a:xfrm>
-            <a:off x="7721600" y="3950326"/>
-            <a:ext cx="5089047" cy="1200329"/>
+            <a:off x="7637522" y="4123335"/>
+            <a:ext cx="3220259" cy="1200329"/>
           </a:xfrm>
           <a:prstGeom prst="rect">
             <a:avLst/>
@@ -20958,8 +21102,16 @@
           <a:lstStyle/>
           <a:p>
             <a:r>
+              <a:rPr lang="en-US" sz="2400" b="1" dirty="0" err="1" smtClean="0"/>
+              <a:t>Selcted</a:t>
+            </a:r>
+            <a:r>
               <a:rPr lang="en-US" sz="2400" b="1" dirty="0" smtClean="0"/>
-              <a:t>Resulting Cylinder Specs</a:t>
+              <a:t> Cylinder </a:t>
+            </a:r>
+            <a:r>
+              <a:rPr lang="en-US" sz="2400" b="1" dirty="0" smtClean="0"/>
+              <a:t>Specs</a:t>
             </a:r>
             <a:r>
               <a:rPr lang="en-US" sz="2400" dirty="0" smtClean="0"/>
@@ -20976,6 +21128,70 @@
             <a:r>
               <a:rPr lang="en-US" sz="2400" dirty="0" smtClean="0"/>
               <a:t>4 inch Stroke Length</a:t>
+            </a:r>
+            <a:endParaRPr lang="en-US" dirty="0" smtClean="0"/>
+          </a:p>
+        </p:txBody>
+      </p:sp>
+      <p:sp>
+        <p:nvSpPr>
+          <p:cNvPr id="5" name="TextBox 4"/>
+          <p:cNvSpPr txBox="1"/>
+          <p:nvPr/>
+        </p:nvSpPr>
+        <p:spPr>
+          <a:xfrm>
+            <a:off x="7637522" y="1493710"/>
+            <a:ext cx="3766600" cy="1569660"/>
+          </a:xfrm>
+          <a:prstGeom prst="rect">
+            <a:avLst/>
+          </a:prstGeom>
+          <a:noFill/>
+        </p:spPr>
+        <p:txBody>
+          <a:bodyPr wrap="square" rtlCol="0">
+            <a:spAutoFit/>
+          </a:bodyPr>
+          <a:lstStyle/>
+          <a:p>
+            <a:r>
+              <a:rPr lang="en-US" sz="2400" b="1" dirty="0" smtClean="0"/>
+              <a:t>Required Cylinder </a:t>
+            </a:r>
+            <a:r>
+              <a:rPr lang="en-US" sz="2400" b="1" dirty="0" smtClean="0"/>
+              <a:t>Specs</a:t>
+            </a:r>
+            <a:r>
+              <a:rPr lang="en-US" sz="2400" dirty="0" smtClean="0"/>
+              <a:t>:</a:t>
+            </a:r>
+          </a:p>
+          <a:p>
+            <a:r>
+              <a:rPr lang="en-US" sz="2400" dirty="0" smtClean="0"/>
+              <a:t>178 </a:t>
+            </a:r>
+            <a:r>
+              <a:rPr lang="en-US" sz="2400" dirty="0" err="1" smtClean="0"/>
+              <a:t>lbf</a:t>
+            </a:r>
+            <a:r>
+              <a:rPr lang="en-US" sz="2400" dirty="0" smtClean="0"/>
+              <a:t> max output</a:t>
+            </a:r>
+          </a:p>
+          <a:p>
+            <a:r>
+              <a:rPr lang="en-US" sz="2400" dirty="0" smtClean="0"/>
+              <a:t>4 inch stroke length</a:t>
+            </a:r>
+          </a:p>
+          <a:p>
+            <a:r>
+              <a:rPr lang="en-US" sz="2400" dirty="0" smtClean="0"/>
+              <a:t>60 cycles per minute</a:t>
             </a:r>
             <a:endParaRPr lang="en-US" dirty="0" smtClean="0"/>
           </a:p>
@@ -21065,7 +21281,23 @@
           <a:p>
             <a:r>
               <a:rPr lang="en-US" sz="2400" dirty="0" smtClean="0"/>
-              <a:t>Controls flow through air  cylinders based on spool position</a:t>
+              <a:t>Controls </a:t>
+            </a:r>
+            <a:r>
+              <a:rPr lang="en-US" sz="2400" dirty="0" smtClean="0"/>
+              <a:t>fluid flow </a:t>
+            </a:r>
+            <a:r>
+              <a:rPr lang="en-US" sz="2400" dirty="0" smtClean="0"/>
+              <a:t>through </a:t>
+            </a:r>
+            <a:r>
+              <a:rPr lang="en-US" sz="2400" dirty="0" smtClean="0"/>
+              <a:t>air </a:t>
+            </a:r>
+            <a:r>
+              <a:rPr lang="en-US" sz="2400" dirty="0" smtClean="0"/>
+              <a:t>cylinders based on spool position</a:t>
             </a:r>
           </a:p>
           <a:p>
@@ -21452,7 +21684,11 @@
             </a:pPr>
             <a:r>
               <a:rPr lang="en-US" sz="2800" dirty="0" smtClean="0"/>
-              <a:t>-Pressure required by air cylinders</a:t>
+              <a:t>-Maximum Pressure </a:t>
+            </a:r>
+            <a:r>
+              <a:rPr lang="en-US" sz="2800" dirty="0" smtClean="0"/>
+              <a:t>required by air cylinders</a:t>
             </a:r>
           </a:p>
           <a:p>
@@ -21463,7 +21699,11 @@
             </a:pPr>
             <a:r>
               <a:rPr lang="en-US" sz="2800" dirty="0" smtClean="0"/>
-              <a:t>-Volumetric flow rate required by air cylinders</a:t>
+              <a:t>-Average volumetric </a:t>
+            </a:r>
+            <a:r>
+              <a:rPr lang="en-US" sz="2800" dirty="0" smtClean="0"/>
+              <a:t>flow rate required by air cylinders</a:t>
             </a:r>
             <a:endParaRPr lang="en-US" sz="2800" dirty="0"/>
           </a:p>
@@ -21965,7 +22205,6 @@
               <a:rPr lang="en-US" dirty="0" smtClean="0"/>
               <a:t>Debug Panel</a:t>
             </a:r>
-            <a:endParaRPr lang="en-US" dirty="0" smtClean="0"/>
           </a:p>
           <a:p>
             <a:r>
@@ -22128,8 +22367,13 @@
             </a:r>
             <a:r>
               <a:rPr lang="en-US" dirty="0" smtClean="0"/>
-              <a:t> Simulink models and code generation used for programming</a:t>
-            </a:r>
+              <a:t> Simulink models </a:t>
+            </a:r>
+            <a:r>
+              <a:rPr lang="en-US" dirty="0" smtClean="0"/>
+              <a:t>cross compiled to microcontroller</a:t>
+            </a:r>
+            <a:endParaRPr lang="en-US" dirty="0" smtClean="0"/>
           </a:p>
         </p:txBody>
       </p:sp>
@@ -22203,14 +22447,27 @@
           <a:p>
             <a:r>
               <a:rPr lang="en-US" dirty="0" smtClean="0"/>
-              <a:t>The Simulink PID algorithm are used for control</a:t>
-            </a:r>
-          </a:p>
-          <a:p>
+              <a:t>The Simulink PID </a:t>
+            </a:r>
             <a:r>
               <a:rPr lang="en-US" dirty="0" smtClean="0"/>
-              <a:t>Implementation of a step is done in the system’s state machine</a:t>
-            </a:r>
+              <a:t>algorithms </a:t>
+            </a:r>
+            <a:r>
+              <a:rPr lang="en-US" dirty="0" smtClean="0"/>
+              <a:t>are used for control</a:t>
+            </a:r>
+          </a:p>
+          <a:p>
+            <a:r>
+              <a:rPr lang="en-US" dirty="0" smtClean="0"/>
+              <a:t>Implementation of a step is done </a:t>
+            </a:r>
+            <a:r>
+              <a:rPr lang="en-US" dirty="0" smtClean="0"/>
+              <a:t>using state machine architecture</a:t>
+            </a:r>
+            <a:endParaRPr lang="en-US" dirty="0" smtClean="0"/>
           </a:p>
           <a:p>
             <a:r>
@@ -22220,6 +22477,39 @@
           </a:p>
         </p:txBody>
       </p:sp>
+      <p:pic>
+        <p:nvPicPr>
+          <p:cNvPr id="4" name="Picture 3" descr="D:\MyDocs\Documents\GitHub\AgileRoboticControls\System Modelling\Control\Control - General.png"/>
+          <p:cNvPicPr/>
+          <p:nvPr/>
+        </p:nvPicPr>
+        <p:blipFill>
+          <a:blip r:embed="rId2">
+            <a:extLst>
+              <a:ext uri="{28A0092B-C50C-407E-A947-70E740481C1C}">
+                <a14:useLocalDpi xmlns:a14="http://schemas.microsoft.com/office/drawing/2010/main" val="0"/>
+              </a:ext>
+            </a:extLst>
+          </a:blip>
+          <a:srcRect/>
+          <a:stretch>
+            <a:fillRect/>
+          </a:stretch>
+        </p:blipFill>
+        <p:spPr bwMode="auto">
+          <a:xfrm>
+            <a:off x="2319643" y="4397387"/>
+            <a:ext cx="6756946" cy="1856764"/>
+          </a:xfrm>
+          <a:prstGeom prst="rect">
+            <a:avLst/>
+          </a:prstGeom>
+          <a:noFill/>
+          <a:ln>
+            <a:noFill/>
+          </a:ln>
+        </p:spPr>
+      </p:pic>
     </p:spTree>
     <p:extLst>
       <p:ext uri="{BB962C8B-B14F-4D97-AF65-F5344CB8AC3E}">
@@ -22298,7 +22588,7 @@
       </p:sp>
       <p:pic>
         <p:nvPicPr>
-          <p:cNvPr id="4" name="Picture 3"/>
+          <p:cNvPr id="5" name="Picture 4" descr="D:\MyDocs\Documents\GitHub\AgileRoboticControls\System Modelling\Control\Control - Implementation.png"/>
           <p:cNvPicPr/>
           <p:nvPr/>
         </p:nvPicPr>
@@ -22310,18 +22600,23 @@
               </a:ext>
             </a:extLst>
           </a:blip>
+          <a:srcRect/>
           <a:stretch>
             <a:fillRect/>
           </a:stretch>
         </p:blipFill>
-        <p:spPr>
+        <p:spPr bwMode="auto">
           <a:xfrm>
-            <a:off x="941133" y="1786102"/>
-            <a:ext cx="10106278" cy="4589253"/>
+            <a:off x="390898" y="2249487"/>
+            <a:ext cx="11407025" cy="2328263"/>
           </a:xfrm>
           <a:prstGeom prst="rect">
             <a:avLst/>
           </a:prstGeom>
+          <a:noFill/>
+          <a:ln>
+            <a:noFill/>
+          </a:ln>
         </p:spPr>
       </p:pic>
     </p:spTree>
@@ -25470,7 +25765,15 @@
           <a:p>
             <a:r>
               <a:rPr lang="en-US" dirty="0" smtClean="0"/>
-              <a:t>Four 2R serial linkage originating at the body’s center of gravity</a:t>
+              <a:t>Four </a:t>
+            </a:r>
+            <a:r>
+              <a:rPr lang="en-US" dirty="0" smtClean="0"/>
+              <a:t>three-bar serial linkages </a:t>
+            </a:r>
+            <a:r>
+              <a:rPr lang="en-US" dirty="0" smtClean="0"/>
+              <a:t>originating at the body’s center of gravity</a:t>
             </a:r>
           </a:p>
           <a:p>
@@ -25482,7 +25785,11 @@
           <a:p>
             <a:r>
               <a:rPr lang="en-US" dirty="0" smtClean="0"/>
-              <a:t>16 equations to define link positions in x and y</a:t>
+              <a:t>16 equations to define link </a:t>
+            </a:r>
+            <a:r>
+              <a:rPr lang="en-US" dirty="0" smtClean="0"/>
+              <a:t>positions</a:t>
             </a:r>
             <a:endParaRPr lang="en-US" dirty="0"/>
           </a:p>
@@ -25632,8 +25939,8 @@
           </a:p>
         </p:txBody>
       </p:sp>
-      <mc:AlternateContent xmlns:mc="http://schemas.openxmlformats.org/markup-compatibility/2006" xmlns:a14="http://schemas.microsoft.com/office/drawing/2010/main">
-        <mc:Choice Requires="a14">
+      <mc:AlternateContent xmlns:mc="http://schemas.openxmlformats.org/markup-compatibility/2006">
+        <mc:Choice xmlns:a14="http://schemas.microsoft.com/office/drawing/2010/main" Requires="a14">
           <p:sp>
             <p:nvSpPr>
               <p:cNvPr id="56" name="TextBox 55"/>
@@ -25883,12 +26190,6 @@
                         </m:sSub>
                       </m:den>
                     </m:f>
-                    <m:r>
-                      <a:rPr lang="en-US" i="1">
-                        <a:latin typeface="Cambria Math" panose="02040503050406030204" pitchFamily="18" charset="0"/>
-                      </a:rPr>
-                      <m:t>∗</m:t>
-                    </m:r>
                     <m:f>
                       <m:fPr>
                         <m:ctrlPr>
@@ -26007,12 +26308,6 @@
                         </m:sSub>
                       </m:den>
                     </m:f>
-                    <m:r>
-                      <a:rPr lang="en-US" i="1">
-                        <a:latin typeface="Cambria Math" panose="02040503050406030204" pitchFamily="18" charset="0"/>
-                      </a:rPr>
-                      <m:t>∗</m:t>
-                    </m:r>
                     <m:f>
                       <m:fPr>
                         <m:ctrlPr>
@@ -26131,12 +26426,6 @@
                         </m:sSub>
                       </m:den>
                     </m:f>
-                    <m:r>
-                      <a:rPr lang="en-US" i="1">
-                        <a:latin typeface="Cambria Math" panose="02040503050406030204" pitchFamily="18" charset="0"/>
-                      </a:rPr>
-                      <m:t>∗</m:t>
-                    </m:r>
                     <m:f>
                       <m:fPr>
                         <m:ctrlPr>
@@ -26451,12 +26740,6 @@
                           </m:d>
                         </m:e>
                       </m:d>
-                      <m:r>
-                        <a:rPr lang="en-US" i="1">
-                          <a:latin typeface="Cambria Math" panose="02040503050406030204" pitchFamily="18" charset="0"/>
-                        </a:rPr>
-                        <m:t>∗</m:t>
-                      </m:r>
                       <m:d>
                         <m:dPr>
                           <m:ctrlPr>
@@ -26704,12 +26987,6 @@
                           </m:r>
                         </m:e>
                       </m:d>
-                      <m:r>
-                        <a:rPr lang="en-US" i="1">
-                          <a:latin typeface="Cambria Math" panose="02040503050406030204" pitchFamily="18" charset="0"/>
-                        </a:rPr>
-                        <m:t>∗</m:t>
-                      </m:r>
                       <m:d>
                         <m:dPr>
                           <m:ctrlPr>
@@ -26920,7 +27197,7 @@
             </p:txBody>
           </p:sp>
         </mc:Choice>
-        <mc:Fallback xmlns="">
+        <mc:Fallback>
           <p:sp>
             <p:nvSpPr>
               <p:cNvPr id="56" name="TextBox 55"/>
@@ -27059,7 +27336,27 @@
           <a:p>
             <a:r>
               <a:rPr lang="en-US" dirty="0" smtClean="0"/>
-              <a:t>Joint torques and forces are also functions of q</a:t>
+              <a:t>By extension, </a:t>
+            </a:r>
+            <a:r>
+              <a:rPr lang="en-US" dirty="0"/>
+              <a:t>j</a:t>
+            </a:r>
+            <a:r>
+              <a:rPr lang="en-US" dirty="0" smtClean="0"/>
+              <a:t>oint </a:t>
+            </a:r>
+            <a:r>
+              <a:rPr lang="en-US" dirty="0" smtClean="0"/>
+              <a:t>torques and forces are </a:t>
+            </a:r>
+            <a:r>
+              <a:rPr lang="en-US" dirty="0" smtClean="0"/>
+              <a:t>functions </a:t>
+            </a:r>
+            <a:r>
+              <a:rPr lang="en-US" dirty="0" smtClean="0"/>
+              <a:t>of q</a:t>
             </a:r>
             <a:endParaRPr lang="en-US" dirty="0"/>
           </a:p>

</xml_diff>

<commit_message>
Updated control block diagrams
Changed diagram in presentation
</commit_message>
<xml_diff>
--- a/Documentation/Presentation/Design Presentation/Design Presentation.pptx
+++ b/Documentation/Presentation/Design Presentation/Design Presentation.pptx
@@ -205,7 +205,7 @@
           <a:noFill/>
           <a:extLst>
             <a:ext uri="{909E8E84-426E-40dd-AFC4-6F175D3DCCD1}">
-              <a14:hiddenFill xmlns="" xmlns:a14="http://schemas.microsoft.com/office/drawing/2010/main">
+              <a14:hiddenFill xmlns:a14="http://schemas.microsoft.com/office/drawing/2010/main" xmlns="">
                 <a:solidFill>
                   <a:srgbClr val="FFFFFF"/>
                 </a:solidFill>
@@ -264,7 +264,7 @@
             </a:ln>
             <a:extLst>
               <a:ext uri="{91240B29-F687-4f45-9708-019B960494DF}">
-                <a14:hiddenLine xmlns="" xmlns:a14="http://schemas.microsoft.com/office/drawing/2010/main" w="9525">
+                <a14:hiddenLine xmlns:a14="http://schemas.microsoft.com/office/drawing/2010/main" xmlns="" w="9525">
                   <a:solidFill>
                     <a:srgbClr val="000000"/>
                   </a:solidFill>
@@ -354,7 +354,7 @@
             </a:ln>
             <a:extLst>
               <a:ext uri="{91240B29-F687-4f45-9708-019B960494DF}">
-                <a14:hiddenLine xmlns="" xmlns:a14="http://schemas.microsoft.com/office/drawing/2010/main" w="9525">
+                <a14:hiddenLine xmlns:a14="http://schemas.microsoft.com/office/drawing/2010/main" xmlns="" w="9525">
                   <a:solidFill>
                     <a:srgbClr val="000000"/>
                   </a:solidFill>
@@ -444,7 +444,7 @@
             </a:ln>
             <a:extLst>
               <a:ext uri="{91240B29-F687-4f45-9708-019B960494DF}">
-                <a14:hiddenLine xmlns="" xmlns:a14="http://schemas.microsoft.com/office/drawing/2010/main" w="9525">
+                <a14:hiddenLine xmlns:a14="http://schemas.microsoft.com/office/drawing/2010/main" xmlns="" w="9525">
                   <a:solidFill>
                     <a:srgbClr val="000000"/>
                   </a:solidFill>
@@ -478,7 +478,7 @@
             </a:ln>
             <a:extLst>
               <a:ext uri="{91240B29-F687-4f45-9708-019B960494DF}">
-                <a14:hiddenLine xmlns="" xmlns:a14="http://schemas.microsoft.com/office/drawing/2010/main" w="9525">
+                <a14:hiddenLine xmlns:a14="http://schemas.microsoft.com/office/drawing/2010/main" xmlns="" w="9525">
                   <a:solidFill>
                     <a:srgbClr val="000000"/>
                   </a:solidFill>
@@ -568,7 +568,7 @@
             </a:ln>
             <a:extLst>
               <a:ext uri="{91240B29-F687-4f45-9708-019B960494DF}">
-                <a14:hiddenLine xmlns="" xmlns:a14="http://schemas.microsoft.com/office/drawing/2010/main" w="9525">
+                <a14:hiddenLine xmlns:a14="http://schemas.microsoft.com/office/drawing/2010/main" xmlns="" w="9525">
                   <a:solidFill>
                     <a:srgbClr val="000000"/>
                   </a:solidFill>
@@ -630,7 +630,7 @@
             </a:ln>
             <a:extLst>
               <a:ext uri="{91240B29-F687-4f45-9708-019B960494DF}">
-                <a14:hiddenLine xmlns="" xmlns:a14="http://schemas.microsoft.com/office/drawing/2010/main" w="9525">
+                <a14:hiddenLine xmlns:a14="http://schemas.microsoft.com/office/drawing/2010/main" xmlns="" w="9525">
                   <a:solidFill>
                     <a:srgbClr val="000000"/>
                   </a:solidFill>
@@ -692,7 +692,7 @@
             </a:ln>
             <a:extLst>
               <a:ext uri="{91240B29-F687-4f45-9708-019B960494DF}">
-                <a14:hiddenLine xmlns="" xmlns:a14="http://schemas.microsoft.com/office/drawing/2010/main" w="9525">
+                <a14:hiddenLine xmlns:a14="http://schemas.microsoft.com/office/drawing/2010/main" xmlns="" w="9525">
                   <a:solidFill>
                     <a:srgbClr val="000000"/>
                   </a:solidFill>
@@ -782,7 +782,7 @@
             </a:ln>
             <a:extLst>
               <a:ext uri="{91240B29-F687-4f45-9708-019B960494DF}">
-                <a14:hiddenLine xmlns="" xmlns:a14="http://schemas.microsoft.com/office/drawing/2010/main" w="9525">
+                <a14:hiddenLine xmlns:a14="http://schemas.microsoft.com/office/drawing/2010/main" xmlns="" w="9525">
                   <a:solidFill>
                     <a:srgbClr val="000000"/>
                   </a:solidFill>
@@ -844,7 +844,7 @@
             </a:ln>
             <a:extLst>
               <a:ext uri="{91240B29-F687-4f45-9708-019B960494DF}">
-                <a14:hiddenLine xmlns="" xmlns:a14="http://schemas.microsoft.com/office/drawing/2010/main" w="9525">
+                <a14:hiddenLine xmlns:a14="http://schemas.microsoft.com/office/drawing/2010/main" xmlns="" w="9525">
                   <a:solidFill>
                     <a:srgbClr val="000000"/>
                   </a:solidFill>
@@ -906,7 +906,7 @@
             </a:ln>
             <a:extLst>
               <a:ext uri="{91240B29-F687-4f45-9708-019B960494DF}">
-                <a14:hiddenLine xmlns="" xmlns:a14="http://schemas.microsoft.com/office/drawing/2010/main" w="9525">
+                <a14:hiddenLine xmlns:a14="http://schemas.microsoft.com/office/drawing/2010/main" xmlns="" w="9525">
                   <a:solidFill>
                     <a:srgbClr val="000000"/>
                   </a:solidFill>
@@ -996,7 +996,7 @@
             </a:ln>
             <a:extLst>
               <a:ext uri="{91240B29-F687-4f45-9708-019B960494DF}">
-                <a14:hiddenLine xmlns="" xmlns:a14="http://schemas.microsoft.com/office/drawing/2010/main" w="9525">
+                <a14:hiddenLine xmlns:a14="http://schemas.microsoft.com/office/drawing/2010/main" xmlns="" w="9525">
                   <a:solidFill>
                     <a:srgbClr val="000000"/>
                   </a:solidFill>
@@ -1086,7 +1086,7 @@
             </a:ln>
             <a:extLst>
               <a:ext uri="{91240B29-F687-4f45-9708-019B960494DF}">
-                <a14:hiddenLine xmlns="" xmlns:a14="http://schemas.microsoft.com/office/drawing/2010/main" w="9525">
+                <a14:hiddenLine xmlns:a14="http://schemas.microsoft.com/office/drawing/2010/main" xmlns="" w="9525">
                   <a:solidFill>
                     <a:srgbClr val="000000"/>
                   </a:solidFill>
@@ -1148,7 +1148,7 @@
             </a:ln>
             <a:extLst>
               <a:ext uri="{91240B29-F687-4f45-9708-019B960494DF}">
-                <a14:hiddenLine xmlns="" xmlns:a14="http://schemas.microsoft.com/office/drawing/2010/main" w="9525">
+                <a14:hiddenLine xmlns:a14="http://schemas.microsoft.com/office/drawing/2010/main" xmlns="" w="9525">
                   <a:solidFill>
                     <a:srgbClr val="000000"/>
                   </a:solidFill>
@@ -1258,7 +1258,7 @@
             </a:ln>
             <a:extLst>
               <a:ext uri="{91240B29-F687-4f45-9708-019B960494DF}">
-                <a14:hiddenLine xmlns="" xmlns:a14="http://schemas.microsoft.com/office/drawing/2010/main" w="9525">
+                <a14:hiddenLine xmlns:a14="http://schemas.microsoft.com/office/drawing/2010/main" xmlns="" w="9525">
                   <a:solidFill>
                     <a:srgbClr val="000000"/>
                   </a:solidFill>
@@ -1320,7 +1320,7 @@
             </a:ln>
             <a:extLst>
               <a:ext uri="{91240B29-F687-4f45-9708-019B960494DF}">
-                <a14:hiddenLine xmlns="" xmlns:a14="http://schemas.microsoft.com/office/drawing/2010/main" w="9525">
+                <a14:hiddenLine xmlns:a14="http://schemas.microsoft.com/office/drawing/2010/main" xmlns="" w="9525">
                   <a:solidFill>
                     <a:srgbClr val="000000"/>
                   </a:solidFill>
@@ -1410,7 +1410,7 @@
             </a:ln>
             <a:extLst>
               <a:ext uri="{91240B29-F687-4f45-9708-019B960494DF}">
-                <a14:hiddenLine xmlns="" xmlns:a14="http://schemas.microsoft.com/office/drawing/2010/main" w="9525">
+                <a14:hiddenLine xmlns:a14="http://schemas.microsoft.com/office/drawing/2010/main" xmlns="" w="9525">
                   <a:solidFill>
                     <a:srgbClr val="000000"/>
                   </a:solidFill>
@@ -1500,7 +1500,7 @@
             </a:ln>
             <a:extLst>
               <a:ext uri="{91240B29-F687-4f45-9708-019B960494DF}">
-                <a14:hiddenLine xmlns="" xmlns:a14="http://schemas.microsoft.com/office/drawing/2010/main" w="9525">
+                <a14:hiddenLine xmlns:a14="http://schemas.microsoft.com/office/drawing/2010/main" xmlns="" w="9525">
                   <a:solidFill>
                     <a:srgbClr val="000000"/>
                   </a:solidFill>
@@ -1562,7 +1562,7 @@
             </a:ln>
             <a:extLst>
               <a:ext uri="{91240B29-F687-4f45-9708-019B960494DF}">
-                <a14:hiddenLine xmlns="" xmlns:a14="http://schemas.microsoft.com/office/drawing/2010/main" w="9525">
+                <a14:hiddenLine xmlns:a14="http://schemas.microsoft.com/office/drawing/2010/main" xmlns="" w="9525">
                   <a:solidFill>
                     <a:srgbClr val="000000"/>
                   </a:solidFill>
@@ -1652,7 +1652,7 @@
             </a:ln>
             <a:extLst>
               <a:ext uri="{91240B29-F687-4f45-9708-019B960494DF}">
-                <a14:hiddenLine xmlns="" xmlns:a14="http://schemas.microsoft.com/office/drawing/2010/main" w="9525">
+                <a14:hiddenLine xmlns:a14="http://schemas.microsoft.com/office/drawing/2010/main" xmlns="" w="9525">
                   <a:solidFill>
                     <a:srgbClr val="000000"/>
                   </a:solidFill>
@@ -1742,7 +1742,7 @@
             </a:ln>
             <a:extLst>
               <a:ext uri="{91240B29-F687-4f45-9708-019B960494DF}">
-                <a14:hiddenLine xmlns="" xmlns:a14="http://schemas.microsoft.com/office/drawing/2010/main" w="9525">
+                <a14:hiddenLine xmlns:a14="http://schemas.microsoft.com/office/drawing/2010/main" xmlns="" w="9525">
                   <a:solidFill>
                     <a:srgbClr val="000000"/>
                   </a:solidFill>
@@ -1798,7 +1798,7 @@
             </a:ln>
             <a:extLst>
               <a:ext uri="{91240B29-F687-4f45-9708-019B960494DF}">
-                <a14:hiddenLine xmlns="" xmlns:a14="http://schemas.microsoft.com/office/drawing/2010/main" w="9525">
+                <a14:hiddenLine xmlns:a14="http://schemas.microsoft.com/office/drawing/2010/main" xmlns="" w="9525">
                   <a:solidFill>
                     <a:srgbClr val="000000"/>
                   </a:solidFill>
@@ -1888,7 +1888,7 @@
             </a:ln>
             <a:extLst>
               <a:ext uri="{91240B29-F687-4f45-9708-019B960494DF}">
-                <a14:hiddenLine xmlns="" xmlns:a14="http://schemas.microsoft.com/office/drawing/2010/main" w="9525">
+                <a14:hiddenLine xmlns:a14="http://schemas.microsoft.com/office/drawing/2010/main" xmlns="" w="9525">
                   <a:solidFill>
                     <a:srgbClr val="000000"/>
                   </a:solidFill>
@@ -1944,7 +1944,7 @@
             </a:ln>
             <a:extLst>
               <a:ext uri="{91240B29-F687-4f45-9708-019B960494DF}">
-                <a14:hiddenLine xmlns="" xmlns:a14="http://schemas.microsoft.com/office/drawing/2010/main" w="9525">
+                <a14:hiddenLine xmlns:a14="http://schemas.microsoft.com/office/drawing/2010/main" xmlns="" w="9525">
                   <a:solidFill>
                     <a:srgbClr val="000000"/>
                   </a:solidFill>
@@ -2034,7 +2034,7 @@
             </a:ln>
             <a:extLst>
               <a:ext uri="{91240B29-F687-4f45-9708-019B960494DF}">
-                <a14:hiddenLine xmlns="" xmlns:a14="http://schemas.microsoft.com/office/drawing/2010/main" w="9525">
+                <a14:hiddenLine xmlns:a14="http://schemas.microsoft.com/office/drawing/2010/main" xmlns="" w="9525">
                   <a:solidFill>
                     <a:srgbClr val="000000"/>
                   </a:solidFill>
@@ -2102,7 +2102,7 @@
             </a:ln>
             <a:extLst>
               <a:ext uri="{91240B29-F687-4f45-9708-019B960494DF}">
-                <a14:hiddenLine xmlns="" xmlns:a14="http://schemas.microsoft.com/office/drawing/2010/main" w="9525">
+                <a14:hiddenLine xmlns:a14="http://schemas.microsoft.com/office/drawing/2010/main" xmlns="" w="9525">
                   <a:solidFill>
                     <a:srgbClr val="000000"/>
                   </a:solidFill>
@@ -2192,7 +2192,7 @@
             </a:ln>
             <a:extLst>
               <a:ext uri="{91240B29-F687-4f45-9708-019B960494DF}">
-                <a14:hiddenLine xmlns="" xmlns:a14="http://schemas.microsoft.com/office/drawing/2010/main" w="9525">
+                <a14:hiddenLine xmlns:a14="http://schemas.microsoft.com/office/drawing/2010/main" xmlns="" w="9525">
                   <a:solidFill>
                     <a:srgbClr val="000000"/>
                   </a:solidFill>
@@ -2260,7 +2260,7 @@
             </a:ln>
             <a:extLst>
               <a:ext uri="{91240B29-F687-4f45-9708-019B960494DF}">
-                <a14:hiddenLine xmlns="" xmlns:a14="http://schemas.microsoft.com/office/drawing/2010/main" w="9525">
+                <a14:hiddenLine xmlns:a14="http://schemas.microsoft.com/office/drawing/2010/main" xmlns="" w="9525">
                   <a:solidFill>
                     <a:srgbClr val="000000"/>
                   </a:solidFill>
@@ -2350,7 +2350,7 @@
             </a:ln>
             <a:extLst>
               <a:ext uri="{91240B29-F687-4f45-9708-019B960494DF}">
-                <a14:hiddenLine xmlns="" xmlns:a14="http://schemas.microsoft.com/office/drawing/2010/main" w="9525">
+                <a14:hiddenLine xmlns:a14="http://schemas.microsoft.com/office/drawing/2010/main" xmlns="" w="9525">
                   <a:solidFill>
                     <a:srgbClr val="000000"/>
                   </a:solidFill>
@@ -2384,7 +2384,7 @@
             </a:ln>
             <a:extLst>
               <a:ext uri="{91240B29-F687-4f45-9708-019B960494DF}">
-                <a14:hiddenLine xmlns="" xmlns:a14="http://schemas.microsoft.com/office/drawing/2010/main" w="9525">
+                <a14:hiddenLine xmlns:a14="http://schemas.microsoft.com/office/drawing/2010/main" xmlns="" w="9525">
                   <a:solidFill>
                     <a:srgbClr val="000000"/>
                   </a:solidFill>
@@ -2474,7 +2474,7 @@
             </a:ln>
             <a:extLst>
               <a:ext uri="{91240B29-F687-4f45-9708-019B960494DF}">
-                <a14:hiddenLine xmlns="" xmlns:a14="http://schemas.microsoft.com/office/drawing/2010/main" w="9525">
+                <a14:hiddenLine xmlns:a14="http://schemas.microsoft.com/office/drawing/2010/main" xmlns="" w="9525">
                   <a:solidFill>
                     <a:srgbClr val="000000"/>
                   </a:solidFill>
@@ -2536,7 +2536,7 @@
             </a:ln>
             <a:extLst>
               <a:ext uri="{91240B29-F687-4f45-9708-019B960494DF}">
-                <a14:hiddenLine xmlns="" xmlns:a14="http://schemas.microsoft.com/office/drawing/2010/main" w="9525">
+                <a14:hiddenLine xmlns:a14="http://schemas.microsoft.com/office/drawing/2010/main" xmlns="" w="9525">
                   <a:solidFill>
                     <a:srgbClr val="000000"/>
                   </a:solidFill>
@@ -2598,7 +2598,7 @@
             </a:ln>
             <a:extLst>
               <a:ext uri="{91240B29-F687-4f45-9708-019B960494DF}">
-                <a14:hiddenLine xmlns="" xmlns:a14="http://schemas.microsoft.com/office/drawing/2010/main" w="9525">
+                <a14:hiddenLine xmlns:a14="http://schemas.microsoft.com/office/drawing/2010/main" xmlns="" w="9525">
                   <a:solidFill>
                     <a:srgbClr val="000000"/>
                   </a:solidFill>
@@ -2688,7 +2688,7 @@
             </a:ln>
             <a:extLst>
               <a:ext uri="{91240B29-F687-4f45-9708-019B960494DF}">
-                <a14:hiddenLine xmlns="" xmlns:a14="http://schemas.microsoft.com/office/drawing/2010/main" w="9525">
+                <a14:hiddenLine xmlns:a14="http://schemas.microsoft.com/office/drawing/2010/main" xmlns="" w="9525">
                   <a:solidFill>
                     <a:srgbClr val="000000"/>
                   </a:solidFill>
@@ -2756,7 +2756,7 @@
             </a:ln>
             <a:extLst>
               <a:ext uri="{91240B29-F687-4f45-9708-019B960494DF}">
-                <a14:hiddenLine xmlns="" xmlns:a14="http://schemas.microsoft.com/office/drawing/2010/main" w="9525">
+                <a14:hiddenLine xmlns:a14="http://schemas.microsoft.com/office/drawing/2010/main" xmlns="" w="9525">
                   <a:solidFill>
                     <a:srgbClr val="000000"/>
                   </a:solidFill>
@@ -2818,7 +2818,7 @@
             </a:ln>
             <a:extLst>
               <a:ext uri="{91240B29-F687-4f45-9708-019B960494DF}">
-                <a14:hiddenLine xmlns="" xmlns:a14="http://schemas.microsoft.com/office/drawing/2010/main" w="9525">
+                <a14:hiddenLine xmlns:a14="http://schemas.microsoft.com/office/drawing/2010/main" xmlns="" w="9525">
                   <a:solidFill>
                     <a:srgbClr val="000000"/>
                   </a:solidFill>
@@ -2908,7 +2908,7 @@
             </a:ln>
             <a:extLst>
               <a:ext uri="{91240B29-F687-4f45-9708-019B960494DF}">
-                <a14:hiddenLine xmlns="" xmlns:a14="http://schemas.microsoft.com/office/drawing/2010/main" w="9525">
+                <a14:hiddenLine xmlns:a14="http://schemas.microsoft.com/office/drawing/2010/main" xmlns="" w="9525">
                   <a:solidFill>
                     <a:srgbClr val="000000"/>
                   </a:solidFill>
@@ -2970,7 +2970,7 @@
             </a:ln>
             <a:extLst>
               <a:ext uri="{91240B29-F687-4f45-9708-019B960494DF}">
-                <a14:hiddenLine xmlns="" xmlns:a14="http://schemas.microsoft.com/office/drawing/2010/main" w="9525">
+                <a14:hiddenLine xmlns:a14="http://schemas.microsoft.com/office/drawing/2010/main" xmlns="" w="9525">
                   <a:solidFill>
                     <a:srgbClr val="000000"/>
                   </a:solidFill>
@@ -3060,7 +3060,7 @@
             </a:ln>
             <a:extLst>
               <a:ext uri="{91240B29-F687-4f45-9708-019B960494DF}">
-                <a14:hiddenLine xmlns="" xmlns:a14="http://schemas.microsoft.com/office/drawing/2010/main" w="9525">
+                <a14:hiddenLine xmlns:a14="http://schemas.microsoft.com/office/drawing/2010/main" xmlns="" w="9525">
                   <a:solidFill>
                     <a:srgbClr val="000000"/>
                   </a:solidFill>
@@ -3122,7 +3122,7 @@
             </a:ln>
             <a:extLst>
               <a:ext uri="{91240B29-F687-4f45-9708-019B960494DF}">
-                <a14:hiddenLine xmlns="" xmlns:a14="http://schemas.microsoft.com/office/drawing/2010/main" w="9525">
+                <a14:hiddenLine xmlns:a14="http://schemas.microsoft.com/office/drawing/2010/main" xmlns="" w="9525">
                   <a:solidFill>
                     <a:srgbClr val="000000"/>
                   </a:solidFill>
@@ -3212,7 +3212,7 @@
             </a:ln>
             <a:extLst>
               <a:ext uri="{91240B29-F687-4f45-9708-019B960494DF}">
-                <a14:hiddenLine xmlns="" xmlns:a14="http://schemas.microsoft.com/office/drawing/2010/main" w="9525">
+                <a14:hiddenLine xmlns:a14="http://schemas.microsoft.com/office/drawing/2010/main" xmlns="" w="9525">
                   <a:solidFill>
                     <a:srgbClr val="000000"/>
                   </a:solidFill>
@@ -3246,7 +3246,7 @@
             </a:ln>
             <a:extLst>
               <a:ext uri="{91240B29-F687-4f45-9708-019B960494DF}">
-                <a14:hiddenLine xmlns="" xmlns:a14="http://schemas.microsoft.com/office/drawing/2010/main" w="9525">
+                <a14:hiddenLine xmlns:a14="http://schemas.microsoft.com/office/drawing/2010/main" xmlns="" w="9525">
                   <a:solidFill>
                     <a:srgbClr val="000000"/>
                   </a:solidFill>
@@ -3311,7 +3311,7 @@
             </a:ln>
             <a:extLst>
               <a:ext uri="{91240B29-F687-4f45-9708-019B960494DF}">
-                <a14:hiddenLine xmlns="" xmlns:a14="http://schemas.microsoft.com/office/drawing/2010/main" w="9525">
+                <a14:hiddenLine xmlns:a14="http://schemas.microsoft.com/office/drawing/2010/main" xmlns="" w="9525">
                   <a:solidFill>
                     <a:srgbClr val="000000"/>
                   </a:solidFill>
@@ -3401,7 +3401,7 @@
             </a:ln>
             <a:extLst>
               <a:ext uri="{91240B29-F687-4f45-9708-019B960494DF}">
-                <a14:hiddenLine xmlns="" xmlns:a14="http://schemas.microsoft.com/office/drawing/2010/main" w="9525">
+                <a14:hiddenLine xmlns:a14="http://schemas.microsoft.com/office/drawing/2010/main" xmlns="" w="9525">
                   <a:solidFill>
                     <a:srgbClr val="000000"/>
                   </a:solidFill>
@@ -3463,7 +3463,7 @@
             </a:ln>
             <a:extLst>
               <a:ext uri="{91240B29-F687-4f45-9708-019B960494DF}">
-                <a14:hiddenLine xmlns="" xmlns:a14="http://schemas.microsoft.com/office/drawing/2010/main" w="9525">
+                <a14:hiddenLine xmlns:a14="http://schemas.microsoft.com/office/drawing/2010/main" xmlns="" w="9525">
                   <a:solidFill>
                     <a:srgbClr val="000000"/>
                   </a:solidFill>
@@ -3553,7 +3553,7 @@
             </a:ln>
             <a:extLst>
               <a:ext uri="{91240B29-F687-4f45-9708-019B960494DF}">
-                <a14:hiddenLine xmlns="" xmlns:a14="http://schemas.microsoft.com/office/drawing/2010/main" w="9525">
+                <a14:hiddenLine xmlns:a14="http://schemas.microsoft.com/office/drawing/2010/main" xmlns="" w="9525">
                   <a:solidFill>
                     <a:srgbClr val="000000"/>
                   </a:solidFill>
@@ -3643,7 +3643,7 @@
             </a:ln>
             <a:extLst>
               <a:ext uri="{91240B29-F687-4f45-9708-019B960494DF}">
-                <a14:hiddenLine xmlns="" xmlns:a14="http://schemas.microsoft.com/office/drawing/2010/main" w="9525">
+                <a14:hiddenLine xmlns:a14="http://schemas.microsoft.com/office/drawing/2010/main" xmlns="" w="9525">
                   <a:solidFill>
                     <a:srgbClr val="000000"/>
                   </a:solidFill>
@@ -3708,7 +3708,7 @@
             </a:ln>
             <a:extLst>
               <a:ext uri="{91240B29-F687-4f45-9708-019B960494DF}">
-                <a14:hiddenLine xmlns="" xmlns:a14="http://schemas.microsoft.com/office/drawing/2010/main" w="9525">
+                <a14:hiddenLine xmlns:a14="http://schemas.microsoft.com/office/drawing/2010/main" xmlns="" w="9525">
                   <a:solidFill>
                     <a:srgbClr val="000000"/>
                   </a:solidFill>
@@ -3770,7 +3770,7 @@
             </a:ln>
             <a:extLst>
               <a:ext uri="{91240B29-F687-4f45-9708-019B960494DF}">
-                <a14:hiddenLine xmlns="" xmlns:a14="http://schemas.microsoft.com/office/drawing/2010/main" w="9525">
+                <a14:hiddenLine xmlns:a14="http://schemas.microsoft.com/office/drawing/2010/main" xmlns="" w="9525">
                   <a:solidFill>
                     <a:srgbClr val="000000"/>
                   </a:solidFill>
@@ -3860,7 +3860,7 @@
             </a:ln>
             <a:extLst>
               <a:ext uri="{91240B29-F687-4f45-9708-019B960494DF}">
-                <a14:hiddenLine xmlns="" xmlns:a14="http://schemas.microsoft.com/office/drawing/2010/main" w="9525">
+                <a14:hiddenLine xmlns:a14="http://schemas.microsoft.com/office/drawing/2010/main" xmlns="" w="9525">
                   <a:solidFill>
                     <a:srgbClr val="000000"/>
                   </a:solidFill>
@@ -3950,7 +3950,7 @@
             </a:ln>
             <a:extLst>
               <a:ext uri="{91240B29-F687-4f45-9708-019B960494DF}">
-                <a14:hiddenLine xmlns="" xmlns:a14="http://schemas.microsoft.com/office/drawing/2010/main" w="9525">
+                <a14:hiddenLine xmlns:a14="http://schemas.microsoft.com/office/drawing/2010/main" xmlns="" w="9525">
                   <a:solidFill>
                     <a:srgbClr val="000000"/>
                   </a:solidFill>
@@ -4012,7 +4012,7 @@
             </a:ln>
             <a:extLst>
               <a:ext uri="{91240B29-F687-4f45-9708-019B960494DF}">
-                <a14:hiddenLine xmlns="" xmlns:a14="http://schemas.microsoft.com/office/drawing/2010/main" w="9525">
+                <a14:hiddenLine xmlns:a14="http://schemas.microsoft.com/office/drawing/2010/main" xmlns="" w="9525">
                   <a:solidFill>
                     <a:srgbClr val="000000"/>
                   </a:solidFill>
@@ -4132,7 +4132,7 @@
             </a:ln>
             <a:extLst>
               <a:ext uri="{91240B29-F687-4f45-9708-019B960494DF}">
-                <a14:hiddenLine xmlns="" xmlns:a14="http://schemas.microsoft.com/office/drawing/2010/main" w="9525">
+                <a14:hiddenLine xmlns:a14="http://schemas.microsoft.com/office/drawing/2010/main" xmlns="" w="9525">
                   <a:solidFill>
                     <a:srgbClr val="000000"/>
                   </a:solidFill>
@@ -4200,7 +4200,7 @@
             </a:ln>
             <a:extLst>
               <a:ext uri="{91240B29-F687-4f45-9708-019B960494DF}">
-                <a14:hiddenLine xmlns="" xmlns:a14="http://schemas.microsoft.com/office/drawing/2010/main" w="9525">
+                <a14:hiddenLine xmlns:a14="http://schemas.microsoft.com/office/drawing/2010/main" xmlns="" w="9525">
                   <a:solidFill>
                     <a:srgbClr val="000000"/>
                   </a:solidFill>
@@ -4290,7 +4290,7 @@
             </a:ln>
             <a:extLst>
               <a:ext uri="{91240B29-F687-4f45-9708-019B960494DF}">
-                <a14:hiddenLine xmlns="" xmlns:a14="http://schemas.microsoft.com/office/drawing/2010/main" w="9525">
+                <a14:hiddenLine xmlns:a14="http://schemas.microsoft.com/office/drawing/2010/main" xmlns="" w="9525">
                   <a:solidFill>
                     <a:srgbClr val="000000"/>
                   </a:solidFill>
@@ -9019,7 +9019,7 @@
           <a:noFill/>
           <a:extLst>
             <a:ext uri="{909E8E84-426E-40dd-AFC4-6F175D3DCCD1}">
-              <a14:hiddenFill xmlns="" xmlns:a14="http://schemas.microsoft.com/office/drawing/2010/main">
+              <a14:hiddenFill xmlns:a14="http://schemas.microsoft.com/office/drawing/2010/main" xmlns="">
                 <a:solidFill>
                   <a:srgbClr val="FFFFFF"/>
                 </a:solidFill>
@@ -9093,7 +9093,7 @@
               </a:ln>
               <a:extLst>
                 <a:ext uri="{91240B29-F687-4f45-9708-019B960494DF}">
-                  <a14:hiddenLine xmlns="" xmlns:a14="http://schemas.microsoft.com/office/drawing/2010/main" w="9525">
+                  <a14:hiddenLine xmlns:a14="http://schemas.microsoft.com/office/drawing/2010/main" xmlns="" w="9525">
                     <a:solidFill>
                       <a:srgbClr val="000000"/>
                     </a:solidFill>
@@ -9183,7 +9183,7 @@
               </a:ln>
               <a:extLst>
                 <a:ext uri="{91240B29-F687-4f45-9708-019B960494DF}">
-                  <a14:hiddenLine xmlns="" xmlns:a14="http://schemas.microsoft.com/office/drawing/2010/main" w="9525">
+                  <a14:hiddenLine xmlns:a14="http://schemas.microsoft.com/office/drawing/2010/main" xmlns="" w="9525">
                     <a:solidFill>
                       <a:srgbClr val="000000"/>
                     </a:solidFill>
@@ -9273,7 +9273,7 @@
               </a:ln>
               <a:extLst>
                 <a:ext uri="{91240B29-F687-4f45-9708-019B960494DF}">
-                  <a14:hiddenLine xmlns="" xmlns:a14="http://schemas.microsoft.com/office/drawing/2010/main" w="9525">
+                  <a14:hiddenLine xmlns:a14="http://schemas.microsoft.com/office/drawing/2010/main" xmlns="" w="9525">
                     <a:solidFill>
                       <a:srgbClr val="000000"/>
                     </a:solidFill>
@@ -9335,7 +9335,7 @@
               </a:ln>
               <a:extLst>
                 <a:ext uri="{91240B29-F687-4f45-9708-019B960494DF}">
-                  <a14:hiddenLine xmlns="" xmlns:a14="http://schemas.microsoft.com/office/drawing/2010/main" w="9525">
+                  <a14:hiddenLine xmlns:a14="http://schemas.microsoft.com/office/drawing/2010/main" xmlns="" w="9525">
                     <a:solidFill>
                       <a:srgbClr val="000000"/>
                     </a:solidFill>
@@ -9425,7 +9425,7 @@
               </a:ln>
               <a:extLst>
                 <a:ext uri="{91240B29-F687-4f45-9708-019B960494DF}">
-                  <a14:hiddenLine xmlns="" xmlns:a14="http://schemas.microsoft.com/office/drawing/2010/main" w="9525">
+                  <a14:hiddenLine xmlns:a14="http://schemas.microsoft.com/office/drawing/2010/main" xmlns="" w="9525">
                     <a:solidFill>
                       <a:srgbClr val="000000"/>
                     </a:solidFill>
@@ -9487,7 +9487,7 @@
               </a:ln>
               <a:extLst>
                 <a:ext uri="{91240B29-F687-4f45-9708-019B960494DF}">
-                  <a14:hiddenLine xmlns="" xmlns:a14="http://schemas.microsoft.com/office/drawing/2010/main" w="9525">
+                  <a14:hiddenLine xmlns:a14="http://schemas.microsoft.com/office/drawing/2010/main" xmlns="" w="9525">
                     <a:solidFill>
                       <a:srgbClr val="000000"/>
                     </a:solidFill>
@@ -9549,7 +9549,7 @@
               </a:ln>
               <a:extLst>
                 <a:ext uri="{91240B29-F687-4f45-9708-019B960494DF}">
-                  <a14:hiddenLine xmlns="" xmlns:a14="http://schemas.microsoft.com/office/drawing/2010/main" w="9525">
+                  <a14:hiddenLine xmlns:a14="http://schemas.microsoft.com/office/drawing/2010/main" xmlns="" w="9525">
                     <a:solidFill>
                       <a:srgbClr val="000000"/>
                     </a:solidFill>
@@ -9639,7 +9639,7 @@
               </a:ln>
               <a:extLst>
                 <a:ext uri="{91240B29-F687-4f45-9708-019B960494DF}">
-                  <a14:hiddenLine xmlns="" xmlns:a14="http://schemas.microsoft.com/office/drawing/2010/main" w="9525">
+                  <a14:hiddenLine xmlns:a14="http://schemas.microsoft.com/office/drawing/2010/main" xmlns="" w="9525">
                     <a:solidFill>
                       <a:srgbClr val="000000"/>
                     </a:solidFill>
@@ -9729,7 +9729,7 @@
               </a:ln>
               <a:extLst>
                 <a:ext uri="{91240B29-F687-4f45-9708-019B960494DF}">
-                  <a14:hiddenLine xmlns="" xmlns:a14="http://schemas.microsoft.com/office/drawing/2010/main" w="9525">
+                  <a14:hiddenLine xmlns:a14="http://schemas.microsoft.com/office/drawing/2010/main" xmlns="" w="9525">
                     <a:solidFill>
                       <a:srgbClr val="000000"/>
                     </a:solidFill>
@@ -9791,7 +9791,7 @@
               </a:ln>
               <a:extLst>
                 <a:ext uri="{91240B29-F687-4f45-9708-019B960494DF}">
-                  <a14:hiddenLine xmlns="" xmlns:a14="http://schemas.microsoft.com/office/drawing/2010/main" w="9525">
+                  <a14:hiddenLine xmlns:a14="http://schemas.microsoft.com/office/drawing/2010/main" xmlns="" w="9525">
                     <a:solidFill>
                       <a:srgbClr val="000000"/>
                     </a:solidFill>
@@ -9901,7 +9901,7 @@
               </a:ln>
               <a:extLst>
                 <a:ext uri="{91240B29-F687-4f45-9708-019B960494DF}">
-                  <a14:hiddenLine xmlns="" xmlns:a14="http://schemas.microsoft.com/office/drawing/2010/main" w="9525">
+                  <a14:hiddenLine xmlns:a14="http://schemas.microsoft.com/office/drawing/2010/main" xmlns="" w="9525">
                     <a:solidFill>
                       <a:srgbClr val="000000"/>
                     </a:solidFill>
@@ -9985,7 +9985,7 @@
               </a:ln>
               <a:extLst>
                 <a:ext uri="{91240B29-F687-4f45-9708-019B960494DF}">
-                  <a14:hiddenLine xmlns="" xmlns:a14="http://schemas.microsoft.com/office/drawing/2010/main" w="9525">
+                  <a14:hiddenLine xmlns:a14="http://schemas.microsoft.com/office/drawing/2010/main" xmlns="" w="9525">
                     <a:solidFill>
                       <a:srgbClr val="000000"/>
                     </a:solidFill>
@@ -10047,7 +10047,7 @@
               </a:ln>
               <a:extLst>
                 <a:ext uri="{91240B29-F687-4f45-9708-019B960494DF}">
-                  <a14:hiddenLine xmlns="" xmlns:a14="http://schemas.microsoft.com/office/drawing/2010/main" w="9525">
+                  <a14:hiddenLine xmlns:a14="http://schemas.microsoft.com/office/drawing/2010/main" xmlns="" w="9525">
                     <a:solidFill>
                       <a:srgbClr val="000000"/>
                     </a:solidFill>
@@ -10109,7 +10109,7 @@
               </a:ln>
               <a:extLst>
                 <a:ext uri="{91240B29-F687-4f45-9708-019B960494DF}">
-                  <a14:hiddenLine xmlns="" xmlns:a14="http://schemas.microsoft.com/office/drawing/2010/main" w="9525">
+                  <a14:hiddenLine xmlns:a14="http://schemas.microsoft.com/office/drawing/2010/main" xmlns="" w="9525">
                     <a:solidFill>
                       <a:srgbClr val="000000"/>
                     </a:solidFill>
@@ -10199,7 +10199,7 @@
               </a:ln>
               <a:extLst>
                 <a:ext uri="{91240B29-F687-4f45-9708-019B960494DF}">
-                  <a14:hiddenLine xmlns="" xmlns:a14="http://schemas.microsoft.com/office/drawing/2010/main" w="9525">
+                  <a14:hiddenLine xmlns:a14="http://schemas.microsoft.com/office/drawing/2010/main" xmlns="" w="9525">
                     <a:solidFill>
                       <a:srgbClr val="000000"/>
                     </a:solidFill>
@@ -10233,7 +10233,7 @@
               </a:ln>
               <a:extLst>
                 <a:ext uri="{91240B29-F687-4f45-9708-019B960494DF}">
-                  <a14:hiddenLine xmlns="" xmlns:a14="http://schemas.microsoft.com/office/drawing/2010/main" w="9525">
+                  <a14:hiddenLine xmlns:a14="http://schemas.microsoft.com/office/drawing/2010/main" xmlns="" w="9525">
                     <a:solidFill>
                       <a:srgbClr val="000000"/>
                     </a:solidFill>
@@ -10298,7 +10298,7 @@
               </a:ln>
               <a:extLst>
                 <a:ext uri="{91240B29-F687-4f45-9708-019B960494DF}">
-                  <a14:hiddenLine xmlns="" xmlns:a14="http://schemas.microsoft.com/office/drawing/2010/main" w="9525">
+                  <a14:hiddenLine xmlns:a14="http://schemas.microsoft.com/office/drawing/2010/main" xmlns="" w="9525">
                     <a:solidFill>
                       <a:srgbClr val="000000"/>
                     </a:solidFill>
@@ -10388,7 +10388,7 @@
               </a:ln>
               <a:extLst>
                 <a:ext uri="{91240B29-F687-4f45-9708-019B960494DF}">
-                  <a14:hiddenLine xmlns="" xmlns:a14="http://schemas.microsoft.com/office/drawing/2010/main" w="9525">
+                  <a14:hiddenLine xmlns:a14="http://schemas.microsoft.com/office/drawing/2010/main" xmlns="" w="9525">
                     <a:solidFill>
                       <a:srgbClr val="000000"/>
                     </a:solidFill>
@@ -10450,7 +10450,7 @@
               </a:ln>
               <a:extLst>
                 <a:ext uri="{91240B29-F687-4f45-9708-019B960494DF}">
-                  <a14:hiddenLine xmlns="" xmlns:a14="http://schemas.microsoft.com/office/drawing/2010/main" w="9525">
+                  <a14:hiddenLine xmlns:a14="http://schemas.microsoft.com/office/drawing/2010/main" xmlns="" w="9525">
                     <a:solidFill>
                       <a:srgbClr val="000000"/>
                     </a:solidFill>
@@ -10540,7 +10540,7 @@
               </a:ln>
               <a:extLst>
                 <a:ext uri="{91240B29-F687-4f45-9708-019B960494DF}">
-                  <a14:hiddenLine xmlns="" xmlns:a14="http://schemas.microsoft.com/office/drawing/2010/main" w="9525">
+                  <a14:hiddenLine xmlns:a14="http://schemas.microsoft.com/office/drawing/2010/main" xmlns="" w="9525">
                     <a:solidFill>
                       <a:srgbClr val="000000"/>
                     </a:solidFill>
@@ -10605,7 +10605,7 @@
               </a:ln>
               <a:extLst>
                 <a:ext uri="{91240B29-F687-4f45-9708-019B960494DF}">
-                  <a14:hiddenLine xmlns="" xmlns:a14="http://schemas.microsoft.com/office/drawing/2010/main" w="9525">
+                  <a14:hiddenLine xmlns:a14="http://schemas.microsoft.com/office/drawing/2010/main" xmlns="" w="9525">
                     <a:solidFill>
                       <a:srgbClr val="000000"/>
                     </a:solidFill>
@@ -10667,7 +10667,7 @@
               </a:ln>
               <a:extLst>
                 <a:ext uri="{91240B29-F687-4f45-9708-019B960494DF}">
-                  <a14:hiddenLine xmlns="" xmlns:a14="http://schemas.microsoft.com/office/drawing/2010/main" w="9525">
+                  <a14:hiddenLine xmlns:a14="http://schemas.microsoft.com/office/drawing/2010/main" xmlns="" w="9525">
                     <a:solidFill>
                       <a:srgbClr val="000000"/>
                     </a:solidFill>
@@ -10757,7 +10757,7 @@
               </a:ln>
               <a:extLst>
                 <a:ext uri="{91240B29-F687-4f45-9708-019B960494DF}">
-                  <a14:hiddenLine xmlns="" xmlns:a14="http://schemas.microsoft.com/office/drawing/2010/main" w="9525">
+                  <a14:hiddenLine xmlns:a14="http://schemas.microsoft.com/office/drawing/2010/main" xmlns="" w="9525">
                     <a:solidFill>
                       <a:srgbClr val="000000"/>
                     </a:solidFill>
@@ -10847,7 +10847,7 @@
               </a:ln>
               <a:extLst>
                 <a:ext uri="{91240B29-F687-4f45-9708-019B960494DF}">
-                  <a14:hiddenLine xmlns="" xmlns:a14="http://schemas.microsoft.com/office/drawing/2010/main" w="9525">
+                  <a14:hiddenLine xmlns:a14="http://schemas.microsoft.com/office/drawing/2010/main" xmlns="" w="9525">
                     <a:solidFill>
                       <a:srgbClr val="000000"/>
                     </a:solidFill>
@@ -10912,7 +10912,7 @@
               </a:ln>
               <a:extLst>
                 <a:ext uri="{91240B29-F687-4f45-9708-019B960494DF}">
-                  <a14:hiddenLine xmlns="" xmlns:a14="http://schemas.microsoft.com/office/drawing/2010/main" w="9525">
+                  <a14:hiddenLine xmlns:a14="http://schemas.microsoft.com/office/drawing/2010/main" xmlns="" w="9525">
                     <a:solidFill>
                       <a:srgbClr val="000000"/>
                     </a:solidFill>
@@ -11032,7 +11032,7 @@
               </a:ln>
               <a:extLst>
                 <a:ext uri="{91240B29-F687-4f45-9708-019B960494DF}">
-                  <a14:hiddenLine xmlns="" xmlns:a14="http://schemas.microsoft.com/office/drawing/2010/main" w="9525">
+                  <a14:hiddenLine xmlns:a14="http://schemas.microsoft.com/office/drawing/2010/main" xmlns="" w="9525">
                     <a:solidFill>
                       <a:srgbClr val="000000"/>
                     </a:solidFill>
@@ -11113,7 +11113,7 @@
               </a:ln>
               <a:extLst>
                 <a:ext uri="{91240B29-F687-4f45-9708-019B960494DF}">
-                  <a14:hiddenLine xmlns="" xmlns:a14="http://schemas.microsoft.com/office/drawing/2010/main" w="9525">
+                  <a14:hiddenLine xmlns:a14="http://schemas.microsoft.com/office/drawing/2010/main" xmlns="" w="9525">
                     <a:solidFill>
                       <a:srgbClr val="000000"/>
                     </a:solidFill>
@@ -11228,7 +11228,7 @@
               </a:ln>
               <a:extLst>
                 <a:ext uri="{91240B29-F687-4f45-9708-019B960494DF}">
-                  <a14:hiddenLine xmlns="" xmlns:a14="http://schemas.microsoft.com/office/drawing/2010/main" w="9525">
+                  <a14:hiddenLine xmlns:a14="http://schemas.microsoft.com/office/drawing/2010/main" xmlns="" w="9525">
                     <a:solidFill>
                       <a:srgbClr val="000000"/>
                     </a:solidFill>
@@ -11318,7 +11318,7 @@
               </a:ln>
               <a:extLst>
                 <a:ext uri="{91240B29-F687-4f45-9708-019B960494DF}">
-                  <a14:hiddenLine xmlns="" xmlns:a14="http://schemas.microsoft.com/office/drawing/2010/main" w="9525">
+                  <a14:hiddenLine xmlns:a14="http://schemas.microsoft.com/office/drawing/2010/main" xmlns="" w="9525">
                     <a:solidFill>
                       <a:srgbClr val="000000"/>
                     </a:solidFill>
@@ -11383,7 +11383,7 @@
               </a:ln>
               <a:extLst>
                 <a:ext uri="{91240B29-F687-4f45-9708-019B960494DF}">
-                  <a14:hiddenLine xmlns="" xmlns:a14="http://schemas.microsoft.com/office/drawing/2010/main" w="9525">
+                  <a14:hiddenLine xmlns:a14="http://schemas.microsoft.com/office/drawing/2010/main" xmlns="" w="9525">
                     <a:solidFill>
                       <a:srgbClr val="000000"/>
                     </a:solidFill>
@@ -11473,7 +11473,7 @@
               </a:ln>
               <a:extLst>
                 <a:ext uri="{91240B29-F687-4f45-9708-019B960494DF}">
-                  <a14:hiddenLine xmlns="" xmlns:a14="http://schemas.microsoft.com/office/drawing/2010/main" w="9525">
+                  <a14:hiddenLine xmlns:a14="http://schemas.microsoft.com/office/drawing/2010/main" xmlns="" w="9525">
                     <a:solidFill>
                       <a:srgbClr val="000000"/>
                     </a:solidFill>
@@ -11541,7 +11541,7 @@
               </a:ln>
               <a:extLst>
                 <a:ext uri="{91240B29-F687-4f45-9708-019B960494DF}">
-                  <a14:hiddenLine xmlns="" xmlns:a14="http://schemas.microsoft.com/office/drawing/2010/main" w="9525">
+                  <a14:hiddenLine xmlns:a14="http://schemas.microsoft.com/office/drawing/2010/main" xmlns="" w="9525">
                     <a:solidFill>
                       <a:srgbClr val="000000"/>
                     </a:solidFill>
@@ -11631,7 +11631,7 @@
               </a:ln>
               <a:extLst>
                 <a:ext uri="{91240B29-F687-4f45-9708-019B960494DF}">
-                  <a14:hiddenLine xmlns="" xmlns:a14="http://schemas.microsoft.com/office/drawing/2010/main" w="9525">
+                  <a14:hiddenLine xmlns:a14="http://schemas.microsoft.com/office/drawing/2010/main" xmlns="" w="9525">
                     <a:solidFill>
                       <a:srgbClr val="000000"/>
                     </a:solidFill>
@@ -11699,7 +11699,7 @@
               </a:ln>
               <a:extLst>
                 <a:ext uri="{91240B29-F687-4f45-9708-019B960494DF}">
-                  <a14:hiddenLine xmlns="" xmlns:a14="http://schemas.microsoft.com/office/drawing/2010/main" w="9525">
+                  <a14:hiddenLine xmlns:a14="http://schemas.microsoft.com/office/drawing/2010/main" xmlns="" w="9525">
                     <a:solidFill>
                       <a:srgbClr val="000000"/>
                     </a:solidFill>
@@ -11789,7 +11789,7 @@
               </a:ln>
               <a:extLst>
                 <a:ext uri="{91240B29-F687-4f45-9708-019B960494DF}">
-                  <a14:hiddenLine xmlns="" xmlns:a14="http://schemas.microsoft.com/office/drawing/2010/main" w="9525">
+                  <a14:hiddenLine xmlns:a14="http://schemas.microsoft.com/office/drawing/2010/main" xmlns="" w="9525">
                     <a:solidFill>
                       <a:srgbClr val="000000"/>
                     </a:solidFill>
@@ -11823,7 +11823,7 @@
               </a:ln>
               <a:extLst>
                 <a:ext uri="{91240B29-F687-4f45-9708-019B960494DF}">
-                  <a14:hiddenLine xmlns="" xmlns:a14="http://schemas.microsoft.com/office/drawing/2010/main" w="9525">
+                  <a14:hiddenLine xmlns:a14="http://schemas.microsoft.com/office/drawing/2010/main" xmlns="" w="9525">
                     <a:solidFill>
                       <a:srgbClr val="000000"/>
                     </a:solidFill>
@@ -14035,11 +14035,7 @@
           <a:p>
             <a:r>
               <a:rPr lang="en-US" dirty="0" smtClean="0"/>
-              <a:t>Positions</a:t>
-            </a:r>
-            <a:r>
-              <a:rPr lang="en-US" dirty="0" smtClean="0"/>
-              <a:t>, velocities, and accelerations are all in terms of a state vector,</a:t>
+              <a:t>Positions, velocities, and accelerations are all in terms of a state vector,</a:t>
             </a:r>
             <a:r>
               <a:rPr lang="en-US" i="1" dirty="0" smtClean="0"/>
@@ -19190,8 +19186,8 @@
           </a:p>
         </p:txBody>
       </p:sp>
-      <mc:AlternateContent xmlns:mc="http://schemas.openxmlformats.org/markup-compatibility/2006">
-        <mc:Choice xmlns:a14="http://schemas.microsoft.com/office/drawing/2010/main" Requires="a14">
+      <mc:AlternateContent xmlns:mc="http://schemas.openxmlformats.org/markup-compatibility/2006" xmlns:a14="http://schemas.microsoft.com/office/drawing/2010/main">
+        <mc:Choice Requires="a14">
           <p:sp>
             <p:nvSpPr>
               <p:cNvPr id="3" name="Content Placeholder 2"/>
@@ -19216,15 +19212,7 @@
               <a:p>
                 <a:r>
                   <a:rPr lang="en-US" dirty="0" smtClean="0"/>
-                  <a:t>Calculated using </a:t>
-                </a:r>
-                <a:r>
-                  <a:rPr lang="en-US" dirty="0" smtClean="0"/>
-                  <a:t>conservation </a:t>
-                </a:r>
-                <a:r>
-                  <a:rPr lang="en-US" dirty="0" smtClean="0"/>
-                  <a:t>of momentum on leg</a:t>
+                  <a:t>Calculated using conservation of momentum on leg</a:t>
                 </a:r>
               </a:p>
               <a:p>
@@ -19519,7 +19507,7 @@
             </p:txBody>
           </p:sp>
         </mc:Choice>
-        <mc:Fallback>
+        <mc:Fallback xmlns="">
           <p:sp>
             <p:nvSpPr>
               <p:cNvPr id="3" name="Content Placeholder 2"/>
@@ -24687,36 +24675,19 @@
               <a:t>Control Algorithm For One </a:t>
             </a:r>
             <a:r>
-              <a:rPr lang="en-US" dirty="0" err="1" smtClean="0"/>
-              <a:t>LEg</a:t>
+              <a:rPr lang="en-US" dirty="0" smtClean="0"/>
+              <a:t>Leg</a:t>
             </a:r>
             <a:endParaRPr lang="en-US" dirty="0"/>
-          </a:p>
-        </p:txBody>
-      </p:sp>
-      <p:sp>
-        <p:nvSpPr>
-          <p:cNvPr id="3" name="Content Placeholder 2"/>
-          <p:cNvSpPr>
-            <a:spLocks noGrp="1"/>
-          </p:cNvSpPr>
-          <p:nvPr>
-            <p:ph idx="1"/>
-          </p:nvPr>
-        </p:nvSpPr>
-        <p:spPr/>
-        <p:txBody>
-          <a:bodyPr/>
-          <a:lstStyle/>
-          <a:p>
-            <a:endParaRPr lang="en-US"/>
           </a:p>
         </p:txBody>
       </p:sp>
       <p:pic>
         <p:nvPicPr>
-          <p:cNvPr id="5" name="Picture 4" descr="D:\MyDocs\Documents\GitHub\AgileRoboticControls\System Modelling\Control\Control - Implementation.png"/>
-          <p:cNvPicPr/>
+          <p:cNvPr id="6" name="Picture 5"/>
+          <p:cNvPicPr>
+            <a:picLocks noChangeAspect="1"/>
+          </p:cNvPicPr>
           <p:nvPr/>
         </p:nvPicPr>
         <p:blipFill>
@@ -24727,23 +24698,18 @@
               </a:ext>
             </a:extLst>
           </a:blip>
-          <a:srcRect/>
           <a:stretch>
             <a:fillRect/>
           </a:stretch>
         </p:blipFill>
-        <p:spPr bwMode="auto">
+        <p:spPr>
           <a:xfrm>
-            <a:off x="390898" y="2249487"/>
-            <a:ext cx="11407025" cy="2328263"/>
+            <a:off x="318463" y="2948917"/>
+            <a:ext cx="11601656" cy="2563363"/>
           </a:xfrm>
           <a:prstGeom prst="rect">
             <a:avLst/>
           </a:prstGeom>
-          <a:noFill/>
-          <a:ln>
-            <a:noFill/>
-          </a:ln>
         </p:spPr>
       </p:pic>
     </p:spTree>

</xml_diff>

<commit_message>
Updated Pneumatic Slides in presentation
</commit_message>
<xml_diff>
--- a/Documentation/Presentation/Design Presentation/Design Presentation.pptx
+++ b/Documentation/Presentation/Design Presentation/Design Presentation.pptx
@@ -142,7 +142,7 @@
   </p:defaultTextStyle>
   <p:extLst>
     <p:ext uri="{EFAFB233-063F-42B5-8137-9DF3F51BA10A}">
-      <p15:sldGuideLst xmlns:p15="http://schemas.microsoft.com/office/powerpoint/2012/main"/>
+      <p15:sldGuideLst xmlns:p15="http://schemas.microsoft.com/office/powerpoint/2012/main" xmlns=""/>
     </p:ext>
   </p:extLst>
 </p:presentation>
@@ -204,8 +204,8 @@
           </a:prstGeom>
           <a:noFill/>
           <a:extLst>
-            <a:ext uri="{909E8E84-426E-40dd-AFC4-6F175D3DCCD1}">
-              <a14:hiddenFill xmlns="" xmlns:a14="http://schemas.microsoft.com/office/drawing/2010/main">
+            <a:ext uri="{909E8E84-426E-40DD-AFC4-6F175D3DCCD1}">
+              <a14:hiddenFill xmlns:a14="http://schemas.microsoft.com/office/drawing/2010/main">
                 <a:solidFill>
                   <a:srgbClr val="FFFFFF"/>
                 </a:solidFill>
@@ -263,8 +263,8 @@
               <a:noFill/>
             </a:ln>
             <a:extLst>
-              <a:ext uri="{91240B29-F687-4f45-9708-019B960494DF}">
-                <a14:hiddenLine xmlns="" xmlns:a14="http://schemas.microsoft.com/office/drawing/2010/main" w="9525">
+              <a:ext uri="{91240B29-F687-4F45-9708-019B960494DF}">
+                <a14:hiddenLine xmlns:a14="http://schemas.microsoft.com/office/drawing/2010/main" w="9525">
                   <a:solidFill>
                     <a:srgbClr val="000000"/>
                   </a:solidFill>
@@ -353,8 +353,8 @@
               <a:noFill/>
             </a:ln>
             <a:extLst>
-              <a:ext uri="{91240B29-F687-4f45-9708-019B960494DF}">
-                <a14:hiddenLine xmlns="" xmlns:a14="http://schemas.microsoft.com/office/drawing/2010/main" w="9525">
+              <a:ext uri="{91240B29-F687-4F45-9708-019B960494DF}">
+                <a14:hiddenLine xmlns:a14="http://schemas.microsoft.com/office/drawing/2010/main" w="9525">
                   <a:solidFill>
                     <a:srgbClr val="000000"/>
                   </a:solidFill>
@@ -443,8 +443,8 @@
               <a:noFill/>
             </a:ln>
             <a:extLst>
-              <a:ext uri="{91240B29-F687-4f45-9708-019B960494DF}">
-                <a14:hiddenLine xmlns="" xmlns:a14="http://schemas.microsoft.com/office/drawing/2010/main" w="9525">
+              <a:ext uri="{91240B29-F687-4F45-9708-019B960494DF}">
+                <a14:hiddenLine xmlns:a14="http://schemas.microsoft.com/office/drawing/2010/main" w="9525">
                   <a:solidFill>
                     <a:srgbClr val="000000"/>
                   </a:solidFill>
@@ -477,8 +477,8 @@
               <a:noFill/>
             </a:ln>
             <a:extLst>
-              <a:ext uri="{91240B29-F687-4f45-9708-019B960494DF}">
-                <a14:hiddenLine xmlns="" xmlns:a14="http://schemas.microsoft.com/office/drawing/2010/main" w="9525">
+              <a:ext uri="{91240B29-F687-4F45-9708-019B960494DF}">
+                <a14:hiddenLine xmlns:a14="http://schemas.microsoft.com/office/drawing/2010/main" w="9525">
                   <a:solidFill>
                     <a:srgbClr val="000000"/>
                   </a:solidFill>
@@ -567,8 +567,8 @@
               <a:noFill/>
             </a:ln>
             <a:extLst>
-              <a:ext uri="{91240B29-F687-4f45-9708-019B960494DF}">
-                <a14:hiddenLine xmlns="" xmlns:a14="http://schemas.microsoft.com/office/drawing/2010/main" w="9525">
+              <a:ext uri="{91240B29-F687-4F45-9708-019B960494DF}">
+                <a14:hiddenLine xmlns:a14="http://schemas.microsoft.com/office/drawing/2010/main" w="9525">
                   <a:solidFill>
                     <a:srgbClr val="000000"/>
                   </a:solidFill>
@@ -629,8 +629,8 @@
               <a:noFill/>
             </a:ln>
             <a:extLst>
-              <a:ext uri="{91240B29-F687-4f45-9708-019B960494DF}">
-                <a14:hiddenLine xmlns="" xmlns:a14="http://schemas.microsoft.com/office/drawing/2010/main" w="9525">
+              <a:ext uri="{91240B29-F687-4F45-9708-019B960494DF}">
+                <a14:hiddenLine xmlns:a14="http://schemas.microsoft.com/office/drawing/2010/main" w="9525">
                   <a:solidFill>
                     <a:srgbClr val="000000"/>
                   </a:solidFill>
@@ -691,8 +691,8 @@
               <a:noFill/>
             </a:ln>
             <a:extLst>
-              <a:ext uri="{91240B29-F687-4f45-9708-019B960494DF}">
-                <a14:hiddenLine xmlns="" xmlns:a14="http://schemas.microsoft.com/office/drawing/2010/main" w="9525">
+              <a:ext uri="{91240B29-F687-4F45-9708-019B960494DF}">
+                <a14:hiddenLine xmlns:a14="http://schemas.microsoft.com/office/drawing/2010/main" w="9525">
                   <a:solidFill>
                     <a:srgbClr val="000000"/>
                   </a:solidFill>
@@ -781,8 +781,8 @@
               <a:noFill/>
             </a:ln>
             <a:extLst>
-              <a:ext uri="{91240B29-F687-4f45-9708-019B960494DF}">
-                <a14:hiddenLine xmlns="" xmlns:a14="http://schemas.microsoft.com/office/drawing/2010/main" w="9525">
+              <a:ext uri="{91240B29-F687-4F45-9708-019B960494DF}">
+                <a14:hiddenLine xmlns:a14="http://schemas.microsoft.com/office/drawing/2010/main" w="9525">
                   <a:solidFill>
                     <a:srgbClr val="000000"/>
                   </a:solidFill>
@@ -843,8 +843,8 @@
               <a:noFill/>
             </a:ln>
             <a:extLst>
-              <a:ext uri="{91240B29-F687-4f45-9708-019B960494DF}">
-                <a14:hiddenLine xmlns="" xmlns:a14="http://schemas.microsoft.com/office/drawing/2010/main" w="9525">
+              <a:ext uri="{91240B29-F687-4F45-9708-019B960494DF}">
+                <a14:hiddenLine xmlns:a14="http://schemas.microsoft.com/office/drawing/2010/main" w="9525">
                   <a:solidFill>
                     <a:srgbClr val="000000"/>
                   </a:solidFill>
@@ -905,8 +905,8 @@
               <a:noFill/>
             </a:ln>
             <a:extLst>
-              <a:ext uri="{91240B29-F687-4f45-9708-019B960494DF}">
-                <a14:hiddenLine xmlns="" xmlns:a14="http://schemas.microsoft.com/office/drawing/2010/main" w="9525">
+              <a:ext uri="{91240B29-F687-4F45-9708-019B960494DF}">
+                <a14:hiddenLine xmlns:a14="http://schemas.microsoft.com/office/drawing/2010/main" w="9525">
                   <a:solidFill>
                     <a:srgbClr val="000000"/>
                   </a:solidFill>
@@ -995,8 +995,8 @@
               <a:noFill/>
             </a:ln>
             <a:extLst>
-              <a:ext uri="{91240B29-F687-4f45-9708-019B960494DF}">
-                <a14:hiddenLine xmlns="" xmlns:a14="http://schemas.microsoft.com/office/drawing/2010/main" w="9525">
+              <a:ext uri="{91240B29-F687-4F45-9708-019B960494DF}">
+                <a14:hiddenLine xmlns:a14="http://schemas.microsoft.com/office/drawing/2010/main" w="9525">
                   <a:solidFill>
                     <a:srgbClr val="000000"/>
                   </a:solidFill>
@@ -1085,8 +1085,8 @@
               <a:noFill/>
             </a:ln>
             <a:extLst>
-              <a:ext uri="{91240B29-F687-4f45-9708-019B960494DF}">
-                <a14:hiddenLine xmlns="" xmlns:a14="http://schemas.microsoft.com/office/drawing/2010/main" w="9525">
+              <a:ext uri="{91240B29-F687-4F45-9708-019B960494DF}">
+                <a14:hiddenLine xmlns:a14="http://schemas.microsoft.com/office/drawing/2010/main" w="9525">
                   <a:solidFill>
                     <a:srgbClr val="000000"/>
                   </a:solidFill>
@@ -1147,8 +1147,8 @@
               <a:noFill/>
             </a:ln>
             <a:extLst>
-              <a:ext uri="{91240B29-F687-4f45-9708-019B960494DF}">
-                <a14:hiddenLine xmlns="" xmlns:a14="http://schemas.microsoft.com/office/drawing/2010/main" w="9525">
+              <a:ext uri="{91240B29-F687-4F45-9708-019B960494DF}">
+                <a14:hiddenLine xmlns:a14="http://schemas.microsoft.com/office/drawing/2010/main" w="9525">
                   <a:solidFill>
                     <a:srgbClr val="000000"/>
                   </a:solidFill>
@@ -1257,8 +1257,8 @@
               <a:noFill/>
             </a:ln>
             <a:extLst>
-              <a:ext uri="{91240B29-F687-4f45-9708-019B960494DF}">
-                <a14:hiddenLine xmlns="" xmlns:a14="http://schemas.microsoft.com/office/drawing/2010/main" w="9525">
+              <a:ext uri="{91240B29-F687-4F45-9708-019B960494DF}">
+                <a14:hiddenLine xmlns:a14="http://schemas.microsoft.com/office/drawing/2010/main" w="9525">
                   <a:solidFill>
                     <a:srgbClr val="000000"/>
                   </a:solidFill>
@@ -1319,8 +1319,8 @@
               <a:noFill/>
             </a:ln>
             <a:extLst>
-              <a:ext uri="{91240B29-F687-4f45-9708-019B960494DF}">
-                <a14:hiddenLine xmlns="" xmlns:a14="http://schemas.microsoft.com/office/drawing/2010/main" w="9525">
+              <a:ext uri="{91240B29-F687-4F45-9708-019B960494DF}">
+                <a14:hiddenLine xmlns:a14="http://schemas.microsoft.com/office/drawing/2010/main" w="9525">
                   <a:solidFill>
                     <a:srgbClr val="000000"/>
                   </a:solidFill>
@@ -1409,8 +1409,8 @@
               <a:noFill/>
             </a:ln>
             <a:extLst>
-              <a:ext uri="{91240B29-F687-4f45-9708-019B960494DF}">
-                <a14:hiddenLine xmlns="" xmlns:a14="http://schemas.microsoft.com/office/drawing/2010/main" w="9525">
+              <a:ext uri="{91240B29-F687-4F45-9708-019B960494DF}">
+                <a14:hiddenLine xmlns:a14="http://schemas.microsoft.com/office/drawing/2010/main" w="9525">
                   <a:solidFill>
                     <a:srgbClr val="000000"/>
                   </a:solidFill>
@@ -1499,8 +1499,8 @@
               <a:noFill/>
             </a:ln>
             <a:extLst>
-              <a:ext uri="{91240B29-F687-4f45-9708-019B960494DF}">
-                <a14:hiddenLine xmlns="" xmlns:a14="http://schemas.microsoft.com/office/drawing/2010/main" w="9525">
+              <a:ext uri="{91240B29-F687-4F45-9708-019B960494DF}">
+                <a14:hiddenLine xmlns:a14="http://schemas.microsoft.com/office/drawing/2010/main" w="9525">
                   <a:solidFill>
                     <a:srgbClr val="000000"/>
                   </a:solidFill>
@@ -1561,8 +1561,8 @@
               <a:noFill/>
             </a:ln>
             <a:extLst>
-              <a:ext uri="{91240B29-F687-4f45-9708-019B960494DF}">
-                <a14:hiddenLine xmlns="" xmlns:a14="http://schemas.microsoft.com/office/drawing/2010/main" w="9525">
+              <a:ext uri="{91240B29-F687-4F45-9708-019B960494DF}">
+                <a14:hiddenLine xmlns:a14="http://schemas.microsoft.com/office/drawing/2010/main" w="9525">
                   <a:solidFill>
                     <a:srgbClr val="000000"/>
                   </a:solidFill>
@@ -1651,8 +1651,8 @@
               <a:noFill/>
             </a:ln>
             <a:extLst>
-              <a:ext uri="{91240B29-F687-4f45-9708-019B960494DF}">
-                <a14:hiddenLine xmlns="" xmlns:a14="http://schemas.microsoft.com/office/drawing/2010/main" w="9525">
+              <a:ext uri="{91240B29-F687-4F45-9708-019B960494DF}">
+                <a14:hiddenLine xmlns:a14="http://schemas.microsoft.com/office/drawing/2010/main" w="9525">
                   <a:solidFill>
                     <a:srgbClr val="000000"/>
                   </a:solidFill>
@@ -1741,8 +1741,8 @@
               <a:noFill/>
             </a:ln>
             <a:extLst>
-              <a:ext uri="{91240B29-F687-4f45-9708-019B960494DF}">
-                <a14:hiddenLine xmlns="" xmlns:a14="http://schemas.microsoft.com/office/drawing/2010/main" w="9525">
+              <a:ext uri="{91240B29-F687-4F45-9708-019B960494DF}">
+                <a14:hiddenLine xmlns:a14="http://schemas.microsoft.com/office/drawing/2010/main" w="9525">
                   <a:solidFill>
                     <a:srgbClr val="000000"/>
                   </a:solidFill>
@@ -1797,8 +1797,8 @@
               <a:noFill/>
             </a:ln>
             <a:extLst>
-              <a:ext uri="{91240B29-F687-4f45-9708-019B960494DF}">
-                <a14:hiddenLine xmlns="" xmlns:a14="http://schemas.microsoft.com/office/drawing/2010/main" w="9525">
+              <a:ext uri="{91240B29-F687-4F45-9708-019B960494DF}">
+                <a14:hiddenLine xmlns:a14="http://schemas.microsoft.com/office/drawing/2010/main" w="9525">
                   <a:solidFill>
                     <a:srgbClr val="000000"/>
                   </a:solidFill>
@@ -1887,8 +1887,8 @@
               <a:noFill/>
             </a:ln>
             <a:extLst>
-              <a:ext uri="{91240B29-F687-4f45-9708-019B960494DF}">
-                <a14:hiddenLine xmlns="" xmlns:a14="http://schemas.microsoft.com/office/drawing/2010/main" w="9525">
+              <a:ext uri="{91240B29-F687-4F45-9708-019B960494DF}">
+                <a14:hiddenLine xmlns:a14="http://schemas.microsoft.com/office/drawing/2010/main" w="9525">
                   <a:solidFill>
                     <a:srgbClr val="000000"/>
                   </a:solidFill>
@@ -1943,8 +1943,8 @@
               <a:noFill/>
             </a:ln>
             <a:extLst>
-              <a:ext uri="{91240B29-F687-4f45-9708-019B960494DF}">
-                <a14:hiddenLine xmlns="" xmlns:a14="http://schemas.microsoft.com/office/drawing/2010/main" w="9525">
+              <a:ext uri="{91240B29-F687-4F45-9708-019B960494DF}">
+                <a14:hiddenLine xmlns:a14="http://schemas.microsoft.com/office/drawing/2010/main" w="9525">
                   <a:solidFill>
                     <a:srgbClr val="000000"/>
                   </a:solidFill>
@@ -2033,8 +2033,8 @@
               <a:noFill/>
             </a:ln>
             <a:extLst>
-              <a:ext uri="{91240B29-F687-4f45-9708-019B960494DF}">
-                <a14:hiddenLine xmlns="" xmlns:a14="http://schemas.microsoft.com/office/drawing/2010/main" w="9525">
+              <a:ext uri="{91240B29-F687-4F45-9708-019B960494DF}">
+                <a14:hiddenLine xmlns:a14="http://schemas.microsoft.com/office/drawing/2010/main" w="9525">
                   <a:solidFill>
                     <a:srgbClr val="000000"/>
                   </a:solidFill>
@@ -2101,8 +2101,8 @@
               <a:noFill/>
             </a:ln>
             <a:extLst>
-              <a:ext uri="{91240B29-F687-4f45-9708-019B960494DF}">
-                <a14:hiddenLine xmlns="" xmlns:a14="http://schemas.microsoft.com/office/drawing/2010/main" w="9525">
+              <a:ext uri="{91240B29-F687-4F45-9708-019B960494DF}">
+                <a14:hiddenLine xmlns:a14="http://schemas.microsoft.com/office/drawing/2010/main" w="9525">
                   <a:solidFill>
                     <a:srgbClr val="000000"/>
                   </a:solidFill>
@@ -2191,8 +2191,8 @@
               <a:noFill/>
             </a:ln>
             <a:extLst>
-              <a:ext uri="{91240B29-F687-4f45-9708-019B960494DF}">
-                <a14:hiddenLine xmlns="" xmlns:a14="http://schemas.microsoft.com/office/drawing/2010/main" w="9525">
+              <a:ext uri="{91240B29-F687-4F45-9708-019B960494DF}">
+                <a14:hiddenLine xmlns:a14="http://schemas.microsoft.com/office/drawing/2010/main" w="9525">
                   <a:solidFill>
                     <a:srgbClr val="000000"/>
                   </a:solidFill>
@@ -2259,8 +2259,8 @@
               <a:noFill/>
             </a:ln>
             <a:extLst>
-              <a:ext uri="{91240B29-F687-4f45-9708-019B960494DF}">
-                <a14:hiddenLine xmlns="" xmlns:a14="http://schemas.microsoft.com/office/drawing/2010/main" w="9525">
+              <a:ext uri="{91240B29-F687-4F45-9708-019B960494DF}">
+                <a14:hiddenLine xmlns:a14="http://schemas.microsoft.com/office/drawing/2010/main" w="9525">
                   <a:solidFill>
                     <a:srgbClr val="000000"/>
                   </a:solidFill>
@@ -2349,8 +2349,8 @@
               <a:noFill/>
             </a:ln>
             <a:extLst>
-              <a:ext uri="{91240B29-F687-4f45-9708-019B960494DF}">
-                <a14:hiddenLine xmlns="" xmlns:a14="http://schemas.microsoft.com/office/drawing/2010/main" w="9525">
+              <a:ext uri="{91240B29-F687-4F45-9708-019B960494DF}">
+                <a14:hiddenLine xmlns:a14="http://schemas.microsoft.com/office/drawing/2010/main" w="9525">
                   <a:solidFill>
                     <a:srgbClr val="000000"/>
                   </a:solidFill>
@@ -2383,8 +2383,8 @@
               <a:noFill/>
             </a:ln>
             <a:extLst>
-              <a:ext uri="{91240B29-F687-4f45-9708-019B960494DF}">
-                <a14:hiddenLine xmlns="" xmlns:a14="http://schemas.microsoft.com/office/drawing/2010/main" w="9525">
+              <a:ext uri="{91240B29-F687-4F45-9708-019B960494DF}">
+                <a14:hiddenLine xmlns:a14="http://schemas.microsoft.com/office/drawing/2010/main" w="9525">
                   <a:solidFill>
                     <a:srgbClr val="000000"/>
                   </a:solidFill>
@@ -2473,8 +2473,8 @@
               <a:noFill/>
             </a:ln>
             <a:extLst>
-              <a:ext uri="{91240B29-F687-4f45-9708-019B960494DF}">
-                <a14:hiddenLine xmlns="" xmlns:a14="http://schemas.microsoft.com/office/drawing/2010/main" w="9525">
+              <a:ext uri="{91240B29-F687-4F45-9708-019B960494DF}">
+                <a14:hiddenLine xmlns:a14="http://schemas.microsoft.com/office/drawing/2010/main" w="9525">
                   <a:solidFill>
                     <a:srgbClr val="000000"/>
                   </a:solidFill>
@@ -2535,8 +2535,8 @@
               <a:noFill/>
             </a:ln>
             <a:extLst>
-              <a:ext uri="{91240B29-F687-4f45-9708-019B960494DF}">
-                <a14:hiddenLine xmlns="" xmlns:a14="http://schemas.microsoft.com/office/drawing/2010/main" w="9525">
+              <a:ext uri="{91240B29-F687-4F45-9708-019B960494DF}">
+                <a14:hiddenLine xmlns:a14="http://schemas.microsoft.com/office/drawing/2010/main" w="9525">
                   <a:solidFill>
                     <a:srgbClr val="000000"/>
                   </a:solidFill>
@@ -2597,8 +2597,8 @@
               <a:noFill/>
             </a:ln>
             <a:extLst>
-              <a:ext uri="{91240B29-F687-4f45-9708-019B960494DF}">
-                <a14:hiddenLine xmlns="" xmlns:a14="http://schemas.microsoft.com/office/drawing/2010/main" w="9525">
+              <a:ext uri="{91240B29-F687-4F45-9708-019B960494DF}">
+                <a14:hiddenLine xmlns:a14="http://schemas.microsoft.com/office/drawing/2010/main" w="9525">
                   <a:solidFill>
                     <a:srgbClr val="000000"/>
                   </a:solidFill>
@@ -2687,8 +2687,8 @@
               <a:noFill/>
             </a:ln>
             <a:extLst>
-              <a:ext uri="{91240B29-F687-4f45-9708-019B960494DF}">
-                <a14:hiddenLine xmlns="" xmlns:a14="http://schemas.microsoft.com/office/drawing/2010/main" w="9525">
+              <a:ext uri="{91240B29-F687-4F45-9708-019B960494DF}">
+                <a14:hiddenLine xmlns:a14="http://schemas.microsoft.com/office/drawing/2010/main" w="9525">
                   <a:solidFill>
                     <a:srgbClr val="000000"/>
                   </a:solidFill>
@@ -2755,8 +2755,8 @@
               <a:noFill/>
             </a:ln>
             <a:extLst>
-              <a:ext uri="{91240B29-F687-4f45-9708-019B960494DF}">
-                <a14:hiddenLine xmlns="" xmlns:a14="http://schemas.microsoft.com/office/drawing/2010/main" w="9525">
+              <a:ext uri="{91240B29-F687-4F45-9708-019B960494DF}">
+                <a14:hiddenLine xmlns:a14="http://schemas.microsoft.com/office/drawing/2010/main" w="9525">
                   <a:solidFill>
                     <a:srgbClr val="000000"/>
                   </a:solidFill>
@@ -2817,8 +2817,8 @@
               <a:noFill/>
             </a:ln>
             <a:extLst>
-              <a:ext uri="{91240B29-F687-4f45-9708-019B960494DF}">
-                <a14:hiddenLine xmlns="" xmlns:a14="http://schemas.microsoft.com/office/drawing/2010/main" w="9525">
+              <a:ext uri="{91240B29-F687-4F45-9708-019B960494DF}">
+                <a14:hiddenLine xmlns:a14="http://schemas.microsoft.com/office/drawing/2010/main" w="9525">
                   <a:solidFill>
                     <a:srgbClr val="000000"/>
                   </a:solidFill>
@@ -2907,8 +2907,8 @@
               <a:noFill/>
             </a:ln>
             <a:extLst>
-              <a:ext uri="{91240B29-F687-4f45-9708-019B960494DF}">
-                <a14:hiddenLine xmlns="" xmlns:a14="http://schemas.microsoft.com/office/drawing/2010/main" w="9525">
+              <a:ext uri="{91240B29-F687-4F45-9708-019B960494DF}">
+                <a14:hiddenLine xmlns:a14="http://schemas.microsoft.com/office/drawing/2010/main" w="9525">
                   <a:solidFill>
                     <a:srgbClr val="000000"/>
                   </a:solidFill>
@@ -2969,8 +2969,8 @@
               <a:noFill/>
             </a:ln>
             <a:extLst>
-              <a:ext uri="{91240B29-F687-4f45-9708-019B960494DF}">
-                <a14:hiddenLine xmlns="" xmlns:a14="http://schemas.microsoft.com/office/drawing/2010/main" w="9525">
+              <a:ext uri="{91240B29-F687-4F45-9708-019B960494DF}">
+                <a14:hiddenLine xmlns:a14="http://schemas.microsoft.com/office/drawing/2010/main" w="9525">
                   <a:solidFill>
                     <a:srgbClr val="000000"/>
                   </a:solidFill>
@@ -3059,8 +3059,8 @@
               <a:noFill/>
             </a:ln>
             <a:extLst>
-              <a:ext uri="{91240B29-F687-4f45-9708-019B960494DF}">
-                <a14:hiddenLine xmlns="" xmlns:a14="http://schemas.microsoft.com/office/drawing/2010/main" w="9525">
+              <a:ext uri="{91240B29-F687-4F45-9708-019B960494DF}">
+                <a14:hiddenLine xmlns:a14="http://schemas.microsoft.com/office/drawing/2010/main" w="9525">
                   <a:solidFill>
                     <a:srgbClr val="000000"/>
                   </a:solidFill>
@@ -3121,8 +3121,8 @@
               <a:noFill/>
             </a:ln>
             <a:extLst>
-              <a:ext uri="{91240B29-F687-4f45-9708-019B960494DF}">
-                <a14:hiddenLine xmlns="" xmlns:a14="http://schemas.microsoft.com/office/drawing/2010/main" w="9525">
+              <a:ext uri="{91240B29-F687-4F45-9708-019B960494DF}">
+                <a14:hiddenLine xmlns:a14="http://schemas.microsoft.com/office/drawing/2010/main" w="9525">
                   <a:solidFill>
                     <a:srgbClr val="000000"/>
                   </a:solidFill>
@@ -3211,8 +3211,8 @@
               <a:noFill/>
             </a:ln>
             <a:extLst>
-              <a:ext uri="{91240B29-F687-4f45-9708-019B960494DF}">
-                <a14:hiddenLine xmlns="" xmlns:a14="http://schemas.microsoft.com/office/drawing/2010/main" w="9525">
+              <a:ext uri="{91240B29-F687-4F45-9708-019B960494DF}">
+                <a14:hiddenLine xmlns:a14="http://schemas.microsoft.com/office/drawing/2010/main" w="9525">
                   <a:solidFill>
                     <a:srgbClr val="000000"/>
                   </a:solidFill>
@@ -3245,8 +3245,8 @@
               <a:noFill/>
             </a:ln>
             <a:extLst>
-              <a:ext uri="{91240B29-F687-4f45-9708-019B960494DF}">
-                <a14:hiddenLine xmlns="" xmlns:a14="http://schemas.microsoft.com/office/drawing/2010/main" w="9525">
+              <a:ext uri="{91240B29-F687-4F45-9708-019B960494DF}">
+                <a14:hiddenLine xmlns:a14="http://schemas.microsoft.com/office/drawing/2010/main" w="9525">
                   <a:solidFill>
                     <a:srgbClr val="000000"/>
                   </a:solidFill>
@@ -3310,8 +3310,8 @@
               <a:noFill/>
             </a:ln>
             <a:extLst>
-              <a:ext uri="{91240B29-F687-4f45-9708-019B960494DF}">
-                <a14:hiddenLine xmlns="" xmlns:a14="http://schemas.microsoft.com/office/drawing/2010/main" w="9525">
+              <a:ext uri="{91240B29-F687-4F45-9708-019B960494DF}">
+                <a14:hiddenLine xmlns:a14="http://schemas.microsoft.com/office/drawing/2010/main" w="9525">
                   <a:solidFill>
                     <a:srgbClr val="000000"/>
                   </a:solidFill>
@@ -3400,8 +3400,8 @@
               <a:noFill/>
             </a:ln>
             <a:extLst>
-              <a:ext uri="{91240B29-F687-4f45-9708-019B960494DF}">
-                <a14:hiddenLine xmlns="" xmlns:a14="http://schemas.microsoft.com/office/drawing/2010/main" w="9525">
+              <a:ext uri="{91240B29-F687-4F45-9708-019B960494DF}">
+                <a14:hiddenLine xmlns:a14="http://schemas.microsoft.com/office/drawing/2010/main" w="9525">
                   <a:solidFill>
                     <a:srgbClr val="000000"/>
                   </a:solidFill>
@@ -3462,8 +3462,8 @@
               <a:noFill/>
             </a:ln>
             <a:extLst>
-              <a:ext uri="{91240B29-F687-4f45-9708-019B960494DF}">
-                <a14:hiddenLine xmlns="" xmlns:a14="http://schemas.microsoft.com/office/drawing/2010/main" w="9525">
+              <a:ext uri="{91240B29-F687-4F45-9708-019B960494DF}">
+                <a14:hiddenLine xmlns:a14="http://schemas.microsoft.com/office/drawing/2010/main" w="9525">
                   <a:solidFill>
                     <a:srgbClr val="000000"/>
                   </a:solidFill>
@@ -3552,8 +3552,8 @@
               <a:noFill/>
             </a:ln>
             <a:extLst>
-              <a:ext uri="{91240B29-F687-4f45-9708-019B960494DF}">
-                <a14:hiddenLine xmlns="" xmlns:a14="http://schemas.microsoft.com/office/drawing/2010/main" w="9525">
+              <a:ext uri="{91240B29-F687-4F45-9708-019B960494DF}">
+                <a14:hiddenLine xmlns:a14="http://schemas.microsoft.com/office/drawing/2010/main" w="9525">
                   <a:solidFill>
                     <a:srgbClr val="000000"/>
                   </a:solidFill>
@@ -3642,8 +3642,8 @@
               <a:noFill/>
             </a:ln>
             <a:extLst>
-              <a:ext uri="{91240B29-F687-4f45-9708-019B960494DF}">
-                <a14:hiddenLine xmlns="" xmlns:a14="http://schemas.microsoft.com/office/drawing/2010/main" w="9525">
+              <a:ext uri="{91240B29-F687-4F45-9708-019B960494DF}">
+                <a14:hiddenLine xmlns:a14="http://schemas.microsoft.com/office/drawing/2010/main" w="9525">
                   <a:solidFill>
                     <a:srgbClr val="000000"/>
                   </a:solidFill>
@@ -3707,8 +3707,8 @@
               <a:noFill/>
             </a:ln>
             <a:extLst>
-              <a:ext uri="{91240B29-F687-4f45-9708-019B960494DF}">
-                <a14:hiddenLine xmlns="" xmlns:a14="http://schemas.microsoft.com/office/drawing/2010/main" w="9525">
+              <a:ext uri="{91240B29-F687-4F45-9708-019B960494DF}">
+                <a14:hiddenLine xmlns:a14="http://schemas.microsoft.com/office/drawing/2010/main" w="9525">
                   <a:solidFill>
                     <a:srgbClr val="000000"/>
                   </a:solidFill>
@@ -3769,8 +3769,8 @@
               <a:noFill/>
             </a:ln>
             <a:extLst>
-              <a:ext uri="{91240B29-F687-4f45-9708-019B960494DF}">
-                <a14:hiddenLine xmlns="" xmlns:a14="http://schemas.microsoft.com/office/drawing/2010/main" w="9525">
+              <a:ext uri="{91240B29-F687-4F45-9708-019B960494DF}">
+                <a14:hiddenLine xmlns:a14="http://schemas.microsoft.com/office/drawing/2010/main" w="9525">
                   <a:solidFill>
                     <a:srgbClr val="000000"/>
                   </a:solidFill>
@@ -3859,8 +3859,8 @@
               <a:noFill/>
             </a:ln>
             <a:extLst>
-              <a:ext uri="{91240B29-F687-4f45-9708-019B960494DF}">
-                <a14:hiddenLine xmlns="" xmlns:a14="http://schemas.microsoft.com/office/drawing/2010/main" w="9525">
+              <a:ext uri="{91240B29-F687-4F45-9708-019B960494DF}">
+                <a14:hiddenLine xmlns:a14="http://schemas.microsoft.com/office/drawing/2010/main" w="9525">
                   <a:solidFill>
                     <a:srgbClr val="000000"/>
                   </a:solidFill>
@@ -3949,8 +3949,8 @@
               <a:noFill/>
             </a:ln>
             <a:extLst>
-              <a:ext uri="{91240B29-F687-4f45-9708-019B960494DF}">
-                <a14:hiddenLine xmlns="" xmlns:a14="http://schemas.microsoft.com/office/drawing/2010/main" w="9525">
+              <a:ext uri="{91240B29-F687-4F45-9708-019B960494DF}">
+                <a14:hiddenLine xmlns:a14="http://schemas.microsoft.com/office/drawing/2010/main" w="9525">
                   <a:solidFill>
                     <a:srgbClr val="000000"/>
                   </a:solidFill>
@@ -4011,8 +4011,8 @@
               <a:noFill/>
             </a:ln>
             <a:extLst>
-              <a:ext uri="{91240B29-F687-4f45-9708-019B960494DF}">
-                <a14:hiddenLine xmlns="" xmlns:a14="http://schemas.microsoft.com/office/drawing/2010/main" w="9525">
+              <a:ext uri="{91240B29-F687-4F45-9708-019B960494DF}">
+                <a14:hiddenLine xmlns:a14="http://schemas.microsoft.com/office/drawing/2010/main" w="9525">
                   <a:solidFill>
                     <a:srgbClr val="000000"/>
                   </a:solidFill>
@@ -4131,8 +4131,8 @@
               <a:noFill/>
             </a:ln>
             <a:extLst>
-              <a:ext uri="{91240B29-F687-4f45-9708-019B960494DF}">
-                <a14:hiddenLine xmlns="" xmlns:a14="http://schemas.microsoft.com/office/drawing/2010/main" w="9525">
+              <a:ext uri="{91240B29-F687-4F45-9708-019B960494DF}">
+                <a14:hiddenLine xmlns:a14="http://schemas.microsoft.com/office/drawing/2010/main" w="9525">
                   <a:solidFill>
                     <a:srgbClr val="000000"/>
                   </a:solidFill>
@@ -4199,8 +4199,8 @@
               <a:noFill/>
             </a:ln>
             <a:extLst>
-              <a:ext uri="{91240B29-F687-4f45-9708-019B960494DF}">
-                <a14:hiddenLine xmlns="" xmlns:a14="http://schemas.microsoft.com/office/drawing/2010/main" w="9525">
+              <a:ext uri="{91240B29-F687-4F45-9708-019B960494DF}">
+                <a14:hiddenLine xmlns:a14="http://schemas.microsoft.com/office/drawing/2010/main" w="9525">
                   <a:solidFill>
                     <a:srgbClr val="000000"/>
                   </a:solidFill>
@@ -4289,8 +4289,8 @@
               <a:noFill/>
             </a:ln>
             <a:extLst>
-              <a:ext uri="{91240B29-F687-4f45-9708-019B960494DF}">
-                <a14:hiddenLine xmlns="" xmlns:a14="http://schemas.microsoft.com/office/drawing/2010/main" w="9525">
+              <a:ext uri="{91240B29-F687-4F45-9708-019B960494DF}">
+                <a14:hiddenLine xmlns:a14="http://schemas.microsoft.com/office/drawing/2010/main" w="9525">
                   <a:solidFill>
                     <a:srgbClr val="000000"/>
                   </a:solidFill>
@@ -9018,8 +9018,8 @@
           </a:prstGeom>
           <a:noFill/>
           <a:extLst>
-            <a:ext uri="{909E8E84-426E-40dd-AFC4-6F175D3DCCD1}">
-              <a14:hiddenFill xmlns="" xmlns:a14="http://schemas.microsoft.com/office/drawing/2010/main">
+            <a:ext uri="{909E8E84-426E-40DD-AFC4-6F175D3DCCD1}">
+              <a14:hiddenFill xmlns:a14="http://schemas.microsoft.com/office/drawing/2010/main">
                 <a:solidFill>
                   <a:srgbClr val="FFFFFF"/>
                 </a:solidFill>
@@ -9092,8 +9092,8 @@
                 <a:noFill/>
               </a:ln>
               <a:extLst>
-                <a:ext uri="{91240B29-F687-4f45-9708-019B960494DF}">
-                  <a14:hiddenLine xmlns="" xmlns:a14="http://schemas.microsoft.com/office/drawing/2010/main" w="9525">
+                <a:ext uri="{91240B29-F687-4F45-9708-019B960494DF}">
+                  <a14:hiddenLine xmlns:a14="http://schemas.microsoft.com/office/drawing/2010/main" w="9525">
                     <a:solidFill>
                       <a:srgbClr val="000000"/>
                     </a:solidFill>
@@ -9182,8 +9182,8 @@
                 <a:noFill/>
               </a:ln>
               <a:extLst>
-                <a:ext uri="{91240B29-F687-4f45-9708-019B960494DF}">
-                  <a14:hiddenLine xmlns="" xmlns:a14="http://schemas.microsoft.com/office/drawing/2010/main" w="9525">
+                <a:ext uri="{91240B29-F687-4F45-9708-019B960494DF}">
+                  <a14:hiddenLine xmlns:a14="http://schemas.microsoft.com/office/drawing/2010/main" w="9525">
                     <a:solidFill>
                       <a:srgbClr val="000000"/>
                     </a:solidFill>
@@ -9272,8 +9272,8 @@
                 <a:noFill/>
               </a:ln>
               <a:extLst>
-                <a:ext uri="{91240B29-F687-4f45-9708-019B960494DF}">
-                  <a14:hiddenLine xmlns="" xmlns:a14="http://schemas.microsoft.com/office/drawing/2010/main" w="9525">
+                <a:ext uri="{91240B29-F687-4F45-9708-019B960494DF}">
+                  <a14:hiddenLine xmlns:a14="http://schemas.microsoft.com/office/drawing/2010/main" w="9525">
                     <a:solidFill>
                       <a:srgbClr val="000000"/>
                     </a:solidFill>
@@ -9334,8 +9334,8 @@
                 <a:noFill/>
               </a:ln>
               <a:extLst>
-                <a:ext uri="{91240B29-F687-4f45-9708-019B960494DF}">
-                  <a14:hiddenLine xmlns="" xmlns:a14="http://schemas.microsoft.com/office/drawing/2010/main" w="9525">
+                <a:ext uri="{91240B29-F687-4F45-9708-019B960494DF}">
+                  <a14:hiddenLine xmlns:a14="http://schemas.microsoft.com/office/drawing/2010/main" w="9525">
                     <a:solidFill>
                       <a:srgbClr val="000000"/>
                     </a:solidFill>
@@ -9424,8 +9424,8 @@
                 <a:noFill/>
               </a:ln>
               <a:extLst>
-                <a:ext uri="{91240B29-F687-4f45-9708-019B960494DF}">
-                  <a14:hiddenLine xmlns="" xmlns:a14="http://schemas.microsoft.com/office/drawing/2010/main" w="9525">
+                <a:ext uri="{91240B29-F687-4F45-9708-019B960494DF}">
+                  <a14:hiddenLine xmlns:a14="http://schemas.microsoft.com/office/drawing/2010/main" w="9525">
                     <a:solidFill>
                       <a:srgbClr val="000000"/>
                     </a:solidFill>
@@ -9486,8 +9486,8 @@
                 <a:noFill/>
               </a:ln>
               <a:extLst>
-                <a:ext uri="{91240B29-F687-4f45-9708-019B960494DF}">
-                  <a14:hiddenLine xmlns="" xmlns:a14="http://schemas.microsoft.com/office/drawing/2010/main" w="9525">
+                <a:ext uri="{91240B29-F687-4F45-9708-019B960494DF}">
+                  <a14:hiddenLine xmlns:a14="http://schemas.microsoft.com/office/drawing/2010/main" w="9525">
                     <a:solidFill>
                       <a:srgbClr val="000000"/>
                     </a:solidFill>
@@ -9548,8 +9548,8 @@
                 <a:noFill/>
               </a:ln>
               <a:extLst>
-                <a:ext uri="{91240B29-F687-4f45-9708-019B960494DF}">
-                  <a14:hiddenLine xmlns="" xmlns:a14="http://schemas.microsoft.com/office/drawing/2010/main" w="9525">
+                <a:ext uri="{91240B29-F687-4F45-9708-019B960494DF}">
+                  <a14:hiddenLine xmlns:a14="http://schemas.microsoft.com/office/drawing/2010/main" w="9525">
                     <a:solidFill>
                       <a:srgbClr val="000000"/>
                     </a:solidFill>
@@ -9638,8 +9638,8 @@
                 <a:noFill/>
               </a:ln>
               <a:extLst>
-                <a:ext uri="{91240B29-F687-4f45-9708-019B960494DF}">
-                  <a14:hiddenLine xmlns="" xmlns:a14="http://schemas.microsoft.com/office/drawing/2010/main" w="9525">
+                <a:ext uri="{91240B29-F687-4F45-9708-019B960494DF}">
+                  <a14:hiddenLine xmlns:a14="http://schemas.microsoft.com/office/drawing/2010/main" w="9525">
                     <a:solidFill>
                       <a:srgbClr val="000000"/>
                     </a:solidFill>
@@ -9728,8 +9728,8 @@
                 <a:noFill/>
               </a:ln>
               <a:extLst>
-                <a:ext uri="{91240B29-F687-4f45-9708-019B960494DF}">
-                  <a14:hiddenLine xmlns="" xmlns:a14="http://schemas.microsoft.com/office/drawing/2010/main" w="9525">
+                <a:ext uri="{91240B29-F687-4F45-9708-019B960494DF}">
+                  <a14:hiddenLine xmlns:a14="http://schemas.microsoft.com/office/drawing/2010/main" w="9525">
                     <a:solidFill>
                       <a:srgbClr val="000000"/>
                     </a:solidFill>
@@ -9790,8 +9790,8 @@
                 <a:noFill/>
               </a:ln>
               <a:extLst>
-                <a:ext uri="{91240B29-F687-4f45-9708-019B960494DF}">
-                  <a14:hiddenLine xmlns="" xmlns:a14="http://schemas.microsoft.com/office/drawing/2010/main" w="9525">
+                <a:ext uri="{91240B29-F687-4F45-9708-019B960494DF}">
+                  <a14:hiddenLine xmlns:a14="http://schemas.microsoft.com/office/drawing/2010/main" w="9525">
                     <a:solidFill>
                       <a:srgbClr val="000000"/>
                     </a:solidFill>
@@ -9900,8 +9900,8 @@
                 <a:noFill/>
               </a:ln>
               <a:extLst>
-                <a:ext uri="{91240B29-F687-4f45-9708-019B960494DF}">
-                  <a14:hiddenLine xmlns="" xmlns:a14="http://schemas.microsoft.com/office/drawing/2010/main" w="9525">
+                <a:ext uri="{91240B29-F687-4F45-9708-019B960494DF}">
+                  <a14:hiddenLine xmlns:a14="http://schemas.microsoft.com/office/drawing/2010/main" w="9525">
                     <a:solidFill>
                       <a:srgbClr val="000000"/>
                     </a:solidFill>
@@ -9984,8 +9984,8 @@
                 <a:noFill/>
               </a:ln>
               <a:extLst>
-                <a:ext uri="{91240B29-F687-4f45-9708-019B960494DF}">
-                  <a14:hiddenLine xmlns="" xmlns:a14="http://schemas.microsoft.com/office/drawing/2010/main" w="9525">
+                <a:ext uri="{91240B29-F687-4F45-9708-019B960494DF}">
+                  <a14:hiddenLine xmlns:a14="http://schemas.microsoft.com/office/drawing/2010/main" w="9525">
                     <a:solidFill>
                       <a:srgbClr val="000000"/>
                     </a:solidFill>
@@ -10046,8 +10046,8 @@
                 <a:noFill/>
               </a:ln>
               <a:extLst>
-                <a:ext uri="{91240B29-F687-4f45-9708-019B960494DF}">
-                  <a14:hiddenLine xmlns="" xmlns:a14="http://schemas.microsoft.com/office/drawing/2010/main" w="9525">
+                <a:ext uri="{91240B29-F687-4F45-9708-019B960494DF}">
+                  <a14:hiddenLine xmlns:a14="http://schemas.microsoft.com/office/drawing/2010/main" w="9525">
                     <a:solidFill>
                       <a:srgbClr val="000000"/>
                     </a:solidFill>
@@ -10108,8 +10108,8 @@
                 <a:noFill/>
               </a:ln>
               <a:extLst>
-                <a:ext uri="{91240B29-F687-4f45-9708-019B960494DF}">
-                  <a14:hiddenLine xmlns="" xmlns:a14="http://schemas.microsoft.com/office/drawing/2010/main" w="9525">
+                <a:ext uri="{91240B29-F687-4F45-9708-019B960494DF}">
+                  <a14:hiddenLine xmlns:a14="http://schemas.microsoft.com/office/drawing/2010/main" w="9525">
                     <a:solidFill>
                       <a:srgbClr val="000000"/>
                     </a:solidFill>
@@ -10198,8 +10198,8 @@
                 <a:noFill/>
               </a:ln>
               <a:extLst>
-                <a:ext uri="{91240B29-F687-4f45-9708-019B960494DF}">
-                  <a14:hiddenLine xmlns="" xmlns:a14="http://schemas.microsoft.com/office/drawing/2010/main" w="9525">
+                <a:ext uri="{91240B29-F687-4F45-9708-019B960494DF}">
+                  <a14:hiddenLine xmlns:a14="http://schemas.microsoft.com/office/drawing/2010/main" w="9525">
                     <a:solidFill>
                       <a:srgbClr val="000000"/>
                     </a:solidFill>
@@ -10232,8 +10232,8 @@
                 <a:noFill/>
               </a:ln>
               <a:extLst>
-                <a:ext uri="{91240B29-F687-4f45-9708-019B960494DF}">
-                  <a14:hiddenLine xmlns="" xmlns:a14="http://schemas.microsoft.com/office/drawing/2010/main" w="9525">
+                <a:ext uri="{91240B29-F687-4F45-9708-019B960494DF}">
+                  <a14:hiddenLine xmlns:a14="http://schemas.microsoft.com/office/drawing/2010/main" w="9525">
                     <a:solidFill>
                       <a:srgbClr val="000000"/>
                     </a:solidFill>
@@ -10297,8 +10297,8 @@
                 <a:noFill/>
               </a:ln>
               <a:extLst>
-                <a:ext uri="{91240B29-F687-4f45-9708-019B960494DF}">
-                  <a14:hiddenLine xmlns="" xmlns:a14="http://schemas.microsoft.com/office/drawing/2010/main" w="9525">
+                <a:ext uri="{91240B29-F687-4F45-9708-019B960494DF}">
+                  <a14:hiddenLine xmlns:a14="http://schemas.microsoft.com/office/drawing/2010/main" w="9525">
                     <a:solidFill>
                       <a:srgbClr val="000000"/>
                     </a:solidFill>
@@ -10387,8 +10387,8 @@
                 <a:noFill/>
               </a:ln>
               <a:extLst>
-                <a:ext uri="{91240B29-F687-4f45-9708-019B960494DF}">
-                  <a14:hiddenLine xmlns="" xmlns:a14="http://schemas.microsoft.com/office/drawing/2010/main" w="9525">
+                <a:ext uri="{91240B29-F687-4F45-9708-019B960494DF}">
+                  <a14:hiddenLine xmlns:a14="http://schemas.microsoft.com/office/drawing/2010/main" w="9525">
                     <a:solidFill>
                       <a:srgbClr val="000000"/>
                     </a:solidFill>
@@ -10449,8 +10449,8 @@
                 <a:noFill/>
               </a:ln>
               <a:extLst>
-                <a:ext uri="{91240B29-F687-4f45-9708-019B960494DF}">
-                  <a14:hiddenLine xmlns="" xmlns:a14="http://schemas.microsoft.com/office/drawing/2010/main" w="9525">
+                <a:ext uri="{91240B29-F687-4F45-9708-019B960494DF}">
+                  <a14:hiddenLine xmlns:a14="http://schemas.microsoft.com/office/drawing/2010/main" w="9525">
                     <a:solidFill>
                       <a:srgbClr val="000000"/>
                     </a:solidFill>
@@ -10539,8 +10539,8 @@
                 <a:noFill/>
               </a:ln>
               <a:extLst>
-                <a:ext uri="{91240B29-F687-4f45-9708-019B960494DF}">
-                  <a14:hiddenLine xmlns="" xmlns:a14="http://schemas.microsoft.com/office/drawing/2010/main" w="9525">
+                <a:ext uri="{91240B29-F687-4F45-9708-019B960494DF}">
+                  <a14:hiddenLine xmlns:a14="http://schemas.microsoft.com/office/drawing/2010/main" w="9525">
                     <a:solidFill>
                       <a:srgbClr val="000000"/>
                     </a:solidFill>
@@ -10604,8 +10604,8 @@
                 <a:noFill/>
               </a:ln>
               <a:extLst>
-                <a:ext uri="{91240B29-F687-4f45-9708-019B960494DF}">
-                  <a14:hiddenLine xmlns="" xmlns:a14="http://schemas.microsoft.com/office/drawing/2010/main" w="9525">
+                <a:ext uri="{91240B29-F687-4F45-9708-019B960494DF}">
+                  <a14:hiddenLine xmlns:a14="http://schemas.microsoft.com/office/drawing/2010/main" w="9525">
                     <a:solidFill>
                       <a:srgbClr val="000000"/>
                     </a:solidFill>
@@ -10666,8 +10666,8 @@
                 <a:noFill/>
               </a:ln>
               <a:extLst>
-                <a:ext uri="{91240B29-F687-4f45-9708-019B960494DF}">
-                  <a14:hiddenLine xmlns="" xmlns:a14="http://schemas.microsoft.com/office/drawing/2010/main" w="9525">
+                <a:ext uri="{91240B29-F687-4F45-9708-019B960494DF}">
+                  <a14:hiddenLine xmlns:a14="http://schemas.microsoft.com/office/drawing/2010/main" w="9525">
                     <a:solidFill>
                       <a:srgbClr val="000000"/>
                     </a:solidFill>
@@ -10756,8 +10756,8 @@
                 <a:noFill/>
               </a:ln>
               <a:extLst>
-                <a:ext uri="{91240B29-F687-4f45-9708-019B960494DF}">
-                  <a14:hiddenLine xmlns="" xmlns:a14="http://schemas.microsoft.com/office/drawing/2010/main" w="9525">
+                <a:ext uri="{91240B29-F687-4F45-9708-019B960494DF}">
+                  <a14:hiddenLine xmlns:a14="http://schemas.microsoft.com/office/drawing/2010/main" w="9525">
                     <a:solidFill>
                       <a:srgbClr val="000000"/>
                     </a:solidFill>
@@ -10846,8 +10846,8 @@
                 <a:noFill/>
               </a:ln>
               <a:extLst>
-                <a:ext uri="{91240B29-F687-4f45-9708-019B960494DF}">
-                  <a14:hiddenLine xmlns="" xmlns:a14="http://schemas.microsoft.com/office/drawing/2010/main" w="9525">
+                <a:ext uri="{91240B29-F687-4F45-9708-019B960494DF}">
+                  <a14:hiddenLine xmlns:a14="http://schemas.microsoft.com/office/drawing/2010/main" w="9525">
                     <a:solidFill>
                       <a:srgbClr val="000000"/>
                     </a:solidFill>
@@ -10911,8 +10911,8 @@
                 <a:noFill/>
               </a:ln>
               <a:extLst>
-                <a:ext uri="{91240B29-F687-4f45-9708-019B960494DF}">
-                  <a14:hiddenLine xmlns="" xmlns:a14="http://schemas.microsoft.com/office/drawing/2010/main" w="9525">
+                <a:ext uri="{91240B29-F687-4F45-9708-019B960494DF}">
+                  <a14:hiddenLine xmlns:a14="http://schemas.microsoft.com/office/drawing/2010/main" w="9525">
                     <a:solidFill>
                       <a:srgbClr val="000000"/>
                     </a:solidFill>
@@ -11031,8 +11031,8 @@
                 <a:noFill/>
               </a:ln>
               <a:extLst>
-                <a:ext uri="{91240B29-F687-4f45-9708-019B960494DF}">
-                  <a14:hiddenLine xmlns="" xmlns:a14="http://schemas.microsoft.com/office/drawing/2010/main" w="9525">
+                <a:ext uri="{91240B29-F687-4F45-9708-019B960494DF}">
+                  <a14:hiddenLine xmlns:a14="http://schemas.microsoft.com/office/drawing/2010/main" w="9525">
                     <a:solidFill>
                       <a:srgbClr val="000000"/>
                     </a:solidFill>
@@ -11112,8 +11112,8 @@
                 <a:noFill/>
               </a:ln>
               <a:extLst>
-                <a:ext uri="{91240B29-F687-4f45-9708-019B960494DF}">
-                  <a14:hiddenLine xmlns="" xmlns:a14="http://schemas.microsoft.com/office/drawing/2010/main" w="9525">
+                <a:ext uri="{91240B29-F687-4F45-9708-019B960494DF}">
+                  <a14:hiddenLine xmlns:a14="http://schemas.microsoft.com/office/drawing/2010/main" w="9525">
                     <a:solidFill>
                       <a:srgbClr val="000000"/>
                     </a:solidFill>
@@ -11227,8 +11227,8 @@
                 <a:noFill/>
               </a:ln>
               <a:extLst>
-                <a:ext uri="{91240B29-F687-4f45-9708-019B960494DF}">
-                  <a14:hiddenLine xmlns="" xmlns:a14="http://schemas.microsoft.com/office/drawing/2010/main" w="9525">
+                <a:ext uri="{91240B29-F687-4F45-9708-019B960494DF}">
+                  <a14:hiddenLine xmlns:a14="http://schemas.microsoft.com/office/drawing/2010/main" w="9525">
                     <a:solidFill>
                       <a:srgbClr val="000000"/>
                     </a:solidFill>
@@ -11317,8 +11317,8 @@
                 <a:noFill/>
               </a:ln>
               <a:extLst>
-                <a:ext uri="{91240B29-F687-4f45-9708-019B960494DF}">
-                  <a14:hiddenLine xmlns="" xmlns:a14="http://schemas.microsoft.com/office/drawing/2010/main" w="9525">
+                <a:ext uri="{91240B29-F687-4F45-9708-019B960494DF}">
+                  <a14:hiddenLine xmlns:a14="http://schemas.microsoft.com/office/drawing/2010/main" w="9525">
                     <a:solidFill>
                       <a:srgbClr val="000000"/>
                     </a:solidFill>
@@ -11382,8 +11382,8 @@
                 <a:noFill/>
               </a:ln>
               <a:extLst>
-                <a:ext uri="{91240B29-F687-4f45-9708-019B960494DF}">
-                  <a14:hiddenLine xmlns="" xmlns:a14="http://schemas.microsoft.com/office/drawing/2010/main" w="9525">
+                <a:ext uri="{91240B29-F687-4F45-9708-019B960494DF}">
+                  <a14:hiddenLine xmlns:a14="http://schemas.microsoft.com/office/drawing/2010/main" w="9525">
                     <a:solidFill>
                       <a:srgbClr val="000000"/>
                     </a:solidFill>
@@ -11472,8 +11472,8 @@
                 <a:noFill/>
               </a:ln>
               <a:extLst>
-                <a:ext uri="{91240B29-F687-4f45-9708-019B960494DF}">
-                  <a14:hiddenLine xmlns="" xmlns:a14="http://schemas.microsoft.com/office/drawing/2010/main" w="9525">
+                <a:ext uri="{91240B29-F687-4F45-9708-019B960494DF}">
+                  <a14:hiddenLine xmlns:a14="http://schemas.microsoft.com/office/drawing/2010/main" w="9525">
                     <a:solidFill>
                       <a:srgbClr val="000000"/>
                     </a:solidFill>
@@ -11540,8 +11540,8 @@
                 <a:noFill/>
               </a:ln>
               <a:extLst>
-                <a:ext uri="{91240B29-F687-4f45-9708-019B960494DF}">
-                  <a14:hiddenLine xmlns="" xmlns:a14="http://schemas.microsoft.com/office/drawing/2010/main" w="9525">
+                <a:ext uri="{91240B29-F687-4F45-9708-019B960494DF}">
+                  <a14:hiddenLine xmlns:a14="http://schemas.microsoft.com/office/drawing/2010/main" w="9525">
                     <a:solidFill>
                       <a:srgbClr val="000000"/>
                     </a:solidFill>
@@ -11630,8 +11630,8 @@
                 <a:noFill/>
               </a:ln>
               <a:extLst>
-                <a:ext uri="{91240B29-F687-4f45-9708-019B960494DF}">
-                  <a14:hiddenLine xmlns="" xmlns:a14="http://schemas.microsoft.com/office/drawing/2010/main" w="9525">
+                <a:ext uri="{91240B29-F687-4F45-9708-019B960494DF}">
+                  <a14:hiddenLine xmlns:a14="http://schemas.microsoft.com/office/drawing/2010/main" w="9525">
                     <a:solidFill>
                       <a:srgbClr val="000000"/>
                     </a:solidFill>
@@ -11698,8 +11698,8 @@
                 <a:noFill/>
               </a:ln>
               <a:extLst>
-                <a:ext uri="{91240B29-F687-4f45-9708-019B960494DF}">
-                  <a14:hiddenLine xmlns="" xmlns:a14="http://schemas.microsoft.com/office/drawing/2010/main" w="9525">
+                <a:ext uri="{91240B29-F687-4F45-9708-019B960494DF}">
+                  <a14:hiddenLine xmlns:a14="http://schemas.microsoft.com/office/drawing/2010/main" w="9525">
                     <a:solidFill>
                       <a:srgbClr val="000000"/>
                     </a:solidFill>
@@ -11788,8 +11788,8 @@
                 <a:noFill/>
               </a:ln>
               <a:extLst>
-                <a:ext uri="{91240B29-F687-4f45-9708-019B960494DF}">
-                  <a14:hiddenLine xmlns="" xmlns:a14="http://schemas.microsoft.com/office/drawing/2010/main" w="9525">
+                <a:ext uri="{91240B29-F687-4F45-9708-019B960494DF}">
+                  <a14:hiddenLine xmlns:a14="http://schemas.microsoft.com/office/drawing/2010/main" w="9525">
                     <a:solidFill>
                       <a:srgbClr val="000000"/>
                     </a:solidFill>
@@ -11822,8 +11822,8 @@
                 <a:noFill/>
               </a:ln>
               <a:extLst>
-                <a:ext uri="{91240B29-F687-4f45-9708-019B960494DF}">
-                  <a14:hiddenLine xmlns="" xmlns:a14="http://schemas.microsoft.com/office/drawing/2010/main" w="9525">
+                <a:ext uri="{91240B29-F687-4F45-9708-019B960494DF}">
+                  <a14:hiddenLine xmlns:a14="http://schemas.microsoft.com/office/drawing/2010/main" w="9525">
                     <a:solidFill>
                       <a:srgbClr val="000000"/>
                     </a:solidFill>
@@ -12689,7 +12689,7 @@
                         <m:fPr>
                           <m:ctrlPr>
                             <a:rPr lang="en-US" i="1" smtClean="0">
-                              <a:latin typeface="Cambria Math" panose="02040503050406030204" pitchFamily="18" charset="0"/>
+                              <a:latin typeface="Cambria Math"/>
                             </a:rPr>
                           </m:ctrlPr>
                         </m:fPr>
@@ -12716,7 +12716,7 @@
                             <m:sSubPr>
                               <m:ctrlPr>
                                 <a:rPr lang="en-US" i="1">
-                                  <a:latin typeface="Cambria Math" panose="02040503050406030204" pitchFamily="18" charset="0"/>
+                                  <a:latin typeface="Cambria Math"/>
                                 </a:rPr>
                               </m:ctrlPr>
                             </m:sSubPr>
@@ -12753,7 +12753,7 @@
                             <m:sSubPr>
                               <m:ctrlPr>
                                 <a:rPr lang="en-US" i="1">
-                                  <a:latin typeface="Cambria Math" panose="02040503050406030204" pitchFamily="18" charset="0"/>
+                                  <a:latin typeface="Cambria Math"/>
                                 </a:rPr>
                               </m:ctrlPr>
                             </m:sSubPr>
@@ -12790,7 +12790,7 @@
                             <m:sSubPr>
                               <m:ctrlPr>
                                 <a:rPr lang="en-US" i="1">
-                                  <a:latin typeface="Cambria Math" panose="02040503050406030204" pitchFamily="18" charset="0"/>
+                                  <a:latin typeface="Cambria Math"/>
                                 </a:rPr>
                               </m:ctrlPr>
                             </m:sSubPr>
@@ -12853,7 +12853,7 @@
                       <m:fPr>
                         <m:ctrlPr>
                           <a:rPr lang="en-US" i="1">
-                            <a:latin typeface="Cambria Math" panose="02040503050406030204" pitchFamily="18" charset="0"/>
+                            <a:latin typeface="Cambria Math"/>
                           </a:rPr>
                         </m:ctrlPr>
                       </m:fPr>
@@ -12882,7 +12882,7 @@
                           <m:sSubPr>
                             <m:ctrlPr>
                               <a:rPr lang="en-US" i="1">
-                                <a:latin typeface="Cambria Math" panose="02040503050406030204" pitchFamily="18" charset="0"/>
+                                <a:latin typeface="Cambria Math"/>
                               </a:rPr>
                             </m:ctrlPr>
                           </m:sSubPr>
@@ -12909,7 +12909,7 @@
                       <m:fPr>
                         <m:ctrlPr>
                           <a:rPr lang="en-US" i="1">
-                            <a:latin typeface="Cambria Math" panose="02040503050406030204" pitchFamily="18" charset="0"/>
+                            <a:latin typeface="Cambria Math"/>
                           </a:rPr>
                         </m:ctrlPr>
                       </m:fPr>
@@ -12924,7 +12924,7 @@
                           <m:sSubPr>
                             <m:ctrlPr>
                               <a:rPr lang="en-US" i="1">
-                                <a:latin typeface="Cambria Math" panose="02040503050406030204" pitchFamily="18" charset="0"/>
+                                <a:latin typeface="Cambria Math"/>
                               </a:rPr>
                             </m:ctrlPr>
                           </m:sSubPr>
@@ -12971,7 +12971,7 @@
                       <m:fPr>
                         <m:ctrlPr>
                           <a:rPr lang="en-US" i="1">
-                            <a:latin typeface="Cambria Math" panose="02040503050406030204" pitchFamily="18" charset="0"/>
+                            <a:latin typeface="Cambria Math"/>
                           </a:rPr>
                         </m:ctrlPr>
                       </m:fPr>
@@ -13000,7 +13000,7 @@
                           <m:sSubPr>
                             <m:ctrlPr>
                               <a:rPr lang="en-US" i="1">
-                                <a:latin typeface="Cambria Math" panose="02040503050406030204" pitchFamily="18" charset="0"/>
+                                <a:latin typeface="Cambria Math"/>
                               </a:rPr>
                             </m:ctrlPr>
                           </m:sSubPr>
@@ -13027,7 +13027,7 @@
                       <m:fPr>
                         <m:ctrlPr>
                           <a:rPr lang="en-US" i="1">
-                            <a:latin typeface="Cambria Math" panose="02040503050406030204" pitchFamily="18" charset="0"/>
+                            <a:latin typeface="Cambria Math"/>
                           </a:rPr>
                         </m:ctrlPr>
                       </m:fPr>
@@ -13042,7 +13042,7 @@
                           <m:sSubPr>
                             <m:ctrlPr>
                               <a:rPr lang="en-US" i="1">
-                                <a:latin typeface="Cambria Math" panose="02040503050406030204" pitchFamily="18" charset="0"/>
+                                <a:latin typeface="Cambria Math"/>
                               </a:rPr>
                             </m:ctrlPr>
                           </m:sSubPr>
@@ -13089,7 +13089,7 @@
                       <m:fPr>
                         <m:ctrlPr>
                           <a:rPr lang="en-US" i="1">
-                            <a:latin typeface="Cambria Math" panose="02040503050406030204" pitchFamily="18" charset="0"/>
+                            <a:latin typeface="Cambria Math"/>
                           </a:rPr>
                         </m:ctrlPr>
                       </m:fPr>
@@ -13118,7 +13118,7 @@
                           <m:sSubPr>
                             <m:ctrlPr>
                               <a:rPr lang="en-US" i="1">
-                                <a:latin typeface="Cambria Math" panose="02040503050406030204" pitchFamily="18" charset="0"/>
+                                <a:latin typeface="Cambria Math"/>
                               </a:rPr>
                             </m:ctrlPr>
                           </m:sSubPr>
@@ -13145,7 +13145,7 @@
                       <m:fPr>
                         <m:ctrlPr>
                           <a:rPr lang="en-US" i="1">
-                            <a:latin typeface="Cambria Math" panose="02040503050406030204" pitchFamily="18" charset="0"/>
+                            <a:latin typeface="Cambria Math"/>
                           </a:rPr>
                         </m:ctrlPr>
                       </m:fPr>
@@ -13160,7 +13160,7 @@
                           <m:sSubPr>
                             <m:ctrlPr>
                               <a:rPr lang="en-US" i="1">
-                                <a:latin typeface="Cambria Math" panose="02040503050406030204" pitchFamily="18" charset="0"/>
+                                <a:latin typeface="Cambria Math"/>
                               </a:rPr>
                             </m:ctrlPr>
                           </m:sSubPr>
@@ -13222,7 +13222,7 @@
                         <m:dPr>
                           <m:ctrlPr>
                             <a:rPr lang="en-US" i="1">
-                              <a:latin typeface="Cambria Math" panose="02040503050406030204" pitchFamily="18" charset="0"/>
+                              <a:latin typeface="Cambria Math"/>
                             </a:rPr>
                           </m:ctrlPr>
                         </m:dPr>
@@ -13233,7 +13233,7 @@
                               <m:endChr m:val="]"/>
                               <m:ctrlPr>
                                 <a:rPr lang="en-US" i="1">
-                                  <a:latin typeface="Cambria Math" panose="02040503050406030204" pitchFamily="18" charset="0"/>
+                                  <a:latin typeface="Cambria Math"/>
                                 </a:rPr>
                               </m:ctrlPr>
                             </m:dPr>
@@ -13242,7 +13242,7 @@
                                 <m:fPr>
                                   <m:ctrlPr>
                                     <a:rPr lang="en-US" i="1">
-                                      <a:latin typeface="Cambria Math" panose="02040503050406030204" pitchFamily="18" charset="0"/>
+                                      <a:latin typeface="Cambria Math"/>
                                     </a:rPr>
                                   </m:ctrlPr>
                                 </m:fPr>
@@ -13271,7 +13271,7 @@
                                     <m:sSubPr>
                                       <m:ctrlPr>
                                         <a:rPr lang="en-US" i="1">
-                                          <a:latin typeface="Cambria Math" panose="02040503050406030204" pitchFamily="18" charset="0"/>
+                                          <a:latin typeface="Cambria Math"/>
                                         </a:rPr>
                                       </m:ctrlPr>
                                     </m:sSubPr>
@@ -13302,7 +13302,7 @@
                               <m:endChr m:val="]"/>
                               <m:ctrlPr>
                                 <a:rPr lang="en-US" i="1">
-                                  <a:latin typeface="Cambria Math" panose="02040503050406030204" pitchFamily="18" charset="0"/>
+                                  <a:latin typeface="Cambria Math"/>
                                 </a:rPr>
                               </m:ctrlPr>
                             </m:dPr>
@@ -13311,7 +13311,7 @@
                                 <m:fPr>
                                   <m:ctrlPr>
                                     <a:rPr lang="en-US" i="1">
-                                      <a:latin typeface="Cambria Math" panose="02040503050406030204" pitchFamily="18" charset="0"/>
+                                      <a:latin typeface="Cambria Math"/>
                                     </a:rPr>
                                   </m:ctrlPr>
                                 </m:fPr>
@@ -13340,7 +13340,7 @@
                                     <m:sSubPr>
                                       <m:ctrlPr>
                                         <a:rPr lang="en-US" i="1">
-                                          <a:latin typeface="Cambria Math" panose="02040503050406030204" pitchFamily="18" charset="0"/>
+                                          <a:latin typeface="Cambria Math"/>
                                         </a:rPr>
                                       </m:ctrlPr>
                                     </m:sSubPr>
@@ -13371,7 +13371,7 @@
                               <m:endChr m:val="]"/>
                               <m:ctrlPr>
                                 <a:rPr lang="en-US" i="1">
-                                  <a:latin typeface="Cambria Math" panose="02040503050406030204" pitchFamily="18" charset="0"/>
+                                  <a:latin typeface="Cambria Math"/>
                                 </a:rPr>
                               </m:ctrlPr>
                             </m:dPr>
@@ -13390,7 +13390,7 @@
                               <m:endChr m:val="]"/>
                               <m:ctrlPr>
                                 <a:rPr lang="en-US" i="1">
-                                  <a:latin typeface="Cambria Math" panose="02040503050406030204" pitchFamily="18" charset="0"/>
+                                  <a:latin typeface="Cambria Math"/>
                                 </a:rPr>
                               </m:ctrlPr>
                             </m:dPr>
@@ -13399,7 +13399,7 @@
                                 <m:fPr>
                                   <m:ctrlPr>
                                     <a:rPr lang="en-US" i="1">
-                                      <a:latin typeface="Cambria Math" panose="02040503050406030204" pitchFamily="18" charset="0"/>
+                                      <a:latin typeface="Cambria Math"/>
                                     </a:rPr>
                                   </m:ctrlPr>
                                 </m:fPr>
@@ -13428,7 +13428,7 @@
                                     <m:sSubPr>
                                       <m:ctrlPr>
                                         <a:rPr lang="en-US" i="1">
-                                          <a:latin typeface="Cambria Math" panose="02040503050406030204" pitchFamily="18" charset="0"/>
+                                          <a:latin typeface="Cambria Math"/>
                                         </a:rPr>
                                       </m:ctrlPr>
                                     </m:sSubPr>
@@ -13459,7 +13459,7 @@
                         <m:dPr>
                           <m:ctrlPr>
                             <a:rPr lang="en-US" i="1">
-                              <a:latin typeface="Cambria Math" panose="02040503050406030204" pitchFamily="18" charset="0"/>
+                              <a:latin typeface="Cambria Math"/>
                             </a:rPr>
                           </m:ctrlPr>
                         </m:dPr>
@@ -13468,7 +13468,7 @@
                             <m:eqArrPr>
                               <m:ctrlPr>
                                 <a:rPr lang="en-US" i="1">
-                                  <a:latin typeface="Cambria Math" panose="02040503050406030204" pitchFamily="18" charset="0"/>
+                                  <a:latin typeface="Cambria Math"/>
                                 </a:rPr>
                               </m:ctrlPr>
                             </m:eqArrPr>
@@ -13477,7 +13477,7 @@
                                 <m:fPr>
                                   <m:ctrlPr>
                                     <a:rPr lang="en-US" i="1">
-                                      <a:latin typeface="Cambria Math" panose="02040503050406030204" pitchFamily="18" charset="0"/>
+                                      <a:latin typeface="Cambria Math"/>
                                     </a:rPr>
                                   </m:ctrlPr>
                                 </m:fPr>
@@ -13492,7 +13492,7 @@
                                     <m:sSubPr>
                                       <m:ctrlPr>
                                         <a:rPr lang="en-US" i="1">
-                                          <a:latin typeface="Cambria Math" panose="02040503050406030204" pitchFamily="18" charset="0"/>
+                                          <a:latin typeface="Cambria Math"/>
                                         </a:rPr>
                                       </m:ctrlPr>
                                     </m:sSubPr>
@@ -13535,7 +13535,7 @@
                                 <m:fPr>
                                   <m:ctrlPr>
                                     <a:rPr lang="en-US" i="1">
-                                      <a:latin typeface="Cambria Math" panose="02040503050406030204" pitchFamily="18" charset="0"/>
+                                      <a:latin typeface="Cambria Math"/>
                                     </a:rPr>
                                   </m:ctrlPr>
                                 </m:fPr>
@@ -13550,7 +13550,7 @@
                                     <m:sSubPr>
                                       <m:ctrlPr>
                                         <a:rPr lang="en-US" i="1">
-                                          <a:latin typeface="Cambria Math" panose="02040503050406030204" pitchFamily="18" charset="0"/>
+                                          <a:latin typeface="Cambria Math"/>
                                         </a:rPr>
                                       </m:ctrlPr>
                                     </m:sSubPr>
@@ -13601,7 +13601,7 @@
                                 <m:fPr>
                                   <m:ctrlPr>
                                     <a:rPr lang="en-US" i="1">
-                                      <a:latin typeface="Cambria Math" panose="02040503050406030204" pitchFamily="18" charset="0"/>
+                                      <a:latin typeface="Cambria Math"/>
                                     </a:rPr>
                                   </m:ctrlPr>
                                 </m:fPr>
@@ -13616,7 +13616,7 @@
                                     <m:sSubPr>
                                       <m:ctrlPr>
                                         <a:rPr lang="en-US" i="1">
-                                          <a:latin typeface="Cambria Math" panose="02040503050406030204" pitchFamily="18" charset="0"/>
+                                          <a:latin typeface="Cambria Math"/>
                                         </a:rPr>
                                       </m:ctrlPr>
                                     </m:sSubPr>
@@ -13689,7 +13689,7 @@
                         <m:dPr>
                           <m:ctrlPr>
                             <a:rPr lang="en-US" i="1">
-                              <a:latin typeface="Cambria Math" panose="02040503050406030204" pitchFamily="18" charset="0"/>
+                              <a:latin typeface="Cambria Math"/>
                             </a:rPr>
                           </m:ctrlPr>
                         </m:dPr>
@@ -13706,7 +13706,7 @@
                         <m:dPr>
                           <m:ctrlPr>
                             <a:rPr lang="en-US" i="1">
-                              <a:latin typeface="Cambria Math" panose="02040503050406030204" pitchFamily="18" charset="0"/>
+                              <a:latin typeface="Cambria Math"/>
                             </a:rPr>
                           </m:ctrlPr>
                         </m:dPr>
@@ -13715,7 +13715,7 @@
                             <m:eqArrPr>
                               <m:ctrlPr>
                                 <a:rPr lang="en-US" i="1">
-                                  <a:latin typeface="Cambria Math" panose="02040503050406030204" pitchFamily="18" charset="0"/>
+                                  <a:latin typeface="Cambria Math"/>
                                 </a:rPr>
                               </m:ctrlPr>
                             </m:eqArrPr>
@@ -13724,7 +13724,7 @@
                                 <m:fPr>
                                   <m:ctrlPr>
                                     <a:rPr lang="en-US" i="1">
-                                      <a:latin typeface="Cambria Math" panose="02040503050406030204" pitchFamily="18" charset="0"/>
+                                      <a:latin typeface="Cambria Math"/>
                                     </a:rPr>
                                   </m:ctrlPr>
                                 </m:fPr>
@@ -13739,7 +13739,7 @@
                                     <m:sSubPr>
                                       <m:ctrlPr>
                                         <a:rPr lang="en-US" i="1">
-                                          <a:latin typeface="Cambria Math" panose="02040503050406030204" pitchFamily="18" charset="0"/>
+                                          <a:latin typeface="Cambria Math"/>
                                         </a:rPr>
                                       </m:ctrlPr>
                                     </m:sSubPr>
@@ -13782,7 +13782,7 @@
                                 <m:fPr>
                                   <m:ctrlPr>
                                     <a:rPr lang="en-US" i="1">
-                                      <a:latin typeface="Cambria Math" panose="02040503050406030204" pitchFamily="18" charset="0"/>
+                                      <a:latin typeface="Cambria Math"/>
                                     </a:rPr>
                                   </m:ctrlPr>
                                 </m:fPr>
@@ -13797,7 +13797,7 @@
                                     <m:sSubPr>
                                       <m:ctrlPr>
                                         <a:rPr lang="en-US" i="1">
-                                          <a:latin typeface="Cambria Math" panose="02040503050406030204" pitchFamily="18" charset="0"/>
+                                          <a:latin typeface="Cambria Math"/>
                                         </a:rPr>
                                       </m:ctrlPr>
                                     </m:sSubPr>
@@ -13848,7 +13848,7 @@
                                 <m:fPr>
                                   <m:ctrlPr>
                                     <a:rPr lang="en-US" i="1">
-                                      <a:latin typeface="Cambria Math" panose="02040503050406030204" pitchFamily="18" charset="0"/>
+                                      <a:latin typeface="Cambria Math"/>
                                     </a:rPr>
                                   </m:ctrlPr>
                                 </m:fPr>
@@ -13863,7 +13863,7 @@
                                     <m:sSubPr>
                                       <m:ctrlPr>
                                         <a:rPr lang="en-US" i="1">
-                                          <a:latin typeface="Cambria Math" panose="02040503050406030204" pitchFamily="18" charset="0"/>
+                                          <a:latin typeface="Cambria Math"/>
                                         </a:rPr>
                                       </m:ctrlPr>
                                     </m:sSubPr>
@@ -14108,7 +14108,7 @@
                           <m:endChr m:val="]"/>
                           <m:ctrlPr>
                             <a:rPr lang="en-US" i="1">
-                              <a:latin typeface="Cambria Math" panose="02040503050406030204" pitchFamily="18" charset="0"/>
+                              <a:latin typeface="Cambria Math"/>
                             </a:rPr>
                           </m:ctrlPr>
                         </m:dPr>
@@ -14117,7 +14117,7 @@
                             <m:eqArrPr>
                               <m:ctrlPr>
                                 <a:rPr lang="en-US" i="1">
-                                  <a:latin typeface="Cambria Math" panose="02040503050406030204" pitchFamily="18" charset="0"/>
+                                  <a:latin typeface="Cambria Math"/>
                                 </a:rPr>
                               </m:ctrlPr>
                             </m:eqArrPr>
@@ -14126,7 +14126,7 @@
                                 <m:eqArrPr>
                                   <m:ctrlPr>
                                     <a:rPr lang="en-US" i="1">
-                                      <a:latin typeface="Cambria Math" panose="02040503050406030204" pitchFamily="18" charset="0"/>
+                                      <a:latin typeface="Cambria Math"/>
                                     </a:rPr>
                                   </m:ctrlPr>
                                 </m:eqArrPr>
@@ -14151,7 +14151,7 @@
                                     <m:sSubPr>
                                       <m:ctrlPr>
                                         <a:rPr lang="en-US" i="1">
-                                          <a:latin typeface="Cambria Math" panose="02040503050406030204" pitchFamily="18" charset="0"/>
+                                          <a:latin typeface="Cambria Math"/>
                                         </a:rPr>
                                       </m:ctrlPr>
                                     </m:sSubPr>
@@ -14178,7 +14178,7 @@
                                     <m:sSubPr>
                                       <m:ctrlPr>
                                         <a:rPr lang="en-US" i="1">
-                                          <a:latin typeface="Cambria Math" panose="02040503050406030204" pitchFamily="18" charset="0"/>
+                                          <a:latin typeface="Cambria Math"/>
                                         </a:rPr>
                                       </m:ctrlPr>
                                     </m:sSubPr>
@@ -14211,7 +14211,7 @@
                                     <m:sSubPr>
                                       <m:ctrlPr>
                                         <a:rPr lang="en-US" i="1">
-                                          <a:latin typeface="Cambria Math" panose="02040503050406030204" pitchFamily="18" charset="0"/>
+                                          <a:latin typeface="Cambria Math"/>
                                         </a:rPr>
                                       </m:ctrlPr>
                                     </m:sSubPr>
@@ -14244,7 +14244,7 @@
                                     <m:sSubPr>
                                       <m:ctrlPr>
                                         <a:rPr lang="en-US" i="1">
-                                          <a:latin typeface="Cambria Math" panose="02040503050406030204" pitchFamily="18" charset="0"/>
+                                          <a:latin typeface="Cambria Math"/>
                                         </a:rPr>
                                       </m:ctrlPr>
                                     </m:sSubPr>
@@ -14277,7 +14277,7 @@
                                     <m:sSubPr>
                                       <m:ctrlPr>
                                         <a:rPr lang="en-US" i="1">
-                                          <a:latin typeface="Cambria Math" panose="02040503050406030204" pitchFamily="18" charset="0"/>
+                                          <a:latin typeface="Cambria Math"/>
                                         </a:rPr>
                                       </m:ctrlPr>
                                     </m:sSubPr>
@@ -14312,7 +14312,7 @@
                                 <m:sSubPr>
                                   <m:ctrlPr>
                                     <a:rPr lang="en-US" i="1">
-                                      <a:latin typeface="Cambria Math" panose="02040503050406030204" pitchFamily="18" charset="0"/>
+                                      <a:latin typeface="Cambria Math"/>
                                     </a:rPr>
                                   </m:ctrlPr>
                                 </m:sSubPr>
@@ -14345,7 +14345,7 @@
                                 <m:sSubPr>
                                   <m:ctrlPr>
                                     <a:rPr lang="en-US" i="1">
-                                      <a:latin typeface="Cambria Math" panose="02040503050406030204" pitchFamily="18" charset="0"/>
+                                      <a:latin typeface="Cambria Math"/>
                                     </a:rPr>
                                   </m:ctrlPr>
                                 </m:sSubPr>
@@ -14378,7 +14378,7 @@
                                 <m:sSubPr>
                                   <m:ctrlPr>
                                     <a:rPr lang="en-US" i="1">
-                                      <a:latin typeface="Cambria Math" panose="02040503050406030204" pitchFamily="18" charset="0"/>
+                                      <a:latin typeface="Cambria Math"/>
                                     </a:rPr>
                                   </m:ctrlPr>
                                 </m:sSubPr>
@@ -14411,7 +14411,7 @@
                                 <m:sSubPr>
                                   <m:ctrlPr>
                                     <a:rPr lang="en-US" i="1">
-                                      <a:latin typeface="Cambria Math" panose="02040503050406030204" pitchFamily="18" charset="0"/>
+                                      <a:latin typeface="Cambria Math"/>
                                     </a:rPr>
                                   </m:ctrlPr>
                                 </m:sSubPr>
@@ -14992,7 +14992,7 @@
                         <m:sSubPr>
                           <m:ctrlPr>
                             <a:rPr lang="en-US" i="1" smtClean="0">
-                              <a:latin typeface="Cambria Math" panose="02040503050406030204" pitchFamily="18" charset="0"/>
+                              <a:latin typeface="Cambria Math"/>
                             </a:rPr>
                           </m:ctrlPr>
                         </m:sSubPr>
@@ -15035,7 +15035,7 @@
                         <m:sSubPr>
                           <m:ctrlPr>
                             <a:rPr lang="en-US" i="1">
-                              <a:latin typeface="Cambria Math" panose="02040503050406030204" pitchFamily="18" charset="0"/>
+                              <a:latin typeface="Cambria Math"/>
                             </a:rPr>
                           </m:ctrlPr>
                         </m:sSubPr>
@@ -15078,7 +15078,7 @@
                         <m:sSubPr>
                           <m:ctrlPr>
                             <a:rPr lang="en-US" i="1">
-                              <a:latin typeface="Cambria Math" panose="02040503050406030204" pitchFamily="18" charset="0"/>
+                              <a:latin typeface="Cambria Math"/>
                             </a:rPr>
                           </m:ctrlPr>
                         </m:sSubPr>
@@ -15121,7 +15121,7 @@
                         <m:sSubPr>
                           <m:ctrlPr>
                             <a:rPr lang="en-US" i="1">
-                              <a:latin typeface="Cambria Math" panose="02040503050406030204" pitchFamily="18" charset="0"/>
+                              <a:latin typeface="Cambria Math"/>
                             </a:rPr>
                           </m:ctrlPr>
                         </m:sSubPr>
@@ -15164,7 +15164,7 @@
                         <m:fPr>
                           <m:ctrlPr>
                             <a:rPr lang="en-US" b="0" i="1" smtClean="0">
-                              <a:latin typeface="Cambria Math" panose="02040503050406030204" pitchFamily="18" charset="0"/>
+                              <a:latin typeface="Cambria Math"/>
                             </a:rPr>
                           </m:ctrlPr>
                         </m:fPr>
@@ -15204,7 +15204,7 @@
                         <m:sSubPr>
                           <m:ctrlPr>
                             <a:rPr lang="en-US" i="1">
-                              <a:latin typeface="Cambria Math" panose="02040503050406030204" pitchFamily="18" charset="0"/>
+                              <a:latin typeface="Cambria Math"/>
                             </a:rPr>
                           </m:ctrlPr>
                         </m:sSubPr>
@@ -15247,7 +15247,7 @@
                         <m:sSubPr>
                           <m:ctrlPr>
                             <a:rPr lang="en-US" i="1">
-                              <a:latin typeface="Cambria Math" panose="02040503050406030204" pitchFamily="18" charset="0"/>
+                              <a:latin typeface="Cambria Math"/>
                             </a:rPr>
                           </m:ctrlPr>
                         </m:sSubPr>
@@ -15290,7 +15290,7 @@
                         <m:sSubPr>
                           <m:ctrlPr>
                             <a:rPr lang="en-US" i="1">
-                              <a:latin typeface="Cambria Math" panose="02040503050406030204" pitchFamily="18" charset="0"/>
+                              <a:latin typeface="Cambria Math"/>
                             </a:rPr>
                           </m:ctrlPr>
                         </m:sSubPr>
@@ -15333,7 +15333,7 @@
                         <m:sSubPr>
                           <m:ctrlPr>
                             <a:rPr lang="en-US" i="1">
-                              <a:latin typeface="Cambria Math" panose="02040503050406030204" pitchFamily="18" charset="0"/>
+                              <a:latin typeface="Cambria Math"/>
                             </a:rPr>
                           </m:ctrlPr>
                         </m:sSubPr>
@@ -15376,7 +15376,7 @@
                         <m:fPr>
                           <m:ctrlPr>
                             <a:rPr lang="en-US" b="0" i="1" smtClean="0">
-                              <a:latin typeface="Cambria Math" panose="02040503050406030204" pitchFamily="18" charset="0"/>
+                              <a:latin typeface="Cambria Math"/>
                             </a:rPr>
                           </m:ctrlPr>
                         </m:fPr>
@@ -17856,7 +17856,7 @@
                         <m:sSubPr>
                           <m:ctrlPr>
                             <a:rPr lang="en-US" i="1">
-                              <a:latin typeface="Cambria Math" panose="02040503050406030204" pitchFamily="18" charset="0"/>
+                              <a:latin typeface="Cambria Math"/>
                             </a:rPr>
                           </m:ctrlPr>
                         </m:sSubPr>
@@ -17899,7 +17899,7 @@
                         <m:sSubPr>
                           <m:ctrlPr>
                             <a:rPr lang="en-US" i="1">
-                              <a:latin typeface="Cambria Math" panose="02040503050406030204" pitchFamily="18" charset="0"/>
+                              <a:latin typeface="Cambria Math"/>
                             </a:rPr>
                           </m:ctrlPr>
                         </m:sSubPr>
@@ -17942,7 +17942,7 @@
                         <m:sSubPr>
                           <m:ctrlPr>
                             <a:rPr lang="en-US" i="1">
-                              <a:latin typeface="Cambria Math" panose="02040503050406030204" pitchFamily="18" charset="0"/>
+                              <a:latin typeface="Cambria Math"/>
                             </a:rPr>
                           </m:ctrlPr>
                         </m:sSubPr>
@@ -17985,7 +17985,7 @@
                         <m:fPr>
                           <m:ctrlPr>
                             <a:rPr lang="en-US" i="1" smtClean="0">
-                              <a:latin typeface="Cambria Math" panose="02040503050406030204" pitchFamily="18" charset="0"/>
+                              <a:latin typeface="Cambria Math"/>
                             </a:rPr>
                           </m:ctrlPr>
                         </m:fPr>
@@ -19243,7 +19243,7 @@
                         <m:sSubPr>
                           <m:ctrlPr>
                             <a:rPr lang="en-US" i="1" smtClean="0">
-                              <a:latin typeface="Cambria Math" panose="02040503050406030204" pitchFamily="18" charset="0"/>
+                              <a:latin typeface="Cambria Math"/>
                             </a:rPr>
                           </m:ctrlPr>
                         </m:sSubPr>
@@ -19274,7 +19274,7 @@
                         <m:sSubPr>
                           <m:ctrlPr>
                             <a:rPr lang="en-US" i="1">
-                              <a:latin typeface="Cambria Math" panose="02040503050406030204" pitchFamily="18" charset="0"/>
+                              <a:latin typeface="Cambria Math"/>
                             </a:rPr>
                           </m:ctrlPr>
                         </m:sSubPr>
@@ -19311,7 +19311,7 @@
                         <m:sSubPr>
                           <m:ctrlPr>
                             <a:rPr lang="en-US" i="1">
-                              <a:latin typeface="Cambria Math" panose="02040503050406030204" pitchFamily="18" charset="0"/>
+                              <a:latin typeface="Cambria Math"/>
                             </a:rPr>
                           </m:ctrlPr>
                         </m:sSubPr>
@@ -19342,7 +19342,7 @@
                         <m:sSubPr>
                           <m:ctrlPr>
                             <a:rPr lang="en-US" i="1">
-                              <a:latin typeface="Cambria Math" panose="02040503050406030204" pitchFamily="18" charset="0"/>
+                              <a:latin typeface="Cambria Math"/>
                             </a:rPr>
                           </m:ctrlPr>
                         </m:sSubPr>
@@ -19379,7 +19379,7 @@
                         <m:naryPr>
                           <m:ctrlPr>
                             <a:rPr lang="en-US" b="0" i="1" smtClean="0">
-                              <a:latin typeface="Cambria Math" panose="02040503050406030204" pitchFamily="18" charset="0"/>
+                              <a:latin typeface="Cambria Math"/>
                             </a:rPr>
                           </m:ctrlPr>
                         </m:naryPr>
@@ -19388,7 +19388,7 @@
                             <m:sSupPr>
                               <m:ctrlPr>
                                 <a:rPr lang="en-US" b="0" i="1" smtClean="0">
-                                  <a:latin typeface="Cambria Math" panose="02040503050406030204" pitchFamily="18" charset="0"/>
+                                  <a:latin typeface="Cambria Math"/>
                                 </a:rPr>
                               </m:ctrlPr>
                             </m:sSupPr>
@@ -19415,7 +19415,7 @@
                             <m:sSupPr>
                               <m:ctrlPr>
                                 <a:rPr lang="en-US" b="0" i="1" smtClean="0">
-                                  <a:latin typeface="Cambria Math" panose="02040503050406030204" pitchFamily="18" charset="0"/>
+                                  <a:latin typeface="Cambria Math"/>
                                 </a:rPr>
                               </m:ctrlPr>
                             </m:sSupPr>
@@ -19448,7 +19448,7 @@
                             <m:dPr>
                               <m:ctrlPr>
                                 <a:rPr lang="en-US" b="0" i="1" smtClean="0">
-                                  <a:latin typeface="Cambria Math" panose="02040503050406030204" pitchFamily="18" charset="0"/>
+                                  <a:latin typeface="Cambria Math"/>
                                 </a:rPr>
                               </m:ctrlPr>
                             </m:dPr>
@@ -20307,7 +20307,12 @@
             <p:ph type="title"/>
           </p:nvPr>
         </p:nvSpPr>
-        <p:spPr/>
+        <p:spPr>
+          <a:xfrm>
+            <a:off x="972080" y="0"/>
+            <a:ext cx="9905998" cy="1478570"/>
+          </a:xfrm>
+        </p:spPr>
         <p:txBody>
           <a:bodyPr/>
           <a:lstStyle/>
@@ -20330,49 +20335,65 @@
             <p:ph idx="1"/>
           </p:nvPr>
         </p:nvSpPr>
-        <p:spPr/>
+        <p:spPr>
+          <a:xfrm>
+            <a:off x="1073679" y="1622953"/>
+            <a:ext cx="9905999" cy="3541714"/>
+          </a:xfrm>
+        </p:spPr>
         <p:txBody>
-          <a:bodyPr/>
+          <a:bodyPr>
+            <a:noAutofit/>
+          </a:bodyPr>
           <a:lstStyle/>
           <a:p>
-            <a:r>
-              <a:rPr lang="en-US" dirty="0" smtClean="0"/>
+            <a:pPr marL="0" indent="0">
+              <a:buNone/>
+            </a:pPr>
+            <a:r>
+              <a:rPr lang="en-US" sz="2800" dirty="0" smtClean="0"/>
               <a:t>Benefits of pneumatics over other power sources</a:t>
             </a:r>
           </a:p>
           <a:p>
-            <a:r>
-              <a:rPr lang="en-US" dirty="0" smtClean="0"/>
+            <a:pPr marL="0" indent="0">
+              <a:buNone/>
+            </a:pPr>
+            <a:r>
+              <a:rPr lang="en-US" sz="2800" dirty="0" smtClean="0"/>
               <a:t>Component Specifications</a:t>
             </a:r>
           </a:p>
           <a:p>
             <a:pPr lvl="1"/>
             <a:r>
-              <a:rPr lang="en-US" dirty="0" smtClean="0"/>
+              <a:rPr lang="en-US" sz="2800" dirty="0" smtClean="0"/>
               <a:t>Air Cylinders</a:t>
             </a:r>
           </a:p>
           <a:p>
             <a:pPr lvl="1"/>
             <a:r>
-              <a:rPr lang="en-US" dirty="0" smtClean="0"/>
+              <a:rPr lang="en-US" sz="2800" dirty="0" smtClean="0"/>
               <a:t>Directional Control Valves</a:t>
             </a:r>
           </a:p>
           <a:p>
             <a:pPr lvl="1"/>
             <a:r>
-              <a:rPr lang="en-US" dirty="0" smtClean="0"/>
+              <a:rPr lang="en-US" sz="2800" dirty="0" smtClean="0"/>
               <a:t>Air Compressors</a:t>
             </a:r>
           </a:p>
           <a:p>
-            <a:r>
-              <a:rPr lang="en-US" dirty="0" smtClean="0"/>
+            <a:pPr marL="0" indent="0">
+              <a:buNone/>
+            </a:pPr>
+            <a:r>
+              <a:rPr lang="en-US" sz="2800" dirty="0" smtClean="0"/>
               <a:t>Other circuit components</a:t>
             </a:r>
-            <a:endParaRPr lang="en-US" dirty="0"/>
+            <a:endParaRPr lang="en-US" sz="2800" dirty="0"/>
           </a:p>
         </p:txBody>
       </p:sp>
@@ -21651,7 +21672,7 @@
         </p:blipFill>
         <p:spPr>
           <a:xfrm>
-            <a:off x="5791200" y="1295400"/>
+            <a:off x="5926666" y="1756615"/>
             <a:ext cx="5903472" cy="1478408"/>
           </a:xfrm>
           <a:prstGeom prst="rect">
@@ -21659,8 +21680,8 @@
           </a:prstGeom>
         </p:spPr>
       </p:pic>
-      <mc:AlternateContent xmlns:mc="http://schemas.openxmlformats.org/markup-compatibility/2006" xmlns:a14="http://schemas.microsoft.com/office/drawing/2010/main">
-        <mc:Choice Requires="a14">
+      <mc:AlternateContent xmlns:mc="http://schemas.openxmlformats.org/markup-compatibility/2006">
+        <mc:Choice xmlns:a14="http://schemas.microsoft.com/office/drawing/2010/main" Requires="a14">
           <p:sp>
             <p:nvSpPr>
               <p:cNvPr id="5" name="TextBox 4"/>
@@ -21669,8 +21690,8 @@
             </p:nvSpPr>
             <p:spPr>
               <a:xfrm>
-                <a:off x="7164889" y="2779112"/>
-                <a:ext cx="4239364" cy="390748"/>
+                <a:off x="6570135" y="3489029"/>
+                <a:ext cx="5046132" cy="899733"/>
               </a:xfrm>
               <a:prstGeom prst="rect">
                 <a:avLst/>
@@ -21691,13 +21712,13 @@
                     </m:oMathParaPr>
                     <m:oMath xmlns:m="http://schemas.openxmlformats.org/officeDocument/2006/math">
                       <m:r>
-                        <a:rPr lang="en-US" i="1">
+                        <a:rPr lang="en-US" sz="3200" i="1">
                           <a:latin typeface="Cambria Math"/>
                         </a:rPr>
                         <m:t>𝐹</m:t>
                       </m:r>
                       <m:r>
-                        <a:rPr lang="en-US" i="1">
+                        <a:rPr lang="en-US" sz="3200" i="1">
                           <a:latin typeface="Cambria Math"/>
                         </a:rPr>
                         <m:t> =</m:t>
@@ -21705,14 +21726,14 @@
                       <m:sSub>
                         <m:sSubPr>
                           <m:ctrlPr>
-                            <a:rPr lang="en-US" i="1">
-                              <a:latin typeface="Cambria Math" panose="02040503050406030204" pitchFamily="18" charset="0"/>
+                            <a:rPr lang="en-US" sz="3200" i="1">
+                              <a:latin typeface="Cambria Math"/>
                             </a:rPr>
                           </m:ctrlPr>
                         </m:sSubPr>
                         <m:e>
                           <m:r>
-                            <a:rPr lang="en-US" i="1">
+                            <a:rPr lang="en-US" sz="3200" i="1">
                               <a:latin typeface="Cambria Math"/>
                             </a:rPr>
                             <m:t>𝑃</m:t>
@@ -21720,7 +21741,7 @@
                         </m:e>
                         <m:sub>
                           <m:r>
-                            <a:rPr lang="en-US" i="1">
+                            <a:rPr lang="en-US" sz="3200" i="1">
                               <a:latin typeface="Cambria Math"/>
                             </a:rPr>
                             <m:t>𝑐𝑎𝑝</m:t>
@@ -21730,14 +21751,14 @@
                       <m:sSub>
                         <m:sSubPr>
                           <m:ctrlPr>
-                            <a:rPr lang="en-US" i="1">
-                              <a:latin typeface="Cambria Math" panose="02040503050406030204" pitchFamily="18" charset="0"/>
+                            <a:rPr lang="en-US" sz="3200" i="1">
+                              <a:latin typeface="Cambria Math"/>
                             </a:rPr>
                           </m:ctrlPr>
                         </m:sSubPr>
                         <m:e>
                           <m:r>
-                            <a:rPr lang="en-US" i="1">
+                            <a:rPr lang="en-US" sz="3200" i="1">
                               <a:latin typeface="Cambria Math"/>
                             </a:rPr>
                             <m:t>𝐴</m:t>
@@ -21745,7 +21766,7 @@
                         </m:e>
                         <m:sub>
                           <m:r>
-                            <a:rPr lang="en-US" i="1">
+                            <a:rPr lang="en-US" sz="3200" i="1">
                               <a:latin typeface="Cambria Math"/>
                             </a:rPr>
                             <m:t>𝑐𝑎𝑝</m:t>
@@ -21753,7 +21774,7 @@
                         </m:sub>
                       </m:sSub>
                       <m:r>
-                        <a:rPr lang="en-US" i="1">
+                        <a:rPr lang="en-US" sz="3200" i="1">
                           <a:latin typeface="Cambria Math"/>
                         </a:rPr>
                         <m:t> −</m:t>
@@ -21761,14 +21782,14 @@
                       <m:sSub>
                         <m:sSubPr>
                           <m:ctrlPr>
-                            <a:rPr lang="en-US" i="1">
-                              <a:latin typeface="Cambria Math" panose="02040503050406030204" pitchFamily="18" charset="0"/>
+                            <a:rPr lang="en-US" sz="3200" i="1">
+                              <a:latin typeface="Cambria Math"/>
                             </a:rPr>
                           </m:ctrlPr>
                         </m:sSubPr>
                         <m:e>
                           <m:r>
-                            <a:rPr lang="en-US" i="1">
+                            <a:rPr lang="en-US" sz="3200" i="1">
                               <a:latin typeface="Cambria Math"/>
                             </a:rPr>
                             <m:t>𝑃</m:t>
@@ -21776,7 +21797,7 @@
                         </m:e>
                         <m:sub>
                           <m:r>
-                            <a:rPr lang="en-US" i="1">
+                            <a:rPr lang="en-US" sz="3200" i="1">
                               <a:latin typeface="Cambria Math"/>
                             </a:rPr>
                             <m:t>𝑟𝑜𝑑</m:t>
@@ -21786,14 +21807,14 @@
                       <m:sSub>
                         <m:sSubPr>
                           <m:ctrlPr>
-                            <a:rPr lang="en-US" i="1">
-                              <a:latin typeface="Cambria Math" panose="02040503050406030204" pitchFamily="18" charset="0"/>
+                            <a:rPr lang="en-US" sz="3200" i="1">
+                              <a:latin typeface="Cambria Math"/>
                             </a:rPr>
                           </m:ctrlPr>
                         </m:sSubPr>
                         <m:e>
                           <m:r>
-                            <a:rPr lang="en-US" i="1">
+                            <a:rPr lang="en-US" sz="3200" i="1">
                               <a:latin typeface="Cambria Math"/>
                             </a:rPr>
                             <m:t>𝐴</m:t>
@@ -21801,7 +21822,7 @@
                         </m:e>
                         <m:sub>
                           <m:r>
-                            <a:rPr lang="en-US" i="1">
+                            <a:rPr lang="en-US" sz="3200" i="1">
                               <a:latin typeface="Cambria Math"/>
                             </a:rPr>
                             <m:t>𝑟𝑜𝑑</m:t>
@@ -21811,12 +21832,16 @@
                     </m:oMath>
                   </m:oMathPara>
                 </a14:m>
+                <a:endParaRPr lang="en-US" sz="3200" dirty="0" smtClean="0"/>
+              </a:p>
+              <a:p>
+                <a:pPr/>
                 <a:endParaRPr lang="en-US" dirty="0"/>
               </a:p>
             </p:txBody>
           </p:sp>
         </mc:Choice>
-        <mc:Fallback xmlns="">
+        <mc:Fallback>
           <p:sp>
             <p:nvSpPr>
               <p:cNvPr id="5" name="TextBox 4"/>
@@ -21827,16 +21852,16 @@
             </p:nvSpPr>
             <p:spPr>
               <a:xfrm>
-                <a:off x="7164889" y="2779112"/>
-                <a:ext cx="4239364" cy="390748"/>
+                <a:off x="6570135" y="3489029"/>
+                <a:ext cx="5046132" cy="899733"/>
               </a:xfrm>
               <a:prstGeom prst="rect">
                 <a:avLst/>
               </a:prstGeom>
-              <a:blipFill rotWithShape="0">
+              <a:blipFill rotWithShape="1">
                 <a:blip r:embed="rId3"/>
                 <a:stretch>
-                  <a:fillRect b="-3125"/>
+                  <a:fillRect/>
                 </a:stretch>
               </a:blipFill>
             </p:spPr>
@@ -21864,7 +21889,7 @@
         <p:spPr>
           <a:xfrm>
             <a:off x="508000" y="1600200"/>
-            <a:ext cx="5181600" cy="1569660"/>
+            <a:ext cx="5181600" cy="1384995"/>
           </a:xfrm>
           <a:prstGeom prst="rect">
             <a:avLst/>
@@ -21882,24 +21907,22 @@
               <a:buChar char="•"/>
             </a:pPr>
             <a:r>
-              <a:rPr lang="en-US" sz="2400" dirty="0" smtClean="0"/>
-              <a:t>Converts fluid power into mechanical power</a:t>
-            </a:r>
+              <a:rPr lang="en-US" sz="2800" dirty="0" smtClean="0"/>
+              <a:t>Converts fluid power into mechanical </a:t>
+            </a:r>
+            <a:r>
+              <a:rPr lang="en-US" sz="2800" dirty="0" smtClean="0"/>
+              <a:t>power</a:t>
+            </a:r>
+            <a:endParaRPr lang="en-US" sz="2800" dirty="0"/>
           </a:p>
           <a:p>
             <a:pPr marL="457200" indent="-457200">
               <a:buFont typeface="Arial" panose="020B0604020202020204" pitchFamily="34" charset="0"/>
               <a:buChar char="•"/>
             </a:pPr>
-            <a:endParaRPr lang="en-US" sz="2400" dirty="0"/>
-          </a:p>
-          <a:p>
-            <a:pPr marL="457200" indent="-457200">
-              <a:buFont typeface="Arial" panose="020B0604020202020204" pitchFamily="34" charset="0"/>
-              <a:buChar char="•"/>
-            </a:pPr>
-            <a:r>
-              <a:rPr lang="en-US" sz="2400" dirty="0" smtClean="0"/>
+            <a:r>
+              <a:rPr lang="en-US" sz="2800" dirty="0" smtClean="0"/>
               <a:t>Position Feedback Sensor</a:t>
             </a:r>
           </a:p>
@@ -21914,7 +21937,7 @@
         <p:spPr>
           <a:xfrm>
             <a:off x="609600" y="3505200"/>
-            <a:ext cx="7620000" cy="2400657"/>
+            <a:ext cx="7620000" cy="2608215"/>
           </a:xfrm>
           <a:prstGeom prst="rect">
             <a:avLst/>
@@ -21934,9 +21957,21 @@
             </a:pPr>
             <a:r>
               <a:rPr lang="en-US" sz="2800" dirty="0" smtClean="0"/>
-              <a:t>Specifications determined by:</a:t>
-            </a:r>
-            <a:endParaRPr lang="en-US" sz="2400" dirty="0"/>
+              <a:t>Specifications </a:t>
+            </a:r>
+            <a:r>
+              <a:rPr lang="en-US" sz="2800" dirty="0" smtClean="0"/>
+              <a:t>limited</a:t>
+            </a:r>
+            <a:r>
+              <a:rPr lang="en-US" sz="2800" dirty="0" smtClean="0"/>
+              <a:t> </a:t>
+            </a:r>
+            <a:r>
+              <a:rPr lang="en-US" sz="2800" dirty="0" smtClean="0"/>
+              <a:t>by:</a:t>
+            </a:r>
+            <a:endParaRPr lang="en-US" sz="2800" dirty="0"/>
           </a:p>
           <a:p>
             <a:pPr>
@@ -21945,10 +21980,10 @@
               </a:lnSpc>
             </a:pPr>
             <a:r>
-              <a:rPr lang="en-US" sz="2400" dirty="0" smtClean="0"/>
-              <a:t>-Appropriate bore diameter</a:t>
-            </a:r>
-            <a:endParaRPr lang="en-US" sz="2400" dirty="0"/>
+              <a:rPr lang="en-US" sz="2800" dirty="0" smtClean="0"/>
+              <a:t>-Volume available for cylinder placement</a:t>
+            </a:r>
+            <a:endParaRPr lang="en-US" sz="2800" dirty="0"/>
           </a:p>
           <a:p>
             <a:pPr>
@@ -21957,10 +21992,14 @@
               </a:lnSpc>
             </a:pPr>
             <a:r>
-              <a:rPr lang="en-US" sz="2400" dirty="0" smtClean="0"/>
-              <a:t>-Appropriate necessary pressure</a:t>
-            </a:r>
-            <a:endParaRPr lang="en-US" sz="2400" dirty="0"/>
+              <a:rPr lang="en-US" sz="2800" dirty="0" smtClean="0"/>
+              <a:t>-Necessary </a:t>
+            </a:r>
+            <a:r>
+              <a:rPr lang="en-US" sz="2800" dirty="0" smtClean="0"/>
+              <a:t>pressure</a:t>
+            </a:r>
+            <a:endParaRPr lang="en-US" sz="2800" dirty="0"/>
           </a:p>
           <a:p>
             <a:pPr>
@@ -21969,8 +22008,12 @@
               </a:lnSpc>
             </a:pPr>
             <a:r>
-              <a:rPr lang="en-US" sz="2400" dirty="0" smtClean="0"/>
-              <a:t>-Appropriate necessary volumetric flow rate</a:t>
+              <a:rPr lang="en-US" sz="2800" dirty="0" smtClean="0"/>
+              <a:t>-Necessary </a:t>
+            </a:r>
+            <a:r>
+              <a:rPr lang="en-US" sz="2800" dirty="0" smtClean="0"/>
+              <a:t>volumetric flow rate</a:t>
             </a:r>
           </a:p>
         </p:txBody>
@@ -22017,8 +22060,8 @@
         </p:nvSpPr>
         <p:spPr>
           <a:xfrm>
-            <a:off x="609600" y="255141"/>
-            <a:ext cx="10972800" cy="563562"/>
+            <a:off x="3335866" y="238207"/>
+            <a:ext cx="6620933" cy="563562"/>
           </a:xfrm>
         </p:spPr>
         <p:txBody>
@@ -22029,14 +22072,18 @@
           <a:p>
             <a:r>
               <a:rPr lang="en-US" dirty="0" smtClean="0"/>
-              <a:t>Example Specification</a:t>
+              <a:t>Example </a:t>
+            </a:r>
+            <a:r>
+              <a:rPr lang="en-US" dirty="0" smtClean="0"/>
+              <a:t>Specification process</a:t>
             </a:r>
             <a:endParaRPr lang="en-US" dirty="0"/>
           </a:p>
         </p:txBody>
       </p:sp>
-      <mc:AlternateContent xmlns:mc="http://schemas.openxmlformats.org/markup-compatibility/2006" xmlns:a14="http://schemas.microsoft.com/office/drawing/2010/main">
-        <mc:Choice Requires="a14">
+      <mc:AlternateContent xmlns:mc="http://schemas.openxmlformats.org/markup-compatibility/2006">
+        <mc:Choice xmlns:a14="http://schemas.microsoft.com/office/drawing/2010/main" Requires="a14">
           <p:sp>
             <p:nvSpPr>
               <p:cNvPr id="3" name="Content Placeholder 2"/>
@@ -22049,13 +22096,13 @@
             </p:nvSpPr>
             <p:spPr>
               <a:xfrm>
-                <a:off x="152400" y="1026452"/>
-                <a:ext cx="11887200" cy="5678785"/>
+                <a:off x="152400" y="874052"/>
+                <a:ext cx="6062133" cy="5678785"/>
               </a:xfrm>
             </p:spPr>
             <p:txBody>
               <a:bodyPr>
-                <a:normAutofit fontScale="92500" lnSpcReduction="10000"/>
+                <a:normAutofit fontScale="92500" lnSpcReduction="20000"/>
               </a:bodyPr>
               <a:lstStyle/>
               <a:p>
@@ -22077,13 +22124,13 @@
                       <m:rPr>
                         <m:sty m:val="p"/>
                       </m:rPr>
-                      <a:rPr lang="en-US" sz="1800" smtClean="0">
+                      <a:rPr lang="en-US" sz="2200" smtClean="0">
                         <a:latin typeface="Cambria Math"/>
                       </a:rPr>
                       <m:t>P</m:t>
                     </m:r>
                     <m:r>
-                      <a:rPr lang="en-US" sz="1800" smtClean="0">
+                      <a:rPr lang="en-US" sz="2200" smtClean="0">
                         <a:latin typeface="Cambria Math"/>
                       </a:rPr>
                       <m:t>=</m:t>
@@ -22091,8 +22138,8 @@
                     <m:f>
                       <m:fPr>
                         <m:ctrlPr>
-                          <a:rPr lang="en-US" sz="1800" i="1">
-                            <a:latin typeface="Cambria Math" panose="02040503050406030204" pitchFamily="18" charset="0"/>
+                          <a:rPr lang="en-US" sz="2200" i="1">
+                            <a:latin typeface="Cambria Math"/>
                           </a:rPr>
                         </m:ctrlPr>
                       </m:fPr>
@@ -22101,7 +22148,7 @@
                           <m:rPr>
                             <m:sty m:val="p"/>
                           </m:rPr>
-                          <a:rPr lang="en-US" sz="1800">
+                          <a:rPr lang="en-US" sz="2200">
                             <a:latin typeface="Cambria Math"/>
                           </a:rPr>
                           <m:t>F</m:t>
@@ -22111,8 +22158,8 @@
                         <m:sSub>
                           <m:sSubPr>
                             <m:ctrlPr>
-                              <a:rPr lang="en-US" sz="1800" i="1">
-                                <a:latin typeface="Cambria Math" panose="02040503050406030204" pitchFamily="18" charset="0"/>
+                              <a:rPr lang="en-US" sz="2200" i="1">
+                                <a:latin typeface="Cambria Math"/>
                               </a:rPr>
                             </m:ctrlPr>
                           </m:sSubPr>
@@ -22121,7 +22168,7 @@
                               <m:rPr>
                                 <m:sty m:val="p"/>
                               </m:rPr>
-                              <a:rPr lang="en-US" sz="1800">
+                              <a:rPr lang="en-US" sz="2200">
                                 <a:latin typeface="Cambria Math"/>
                               </a:rPr>
                               <m:t>A</m:t>
@@ -22132,7 +22179,7 @@
                               <m:rPr>
                                 <m:sty m:val="p"/>
                               </m:rPr>
-                              <a:rPr lang="en-US" sz="1800">
+                              <a:rPr lang="en-US" sz="2200">
                                 <a:latin typeface="Cambria Math"/>
                               </a:rPr>
                               <m:t>cap</m:t>
@@ -22142,7 +22189,7 @@
                       </m:den>
                     </m:f>
                     <m:r>
-                      <a:rPr lang="en-US" sz="1800" b="0" i="1" smtClean="0">
+                      <a:rPr lang="en-US" sz="2200" b="0" i="1" smtClean="0">
                         <a:latin typeface="Cambria Math"/>
                       </a:rPr>
                       <m:t>= </m:t>
@@ -22150,14 +22197,14 @@
                     <m:f>
                       <m:fPr>
                         <m:ctrlPr>
-                          <a:rPr lang="en-US" sz="1800" b="0" i="1" smtClean="0">
-                            <a:latin typeface="Cambria Math" panose="02040503050406030204" pitchFamily="18" charset="0"/>
+                          <a:rPr lang="en-US" sz="2200" b="0" i="1" smtClean="0">
+                            <a:latin typeface="Cambria Math"/>
                           </a:rPr>
                         </m:ctrlPr>
                       </m:fPr>
                       <m:num>
                         <m:r>
-                          <a:rPr lang="en-US" sz="1800" b="0" i="1" smtClean="0">
+                          <a:rPr lang="en-US" sz="2200" b="0" i="1" smtClean="0">
                             <a:latin typeface="Cambria Math"/>
                           </a:rPr>
                           <m:t>178 </m:t>
@@ -22165,14 +22212,14 @@
                         <m:sSub>
                           <m:sSubPr>
                             <m:ctrlPr>
-                              <a:rPr lang="en-US" sz="1800" b="0" i="1" smtClean="0">
-                                <a:latin typeface="Cambria Math" panose="02040503050406030204" pitchFamily="18" charset="0"/>
+                              <a:rPr lang="en-US" sz="2200" b="0" i="1" smtClean="0">
+                                <a:latin typeface="Cambria Math"/>
                               </a:rPr>
                             </m:ctrlPr>
                           </m:sSubPr>
                           <m:e>
                             <m:r>
-                              <a:rPr lang="en-US" sz="1800" b="0" i="1" smtClean="0">
+                              <a:rPr lang="en-US" sz="2200" b="0" i="1" smtClean="0">
                                 <a:latin typeface="Cambria Math"/>
                               </a:rPr>
                               <m:t>𝑙𝑏</m:t>
@@ -22180,7 +22227,7 @@
                           </m:e>
                           <m:sub>
                             <m:r>
-                              <a:rPr lang="en-US" sz="1800" b="0" i="1" smtClean="0">
+                              <a:rPr lang="en-US" sz="2200" b="0" i="1" smtClean="0">
                                 <a:latin typeface="Cambria Math"/>
                               </a:rPr>
                               <m:t>𝑓</m:t>
@@ -22190,7 +22237,7 @@
                       </m:num>
                       <m:den>
                         <m:r>
-                          <a:rPr lang="en-US" sz="1800" b="0" i="1" smtClean="0">
+                          <a:rPr lang="en-US" sz="2200" b="0" i="1" smtClean="0">
                             <a:latin typeface="Cambria Math"/>
                           </a:rPr>
                           <m:t>3.1416 </m:t>
@@ -22198,14 +22245,14 @@
                         <m:sSup>
                           <m:sSupPr>
                             <m:ctrlPr>
-                              <a:rPr lang="en-US" sz="1800" b="0" i="1" smtClean="0">
-                                <a:latin typeface="Cambria Math" panose="02040503050406030204" pitchFamily="18" charset="0"/>
+                              <a:rPr lang="en-US" sz="2200" b="0" i="1" smtClean="0">
+                                <a:latin typeface="Cambria Math"/>
                               </a:rPr>
                             </m:ctrlPr>
                           </m:sSupPr>
                           <m:e>
                             <m:r>
-                              <a:rPr lang="en-US" sz="1800" b="0" i="1" smtClean="0">
+                              <a:rPr lang="en-US" sz="2200" b="0" i="1" smtClean="0">
                                 <a:latin typeface="Cambria Math"/>
                               </a:rPr>
                               <m:t>𝑖𝑛</m:t>
@@ -22213,7 +22260,7 @@
                           </m:e>
                           <m:sup>
                             <m:r>
-                              <a:rPr lang="en-US" sz="1800" b="0" i="1" smtClean="0">
+                              <a:rPr lang="en-US" sz="2200" b="0" i="1" smtClean="0">
                                 <a:latin typeface="Cambria Math"/>
                               </a:rPr>
                               <m:t>2</m:t>
@@ -22223,37 +22270,37 @@
                       </m:den>
                     </m:f>
                     <m:r>
-                      <a:rPr lang="en-US" sz="1800" b="0" i="1" smtClean="0">
+                      <a:rPr lang="en-US" sz="2200" b="0" i="1" smtClean="0">
                         <a:latin typeface="Cambria Math"/>
                       </a:rPr>
                       <m:t>=</m:t>
                     </m:r>
                     <m:r>
-                      <a:rPr lang="en-US" sz="1800" b="1" i="1" smtClean="0">
+                      <a:rPr lang="en-US" sz="2200" b="1" i="1" smtClean="0">
                         <a:latin typeface="Cambria Math"/>
                       </a:rPr>
                       <m:t>𝟓𝟔</m:t>
                     </m:r>
                     <m:r>
-                      <a:rPr lang="en-US" sz="1800" b="1" i="1" smtClean="0">
+                      <a:rPr lang="en-US" sz="2200" b="1" i="1" smtClean="0">
                         <a:latin typeface="Cambria Math"/>
                       </a:rPr>
                       <m:t>.</m:t>
                     </m:r>
                     <m:r>
-                      <a:rPr lang="en-US" sz="1800" b="1" i="1" smtClean="0">
+                      <a:rPr lang="en-US" sz="2200" b="1" i="1" smtClean="0">
                         <a:latin typeface="Cambria Math"/>
                       </a:rPr>
                       <m:t>𝟔𝟔</m:t>
                     </m:r>
                     <m:r>
-                      <a:rPr lang="en-US" sz="1800" b="1" i="1" smtClean="0">
+                      <a:rPr lang="en-US" sz="2200" b="1" i="1" smtClean="0">
                         <a:latin typeface="Cambria Math"/>
                       </a:rPr>
                       <m:t> </m:t>
                     </m:r>
                     <m:r>
-                      <a:rPr lang="en-US" sz="1800" b="1" i="1" smtClean="0">
+                      <a:rPr lang="en-US" sz="2200" b="1" i="1" smtClean="0">
                         <a:latin typeface="Cambria Math"/>
                       </a:rPr>
                       <m:t>𝒑𝒔𝒊</m:t>
@@ -22261,7 +22308,7 @@
                   </m:oMath>
                 </a14:m>
                 <a:r>
-                  <a:rPr lang="en-US" sz="1800" b="1" dirty="0" smtClean="0"/>
+                  <a:rPr lang="en-US" sz="2200" b="1" dirty="0" smtClean="0"/>
                   <a:t> </a:t>
                 </a:r>
               </a:p>
@@ -22292,13 +22339,13 @@
                       <m:rPr>
                         <m:sty m:val="p"/>
                       </m:rPr>
-                      <a:rPr lang="en-US" sz="1800" smtClean="0">
+                      <a:rPr lang="en-US" sz="2200" smtClean="0">
                         <a:latin typeface="Cambria Math"/>
                       </a:rPr>
                       <m:t>P</m:t>
                     </m:r>
                     <m:r>
-                      <a:rPr lang="en-US" sz="1800" smtClean="0">
+                      <a:rPr lang="en-US" sz="2200" smtClean="0">
                         <a:latin typeface="Cambria Math"/>
                       </a:rPr>
                       <m:t>=</m:t>
@@ -22306,8 +22353,8 @@
                     <m:f>
                       <m:fPr>
                         <m:ctrlPr>
-                          <a:rPr lang="en-US" sz="1800" i="1">
-                            <a:latin typeface="Cambria Math" panose="02040503050406030204" pitchFamily="18" charset="0"/>
+                          <a:rPr lang="en-US" sz="2200" i="1">
+                            <a:latin typeface="Cambria Math"/>
                           </a:rPr>
                         </m:ctrlPr>
                       </m:fPr>
@@ -22316,7 +22363,7 @@
                           <m:rPr>
                             <m:sty m:val="p"/>
                           </m:rPr>
-                          <a:rPr lang="en-US" sz="1800">
+                          <a:rPr lang="en-US" sz="2200">
                             <a:latin typeface="Cambria Math"/>
                           </a:rPr>
                           <m:t>F</m:t>
@@ -22326,8 +22373,8 @@
                         <m:sSub>
                           <m:sSubPr>
                             <m:ctrlPr>
-                              <a:rPr lang="en-US" sz="1800" i="1">
-                                <a:latin typeface="Cambria Math" panose="02040503050406030204" pitchFamily="18" charset="0"/>
+                              <a:rPr lang="en-US" sz="2200" i="1">
+                                <a:latin typeface="Cambria Math"/>
                               </a:rPr>
                             </m:ctrlPr>
                           </m:sSubPr>
@@ -22336,7 +22383,7 @@
                               <m:rPr>
                                 <m:sty m:val="p"/>
                               </m:rPr>
-                              <a:rPr lang="en-US" sz="1800">
+                              <a:rPr lang="en-US" sz="2200">
                                 <a:latin typeface="Cambria Math"/>
                               </a:rPr>
                               <m:t>A</m:t>
@@ -22347,7 +22394,7 @@
                               <m:rPr>
                                 <m:sty m:val="p"/>
                               </m:rPr>
-                              <a:rPr lang="en-US" sz="1800">
+                              <a:rPr lang="en-US" sz="2200">
                                 <a:latin typeface="Cambria Math"/>
                               </a:rPr>
                               <m:t>cap</m:t>
@@ -22355,7 +22402,7 @@
                           </m:sub>
                         </m:sSub>
                         <m:r>
-                          <a:rPr lang="en-US" sz="1800" b="0" i="1" smtClean="0">
+                          <a:rPr lang="en-US" sz="2200" b="0" i="1" smtClean="0">
                             <a:latin typeface="Cambria Math"/>
                           </a:rPr>
                           <m:t>−</m:t>
@@ -22363,14 +22410,14 @@
                         <m:sSub>
                           <m:sSubPr>
                             <m:ctrlPr>
-                              <a:rPr lang="en-US" sz="1800" b="0" i="1" smtClean="0">
-                                <a:latin typeface="Cambria Math" panose="02040503050406030204" pitchFamily="18" charset="0"/>
+                              <a:rPr lang="en-US" sz="2200" b="0" i="1" smtClean="0">
+                                <a:latin typeface="Cambria Math"/>
                               </a:rPr>
                             </m:ctrlPr>
                           </m:sSubPr>
                           <m:e>
                             <m:r>
-                              <a:rPr lang="en-US" sz="1800" b="0" i="1" smtClean="0">
+                              <a:rPr lang="en-US" sz="2200" b="0" i="1" smtClean="0">
                                 <a:latin typeface="Cambria Math"/>
                               </a:rPr>
                               <m:t>𝐴</m:t>
@@ -22378,7 +22425,7 @@
                           </m:e>
                           <m:sub>
                             <m:r>
-                              <a:rPr lang="en-US" sz="1800" b="0" i="1" smtClean="0">
+                              <a:rPr lang="en-US" sz="2200" b="0" i="1" smtClean="0">
                                 <a:latin typeface="Cambria Math"/>
                               </a:rPr>
                               <m:t>𝑟𝑜𝑑</m:t>
@@ -22388,7 +22435,7 @@
                       </m:den>
                     </m:f>
                     <m:r>
-                      <a:rPr lang="en-US" sz="1800" b="0" i="1" smtClean="0">
+                      <a:rPr lang="en-US" sz="2200" b="0" i="1" smtClean="0">
                         <a:latin typeface="Cambria Math"/>
                       </a:rPr>
                       <m:t>= </m:t>
@@ -22396,14 +22443,14 @@
                     <m:f>
                       <m:fPr>
                         <m:ctrlPr>
-                          <a:rPr lang="en-US" sz="1800" b="0" i="1" smtClean="0">
-                            <a:latin typeface="Cambria Math" panose="02040503050406030204" pitchFamily="18" charset="0"/>
+                          <a:rPr lang="en-US" sz="2200" b="0" i="1" smtClean="0">
+                            <a:latin typeface="Cambria Math"/>
                           </a:rPr>
                         </m:ctrlPr>
                       </m:fPr>
                       <m:num>
                         <m:r>
-                          <a:rPr lang="en-US" sz="1800" b="0" i="1" smtClean="0">
+                          <a:rPr lang="en-US" sz="2200" b="0" i="1" smtClean="0">
                             <a:latin typeface="Cambria Math"/>
                           </a:rPr>
                           <m:t>178 </m:t>
@@ -22411,14 +22458,14 @@
                         <m:sSub>
                           <m:sSubPr>
                             <m:ctrlPr>
-                              <a:rPr lang="en-US" sz="1800" b="0" i="1" smtClean="0">
-                                <a:latin typeface="Cambria Math" panose="02040503050406030204" pitchFamily="18" charset="0"/>
+                              <a:rPr lang="en-US" sz="2200" b="0" i="1" smtClean="0">
+                                <a:latin typeface="Cambria Math"/>
                               </a:rPr>
                             </m:ctrlPr>
                           </m:sSubPr>
                           <m:e>
                             <m:r>
-                              <a:rPr lang="en-US" sz="1800" b="0" i="1" smtClean="0">
+                              <a:rPr lang="en-US" sz="2200" b="0" i="1" smtClean="0">
                                 <a:latin typeface="Cambria Math"/>
                               </a:rPr>
                               <m:t>𝑙𝑏</m:t>
@@ -22426,7 +22473,7 @@
                           </m:e>
                           <m:sub>
                             <m:r>
-                              <a:rPr lang="en-US" sz="1800" b="0" i="1" smtClean="0">
+                              <a:rPr lang="en-US" sz="2200" b="0" i="1" smtClean="0">
                                 <a:latin typeface="Cambria Math"/>
                               </a:rPr>
                               <m:t>𝑓</m:t>
@@ -22436,7 +22483,7 @@
                       </m:num>
                       <m:den>
                         <m:r>
-                          <a:rPr lang="en-US" sz="1800" b="0" i="1" smtClean="0">
+                          <a:rPr lang="en-US" sz="2200" b="0" i="1" smtClean="0">
                             <a:latin typeface="Cambria Math"/>
                           </a:rPr>
                           <m:t>3.1416 </m:t>
@@ -22444,14 +22491,14 @@
                         <m:sSup>
                           <m:sSupPr>
                             <m:ctrlPr>
-                              <a:rPr lang="en-US" sz="1800" b="0" i="1" smtClean="0">
-                                <a:latin typeface="Cambria Math" panose="02040503050406030204" pitchFamily="18" charset="0"/>
+                              <a:rPr lang="en-US" sz="2200" b="0" i="1" smtClean="0">
+                                <a:latin typeface="Cambria Math"/>
                               </a:rPr>
                             </m:ctrlPr>
                           </m:sSupPr>
                           <m:e>
                             <m:r>
-                              <a:rPr lang="en-US" sz="1800" b="0" i="1" smtClean="0">
+                              <a:rPr lang="en-US" sz="2200" b="0" i="1" smtClean="0">
                                 <a:latin typeface="Cambria Math"/>
                               </a:rPr>
                               <m:t>𝑖𝑛</m:t>
@@ -22459,7 +22506,7 @@
                           </m:e>
                           <m:sup>
                             <m:r>
-                              <a:rPr lang="en-US" sz="1800" b="0" i="1" smtClean="0">
+                              <a:rPr lang="en-US" sz="2200" b="0" i="1" smtClean="0">
                                 <a:latin typeface="Cambria Math"/>
                               </a:rPr>
                               <m:t>2</m:t>
@@ -22467,7 +22514,7 @@
                           </m:sup>
                         </m:sSup>
                         <m:r>
-                          <a:rPr lang="en-US" sz="1800" b="0" i="1" smtClean="0">
+                          <a:rPr lang="en-US" sz="2200" b="0" i="1" smtClean="0">
                             <a:latin typeface="Cambria Math"/>
                           </a:rPr>
                           <m:t>  −0.196</m:t>
@@ -22475,20 +22522,20 @@
                         <m:sSup>
                           <m:sSupPr>
                             <m:ctrlPr>
-                              <a:rPr lang="en-US" sz="1800" b="0" i="1" smtClean="0">
-                                <a:latin typeface="Cambria Math" panose="02040503050406030204" pitchFamily="18" charset="0"/>
+                              <a:rPr lang="en-US" sz="2200" b="0" i="1" smtClean="0">
+                                <a:latin typeface="Cambria Math"/>
                               </a:rPr>
                             </m:ctrlPr>
                           </m:sSupPr>
                           <m:e>
                             <m:r>
-                              <a:rPr lang="en-US" sz="1800" b="0" i="1" smtClean="0">
+                              <a:rPr lang="en-US" sz="2200" b="0" i="1" smtClean="0">
                                 <a:latin typeface="Cambria Math"/>
                               </a:rPr>
                               <m:t> </m:t>
                             </m:r>
                             <m:r>
-                              <a:rPr lang="en-US" sz="1800" b="0" i="1" smtClean="0">
+                              <a:rPr lang="en-US" sz="2200" b="0" i="1" smtClean="0">
                                 <a:latin typeface="Cambria Math"/>
                               </a:rPr>
                               <m:t>𝑖𝑛</m:t>
@@ -22496,7 +22543,7 @@
                           </m:e>
                           <m:sup>
                             <m:r>
-                              <a:rPr lang="en-US" sz="1800" b="0" i="1" smtClean="0">
+                              <a:rPr lang="en-US" sz="2200" b="0" i="1" smtClean="0">
                                 <a:latin typeface="Cambria Math"/>
                               </a:rPr>
                               <m:t>2</m:t>
@@ -22506,37 +22553,37 @@
                       </m:den>
                     </m:f>
                     <m:r>
-                      <a:rPr lang="en-US" sz="1800" b="0" i="1" smtClean="0">
+                      <a:rPr lang="en-US" sz="2200" b="0" i="1" smtClean="0">
                         <a:latin typeface="Cambria Math"/>
                       </a:rPr>
                       <m:t>=</m:t>
                     </m:r>
                     <m:r>
-                      <a:rPr lang="en-US" sz="1800" b="1" i="1" smtClean="0">
+                      <a:rPr lang="en-US" sz="2200" b="1" i="1" smtClean="0">
                         <a:latin typeface="Cambria Math"/>
                       </a:rPr>
                       <m:t>𝟓𝟔</m:t>
                     </m:r>
                     <m:r>
-                      <a:rPr lang="en-US" sz="1800" b="1" i="1" smtClean="0">
+                      <a:rPr lang="en-US" sz="2200" b="1" i="1" smtClean="0">
                         <a:latin typeface="Cambria Math"/>
                       </a:rPr>
                       <m:t>.</m:t>
                     </m:r>
                     <m:r>
-                      <a:rPr lang="en-US" sz="1800" b="1" i="1" smtClean="0">
+                      <a:rPr lang="en-US" sz="2200" b="1" i="1" smtClean="0">
                         <a:latin typeface="Cambria Math"/>
                       </a:rPr>
                       <m:t>𝟖</m:t>
                     </m:r>
                     <m:r>
-                      <a:rPr lang="en-US" sz="1800" b="1" i="1" smtClean="0">
+                      <a:rPr lang="en-US" sz="2200" b="1" i="1" smtClean="0">
                         <a:latin typeface="Cambria Math"/>
                       </a:rPr>
                       <m:t> </m:t>
                     </m:r>
                     <m:r>
-                      <a:rPr lang="en-US" sz="1800" b="1" i="1" smtClean="0">
+                      <a:rPr lang="en-US" sz="2200" b="1" i="1" smtClean="0">
                         <a:latin typeface="Cambria Math"/>
                       </a:rPr>
                       <m:t>𝒑𝒔𝒊</m:t>
@@ -22544,23 +22591,23 @@
                   </m:oMath>
                 </a14:m>
                 <a:r>
-                  <a:rPr lang="en-US" sz="1800" b="1" dirty="0" smtClean="0"/>
+                  <a:rPr lang="en-US" sz="2200" b="1" dirty="0" smtClean="0"/>
                   <a:t> </a:t>
                 </a:r>
-                <a:endParaRPr lang="en-US" sz="2000" dirty="0" smtClean="0"/>
+                <a:endParaRPr lang="en-US" sz="2200" dirty="0" smtClean="0"/>
               </a:p>
               <a:p>
                 <a:pPr marL="0" indent="0">
                   <a:buNone/>
                 </a:pPr>
-                <a:endParaRPr lang="en-US" sz="2000" b="1" dirty="0" smtClean="0"/>
+                <a:endParaRPr lang="en-US" sz="2200" b="1" dirty="0" smtClean="0"/>
               </a:p>
               <a:p>
                 <a:pPr marL="0" indent="0">
                   <a:buNone/>
                 </a:pPr>
                 <a:r>
-                  <a:rPr lang="en-US" sz="2000" b="1" dirty="0" smtClean="0"/>
+                  <a:rPr lang="en-US" sz="2200" b="1" dirty="0" smtClean="0"/>
                   <a:t>Total Volumetric Flow:</a:t>
                 </a:r>
               </a:p>
@@ -22571,13 +22618,13 @@
                 <a14:m>
                   <m:oMath xmlns:m="http://schemas.openxmlformats.org/officeDocument/2006/math">
                     <m:r>
-                      <a:rPr lang="en-US" sz="2000" i="1">
+                      <a:rPr lang="en-US" sz="2200" i="1">
                         <a:latin typeface="Cambria Math"/>
                       </a:rPr>
                       <m:t>𝑄</m:t>
                     </m:r>
                     <m:r>
-                      <a:rPr lang="en-US" sz="2000" i="1">
+                      <a:rPr lang="en-US" sz="2200" i="1">
                         <a:latin typeface="Cambria Math"/>
                       </a:rPr>
                       <m:t>=</m:t>
@@ -22585,14 +22632,20 @@
                     <m:sSub>
                       <m:sSubPr>
                         <m:ctrlPr>
-                          <a:rPr lang="en-US" sz="2000" i="1">
-                            <a:latin typeface="Cambria Math" panose="02040503050406030204" pitchFamily="18" charset="0"/>
+                          <a:rPr lang="en-US" sz="2200" i="1">
+                            <a:latin typeface="Cambria Math"/>
                           </a:rPr>
                         </m:ctrlPr>
                       </m:sSubPr>
                       <m:e>
                         <m:r>
-                          <a:rPr lang="en-US" sz="2000" i="1">
+                          <a:rPr lang="en-US" sz="2200" b="0" i="1" smtClean="0">
+                            <a:latin typeface="Cambria Math"/>
+                          </a:rPr>
+                          <m:t>(</m:t>
+                        </m:r>
+                        <m:r>
+                          <a:rPr lang="en-US" sz="2200" i="1">
                             <a:latin typeface="Cambria Math"/>
                           </a:rPr>
                           <m:t>𝐴</m:t>
@@ -22600,13 +22653,13 @@
                       </m:e>
                       <m:sub>
                         <m:r>
-                          <a:rPr lang="en-US" sz="2000" i="1">
+                          <a:rPr lang="en-US" sz="2200" i="1">
                             <a:latin typeface="Cambria Math"/>
                           </a:rPr>
                           <m:t>𝑝</m:t>
                         </m:r>
                         <m:r>
-                          <a:rPr lang="en-US" sz="2000" b="0" i="1" smtClean="0">
+                          <a:rPr lang="en-US" sz="2200" b="0" i="1" smtClean="0">
                             <a:latin typeface="Cambria Math"/>
                           </a:rPr>
                           <m:t>𝑖𝑠𝑡𝑜𝑛</m:t>
@@ -22616,14 +22669,20 @@
                     <m:sSub>
                       <m:sSubPr>
                         <m:ctrlPr>
-                          <a:rPr lang="en-US" sz="2000" i="1">
-                            <a:latin typeface="Cambria Math" panose="02040503050406030204" pitchFamily="18" charset="0"/>
+                          <a:rPr lang="en-US" sz="2200" i="1">
+                            <a:latin typeface="Cambria Math"/>
                           </a:rPr>
                         </m:ctrlPr>
                       </m:sSubPr>
                       <m:e>
                         <m:r>
-                          <a:rPr lang="en-US" sz="2000" i="1">
+                          <a:rPr lang="en-US" sz="2200" b="0" i="1" smtClean="0">
+                            <a:latin typeface="Cambria Math"/>
+                          </a:rPr>
+                          <m:t>)(</m:t>
+                        </m:r>
+                        <m:r>
+                          <a:rPr lang="en-US" sz="2200" i="1">
                             <a:latin typeface="Cambria Math"/>
                           </a:rPr>
                           <m:t>𝐷</m:t>
@@ -22631,13 +22690,13 @@
                       </m:e>
                       <m:sub>
                         <m:r>
-                          <a:rPr lang="en-US" sz="2000" i="1">
+                          <a:rPr lang="en-US" sz="2200" i="1">
                             <a:latin typeface="Cambria Math"/>
                           </a:rPr>
                           <m:t>𝑇</m:t>
                         </m:r>
                         <m:r>
-                          <a:rPr lang="en-US" sz="2000" b="0" i="1" smtClean="0">
+                          <a:rPr lang="en-US" sz="2200" b="0" i="1" smtClean="0">
                             <a:latin typeface="Cambria Math"/>
                           </a:rPr>
                           <m:t>𝑜𝑡𝑎𝑙</m:t>
@@ -22645,36 +22704,60 @@
                       </m:sub>
                     </m:sSub>
                     <m:r>
-                      <a:rPr lang="en-US" sz="2000" i="1">
+                      <a:rPr lang="en-US" sz="2200" b="0" i="1" smtClean="0">
                         <a:latin typeface="Cambria Math"/>
                       </a:rPr>
-                      <m:t>𝑁𝐶</m:t>
+                      <m:t>)(</m:t>
                     </m:r>
                     <m:r>
-                      <a:rPr lang="en-US" sz="2000" b="0" i="1" smtClean="0">
+                      <a:rPr lang="en-US" sz="2200" i="1">
+                        <a:latin typeface="Cambria Math"/>
+                      </a:rPr>
+                      <m:t>𝑁</m:t>
+                    </m:r>
+                    <m:r>
+                      <a:rPr lang="en-US" sz="2200" b="0" i="1" smtClean="0">
+                        <a:latin typeface="Cambria Math"/>
+                      </a:rPr>
+                      <m:t>)(</m:t>
+                    </m:r>
+                    <m:r>
+                      <a:rPr lang="en-US" sz="2200" i="1">
+                        <a:latin typeface="Cambria Math"/>
+                      </a:rPr>
+                      <m:t>𝐶</m:t>
+                    </m:r>
+                    <m:r>
+                      <a:rPr lang="en-US" sz="2200" b="0" i="1" smtClean="0">
                         <a:latin typeface="Cambria Math"/>
                       </a:rPr>
                       <m:t>𝑜𝑚𝑝𝑟𝑒𝑠𝑠𝑖𝑜𝑛</m:t>
                     </m:r>
                     <m:r>
-                      <a:rPr lang="en-US" sz="2000" b="0" i="1" smtClean="0">
+                      <a:rPr lang="en-US" sz="2200" b="0" i="1" smtClean="0">
                         <a:latin typeface="Cambria Math"/>
                       </a:rPr>
                       <m:t> </m:t>
                     </m:r>
                     <m:r>
-                      <a:rPr lang="en-US" sz="2000" b="0" i="1" smtClean="0">
+                      <a:rPr lang="en-US" sz="2200" b="0" i="1" smtClean="0">
                         <a:latin typeface="Cambria Math"/>
                       </a:rPr>
                       <m:t>𝑅𝑎𝑡𝑖𝑜</m:t>
                     </m:r>
+                    <m:r>
+                      <a:rPr lang="en-US" sz="2200" b="0" i="1" smtClean="0">
+                        <a:latin typeface="Cambria Math"/>
+                      </a:rPr>
+                      <m:t>)</m:t>
+                    </m:r>
                   </m:oMath>
                 </a14:m>
                 <a:r>
-                  <a:rPr lang="en-US" sz="2000" dirty="0" smtClean="0"/>
+                  <a:rPr lang="en-US" sz="2200" dirty="0" smtClean="0"/>
                   <a:t> </a:t>
                 </a:r>
-                <a:endParaRPr lang="en-US" sz="2000" dirty="0"/>
+                <a:endParaRPr lang="en-US" sz="2200" dirty="0"/>
               </a:p>
               <a:p>
                 <a:pPr marL="0" indent="0">
@@ -22687,13 +22770,13 @@
                     </m:oMathParaPr>
                     <m:oMath xmlns:m="http://schemas.openxmlformats.org/officeDocument/2006/math">
                       <m:r>
-                        <a:rPr lang="en-US" sz="2000" i="1" smtClean="0">
+                        <a:rPr lang="en-US" sz="2200" i="1" smtClean="0">
                           <a:latin typeface="Cambria Math"/>
                         </a:rPr>
                         <m:t>𝑄</m:t>
                       </m:r>
                       <m:r>
-                        <a:rPr lang="en-US" sz="2000" i="1" smtClean="0">
+                        <a:rPr lang="en-US" sz="2200" i="1" smtClean="0">
                           <a:latin typeface="Cambria Math"/>
                         </a:rPr>
                         <m:t>=</m:t>
@@ -22701,8 +22784,8 @@
                       <m:f>
                         <m:fPr>
                           <m:ctrlPr>
-                            <a:rPr lang="en-US" sz="2000" b="0" i="1" smtClean="0">
-                              <a:latin typeface="Cambria Math" panose="02040503050406030204" pitchFamily="18" charset="0"/>
+                            <a:rPr lang="en-US" sz="2200" b="0" i="1" smtClean="0">
+                              <a:latin typeface="Cambria Math"/>
                             </a:rPr>
                           </m:ctrlPr>
                         </m:fPr>
@@ -22710,20 +22793,20 @@
                           <m:d>
                             <m:dPr>
                               <m:ctrlPr>
-                                <a:rPr lang="en-US" sz="2000" b="0" i="1" smtClean="0">
-                                  <a:latin typeface="Cambria Math" panose="02040503050406030204" pitchFamily="18" charset="0"/>
+                                <a:rPr lang="en-US" sz="2200" b="0" i="1" smtClean="0">
+                                  <a:latin typeface="Cambria Math"/>
                                 </a:rPr>
                               </m:ctrlPr>
                             </m:dPr>
                             <m:e>
                               <m:r>
-                                <a:rPr lang="en-US" sz="2000" i="1" smtClean="0">
+                                <a:rPr lang="en-US" sz="2200" i="1" smtClean="0">
                                   <a:latin typeface="Cambria Math"/>
                                 </a:rPr>
                                 <m:t>3</m:t>
                               </m:r>
                               <m:r>
-                                <a:rPr lang="en-US" sz="2000" b="0" i="1" smtClean="0">
+                                <a:rPr lang="en-US" sz="2200" b="0" i="1" smtClean="0">
                                   <a:latin typeface="Cambria Math"/>
                                 </a:rPr>
                                 <m:t>.1416 </m:t>
@@ -22731,14 +22814,14 @@
                               <m:sSup>
                                 <m:sSupPr>
                                   <m:ctrlPr>
-                                    <a:rPr lang="en-US" sz="2000" b="0" i="1" smtClean="0">
-                                      <a:latin typeface="Cambria Math" panose="02040503050406030204" pitchFamily="18" charset="0"/>
+                                    <a:rPr lang="en-US" sz="2200" b="0" i="1" smtClean="0">
+                                      <a:latin typeface="Cambria Math"/>
                                     </a:rPr>
                                   </m:ctrlPr>
                                 </m:sSupPr>
                                 <m:e>
                                   <m:r>
-                                    <a:rPr lang="en-US" sz="2000" b="0" i="1" smtClean="0">
+                                    <a:rPr lang="en-US" sz="2200" b="0" i="1" smtClean="0">
                                       <a:latin typeface="Cambria Math"/>
                                     </a:rPr>
                                     <m:t>𝑖𝑛</m:t>
@@ -22746,7 +22829,7 @@
                                 </m:e>
                                 <m:sup>
                                   <m:r>
-                                    <a:rPr lang="en-US" sz="2000" b="0" i="1" smtClean="0">
+                                    <a:rPr lang="en-US" sz="2200" b="0" i="1" smtClean="0">
                                       <a:latin typeface="Cambria Math"/>
                                     </a:rPr>
                                     <m:t>2</m:t>
@@ -22758,20 +22841,20 @@
                           <m:d>
                             <m:dPr>
                               <m:ctrlPr>
-                                <a:rPr lang="en-US" sz="2000" b="0" i="1" smtClean="0">
-                                  <a:latin typeface="Cambria Math" panose="02040503050406030204" pitchFamily="18" charset="0"/>
+                                <a:rPr lang="en-US" sz="2200" b="0" i="1" smtClean="0">
+                                  <a:latin typeface="Cambria Math"/>
                                 </a:rPr>
                               </m:ctrlPr>
                             </m:dPr>
                             <m:e>
                               <m:r>
-                                <a:rPr lang="en-US" sz="2000" b="0" i="1" smtClean="0">
+                                <a:rPr lang="en-US" sz="2200" b="0" i="1" smtClean="0">
                                   <a:latin typeface="Cambria Math"/>
                                 </a:rPr>
                                 <m:t>8 </m:t>
                               </m:r>
                               <m:r>
-                                <a:rPr lang="en-US" sz="2000" b="0" i="1" smtClean="0">
+                                <a:rPr lang="en-US" sz="2200" b="0" i="1" smtClean="0">
                                   <a:latin typeface="Cambria Math"/>
                                 </a:rPr>
                                 <m:t>𝑖𝑛</m:t>
@@ -22781,14 +22864,14 @@
                           <m:d>
                             <m:dPr>
                               <m:ctrlPr>
-                                <a:rPr lang="en-US" sz="2000" b="0" i="1" smtClean="0">
-                                  <a:latin typeface="Cambria Math" panose="02040503050406030204" pitchFamily="18" charset="0"/>
+                                <a:rPr lang="en-US" sz="2200" b="0" i="1" smtClean="0">
+                                  <a:latin typeface="Cambria Math"/>
                                 </a:rPr>
                               </m:ctrlPr>
                             </m:dPr>
                             <m:e>
                               <m:r>
-                                <a:rPr lang="en-US" sz="2000" b="0" i="1" smtClean="0">
+                                <a:rPr lang="en-US" sz="2200" b="0" i="1" smtClean="0">
                                   <a:latin typeface="Cambria Math"/>
                                 </a:rPr>
                                 <m:t>60</m:t>
@@ -22798,8 +22881,8 @@
                           <m:d>
                             <m:dPr>
                               <m:ctrlPr>
-                                <a:rPr lang="en-US" sz="2000" b="0" i="1" smtClean="0">
-                                  <a:latin typeface="Cambria Math" panose="02040503050406030204" pitchFamily="18" charset="0"/>
+                                <a:rPr lang="en-US" sz="2200" b="0" i="1" smtClean="0">
+                                  <a:latin typeface="Cambria Math"/>
                                 </a:rPr>
                               </m:ctrlPr>
                             </m:dPr>
@@ -22807,32 +22890,32 @@
                               <m:f>
                                 <m:fPr>
                                   <m:ctrlPr>
-                                    <a:rPr lang="en-US" sz="2000" b="0" i="1" smtClean="0">
-                                      <a:latin typeface="Cambria Math" panose="02040503050406030204" pitchFamily="18" charset="0"/>
+                                    <a:rPr lang="en-US" sz="2200" b="0" i="1" smtClean="0">
+                                      <a:latin typeface="Cambria Math"/>
                                     </a:rPr>
                                   </m:ctrlPr>
                                 </m:fPr>
                                 <m:num>
                                   <m:r>
-                                    <a:rPr lang="en-US" sz="2000" b="0" i="1" smtClean="0">
+                                    <a:rPr lang="en-US" sz="2200" b="0" i="1" smtClean="0">
                                       <a:latin typeface="Cambria Math"/>
                                     </a:rPr>
                                     <m:t>56.73</m:t>
                                   </m:r>
                                   <m:r>
-                                    <a:rPr lang="en-US" sz="2000" b="0" i="1" smtClean="0">
+                                    <a:rPr lang="en-US" sz="2200" b="0" i="1" smtClean="0">
                                       <a:latin typeface="Cambria Math"/>
                                     </a:rPr>
                                     <m:t>𝑝𝑠𝑖</m:t>
                                   </m:r>
                                   <m:r>
-                                    <a:rPr lang="en-US" sz="2000" b="0" i="1" smtClean="0">
+                                    <a:rPr lang="en-US" sz="2200" b="0" i="1" smtClean="0">
                                       <a:latin typeface="Cambria Math"/>
                                     </a:rPr>
                                     <m:t>+14.7</m:t>
                                   </m:r>
                                   <m:r>
-                                    <a:rPr lang="en-US" sz="2000" b="0" i="1" smtClean="0">
+                                    <a:rPr lang="en-US" sz="2200" b="0" i="1" smtClean="0">
                                       <a:latin typeface="Cambria Math"/>
                                     </a:rPr>
                                     <m:t>𝑝𝑠𝑖</m:t>
@@ -22840,13 +22923,13 @@
                                 </m:num>
                                 <m:den>
                                   <m:r>
-                                    <a:rPr lang="en-US" sz="2000" b="0" i="1" smtClean="0">
+                                    <a:rPr lang="en-US" sz="2200" b="0" i="1" smtClean="0">
                                       <a:latin typeface="Cambria Math"/>
                                     </a:rPr>
                                     <m:t>14.7</m:t>
                                   </m:r>
                                   <m:r>
-                                    <a:rPr lang="en-US" sz="2000" b="0" i="1" smtClean="0">
+                                    <a:rPr lang="en-US" sz="2200" b="0" i="1" smtClean="0">
                                       <a:latin typeface="Cambria Math"/>
                                     </a:rPr>
                                     <m:t>𝑝𝑠𝑖</m:t>
@@ -22860,14 +22943,14 @@
                           <m:d>
                             <m:dPr>
                               <m:ctrlPr>
-                                <a:rPr lang="en-US" sz="2000" i="1">
-                                  <a:latin typeface="Cambria Math" panose="02040503050406030204" pitchFamily="18" charset="0"/>
+                                <a:rPr lang="en-US" sz="2200" i="1">
+                                  <a:latin typeface="Cambria Math"/>
                                 </a:rPr>
                               </m:ctrlPr>
                             </m:dPr>
                             <m:e>
                               <m:r>
-                                <a:rPr lang="en-US" sz="2000" i="1">
+                                <a:rPr lang="en-US" sz="2200" i="1">
                                   <a:latin typeface="Cambria Math" panose="02040503050406030204" pitchFamily="18" charset="0"/>
                                 </a:rPr>
                                 <m:t>1728</m:t>
@@ -22875,14 +22958,14 @@
                               <m:f>
                                 <m:fPr>
                                   <m:ctrlPr>
-                                    <a:rPr lang="en-US" sz="2000" i="1">
-                                      <a:latin typeface="Cambria Math" panose="02040503050406030204" pitchFamily="18" charset="0"/>
+                                    <a:rPr lang="en-US" sz="2200" i="1">
+                                      <a:latin typeface="Cambria Math"/>
                                     </a:rPr>
                                   </m:ctrlPr>
                                 </m:fPr>
                                 <m:num>
                                   <m:r>
-                                    <a:rPr lang="en-US" sz="2000" i="1">
+                                    <a:rPr lang="en-US" sz="2200" i="1">
                                       <a:latin typeface="Cambria Math" panose="02040503050406030204" pitchFamily="18" charset="0"/>
                                     </a:rPr>
                                     <m:t>𝑖</m:t>
@@ -22890,14 +22973,14 @@
                                   <m:sSup>
                                     <m:sSupPr>
                                       <m:ctrlPr>
-                                        <a:rPr lang="en-US" sz="2000" i="1">
-                                          <a:latin typeface="Cambria Math" panose="02040503050406030204" pitchFamily="18" charset="0"/>
+                                        <a:rPr lang="en-US" sz="2200" i="1">
+                                          <a:latin typeface="Cambria Math"/>
                                         </a:rPr>
                                       </m:ctrlPr>
                                     </m:sSupPr>
                                     <m:e>
                                       <m:r>
-                                        <a:rPr lang="en-US" sz="2000" i="1">
+                                        <a:rPr lang="en-US" sz="2200" i="1">
                                           <a:latin typeface="Cambria Math" panose="02040503050406030204" pitchFamily="18" charset="0"/>
                                         </a:rPr>
                                         <m:t>𝑛</m:t>
@@ -22905,7 +22988,7 @@
                                     </m:e>
                                     <m:sup>
                                       <m:r>
-                                        <a:rPr lang="en-US" sz="2000" i="1">
+                                        <a:rPr lang="en-US" sz="2200" i="1">
                                           <a:latin typeface="Cambria Math" panose="02040503050406030204" pitchFamily="18" charset="0"/>
                                         </a:rPr>
                                         <m:t>3</m:t>
@@ -22915,7 +22998,7 @@
                                 </m:num>
                                 <m:den>
                                   <m:r>
-                                    <a:rPr lang="en-US" sz="2000" i="1">
+                                    <a:rPr lang="en-US" sz="2200" i="1">
                                       <a:latin typeface="Cambria Math" panose="02040503050406030204" pitchFamily="18" charset="0"/>
                                     </a:rPr>
                                     <m:t>𝑓</m:t>
@@ -22923,14 +23006,14 @@
                                   <m:sSup>
                                     <m:sSupPr>
                                       <m:ctrlPr>
-                                        <a:rPr lang="en-US" sz="2000" i="1">
-                                          <a:latin typeface="Cambria Math" panose="02040503050406030204" pitchFamily="18" charset="0"/>
+                                        <a:rPr lang="en-US" sz="2200" i="1">
+                                          <a:latin typeface="Cambria Math"/>
                                         </a:rPr>
                                       </m:ctrlPr>
                                     </m:sSupPr>
                                     <m:e>
                                       <m:r>
-                                        <a:rPr lang="en-US" sz="2000" i="1">
+                                        <a:rPr lang="en-US" sz="2200" i="1">
                                           <a:latin typeface="Cambria Math" panose="02040503050406030204" pitchFamily="18" charset="0"/>
                                         </a:rPr>
                                         <m:t>𝑡</m:t>
@@ -22938,7 +23021,7 @@
                                     </m:e>
                                     <m:sup>
                                       <m:r>
-                                        <a:rPr lang="en-US" sz="2000" i="1">
+                                        <a:rPr lang="en-US" sz="2200" i="1">
                                           <a:latin typeface="Cambria Math" panose="02040503050406030204" pitchFamily="18" charset="0"/>
                                         </a:rPr>
                                         <m:t>3</m:t>
@@ -22954,7 +23037,7 @@
                     </m:oMath>
                   </m:oMathPara>
                 </a14:m>
-                <a:endParaRPr lang="en-US" sz="2000" b="0" dirty="0" smtClean="0"/>
+                <a:endParaRPr lang="en-US" sz="2200" b="0" dirty="0" smtClean="0"/>
               </a:p>
               <a:p>
                 <a:pPr marL="0" indent="0">
@@ -22963,37 +23046,37 @@
                 <a14:m>
                   <m:oMath xmlns:m="http://schemas.openxmlformats.org/officeDocument/2006/math">
                     <m:r>
-                      <a:rPr lang="en-US" sz="2000" b="1" i="1" smtClean="0">
+                      <a:rPr lang="en-US" sz="2200" b="1" i="1" smtClean="0">
                         <a:latin typeface="Cambria Math"/>
                       </a:rPr>
                       <m:t>𝑸</m:t>
                     </m:r>
                     <m:r>
-                      <a:rPr lang="en-US" sz="2000" b="1" i="1" smtClean="0">
+                      <a:rPr lang="en-US" sz="2200" b="1" i="1" smtClean="0">
                         <a:latin typeface="Cambria Math"/>
                       </a:rPr>
                       <m:t>=</m:t>
                     </m:r>
                     <m:r>
-                      <a:rPr lang="en-US" sz="2000" b="1" i="1" smtClean="0">
+                      <a:rPr lang="en-US" sz="2200" b="1" i="1" smtClean="0">
                         <a:latin typeface="Cambria Math"/>
                       </a:rPr>
                       <m:t>𝟒</m:t>
                     </m:r>
                     <m:r>
-                      <a:rPr lang="en-US" sz="2000" b="1" i="1" smtClean="0">
+                      <a:rPr lang="en-US" sz="2200" b="1" i="1" smtClean="0">
                         <a:latin typeface="Cambria Math"/>
                       </a:rPr>
                       <m:t>.</m:t>
                     </m:r>
                     <m:r>
-                      <a:rPr lang="en-US" sz="2000" b="1" i="1" smtClean="0">
+                      <a:rPr lang="en-US" sz="2200" b="1" i="1" smtClean="0">
                         <a:latin typeface="Cambria Math"/>
                       </a:rPr>
                       <m:t>𝟐𝟒</m:t>
                     </m:r>
                     <m:r>
-                      <a:rPr lang="en-US" sz="2000" b="1" i="1" smtClean="0">
+                      <a:rPr lang="en-US" sz="2200" b="1" i="1" smtClean="0">
                         <a:latin typeface="Cambria Math"/>
                       </a:rPr>
                       <m:t> </m:t>
@@ -23001,8 +23084,8 @@
                     <m:f>
                       <m:fPr>
                         <m:ctrlPr>
-                          <a:rPr lang="en-US" sz="2000" b="1" i="1" smtClean="0">
-                            <a:latin typeface="Cambria Math" panose="02040503050406030204" pitchFamily="18" charset="0"/>
+                          <a:rPr lang="en-US" sz="2200" b="1" i="1" smtClean="0">
+                            <a:latin typeface="Cambria Math"/>
                           </a:rPr>
                         </m:ctrlPr>
                       </m:fPr>
@@ -23010,14 +23093,14 @@
                         <m:sSup>
                           <m:sSupPr>
                             <m:ctrlPr>
-                              <a:rPr lang="en-US" sz="2000" b="1" i="1" smtClean="0">
-                                <a:latin typeface="Cambria Math" panose="02040503050406030204" pitchFamily="18" charset="0"/>
+                              <a:rPr lang="en-US" sz="2200" b="1" i="1" smtClean="0">
+                                <a:latin typeface="Cambria Math"/>
                               </a:rPr>
                             </m:ctrlPr>
                           </m:sSupPr>
                           <m:e>
                             <m:r>
-                              <a:rPr lang="en-US" sz="2000" b="1" i="1" smtClean="0">
+                              <a:rPr lang="en-US" sz="2200" b="1" i="1" smtClean="0">
                                 <a:latin typeface="Cambria Math"/>
                               </a:rPr>
                               <m:t>𝒇𝒕</m:t>
@@ -23025,7 +23108,7 @@
                           </m:e>
                           <m:sup>
                             <m:r>
-                              <a:rPr lang="en-US" sz="2000" b="1" i="1" smtClean="0">
+                              <a:rPr lang="en-US" sz="2200" b="1" i="1" smtClean="0">
                                 <a:latin typeface="Cambria Math"/>
                               </a:rPr>
                               <m:t>𝟑</m:t>
@@ -23035,7 +23118,7 @@
                       </m:num>
                       <m:den>
                         <m:r>
-                          <a:rPr lang="en-US" sz="2000" b="1" i="1" smtClean="0">
+                          <a:rPr lang="en-US" sz="2200" b="1" i="1" smtClean="0">
                             <a:latin typeface="Cambria Math"/>
                           </a:rPr>
                           <m:t>𝒔𝒆𝒄</m:t>
@@ -23045,10 +23128,10 @@
                   </m:oMath>
                 </a14:m>
                 <a:r>
-                  <a:rPr lang="en-US" sz="2000" b="1" dirty="0" smtClean="0"/>
+                  <a:rPr lang="en-US" sz="2200" b="1" dirty="0" smtClean="0"/>
                   <a:t> at STP</a:t>
                 </a:r>
-                <a:endParaRPr lang="en-US" sz="2000" b="1" dirty="0"/>
+                <a:endParaRPr lang="en-US" sz="2200" b="1" dirty="0"/>
               </a:p>
               <a:p>
                 <a:pPr marL="0" indent="0">
@@ -23059,7 +23142,7 @@
             </p:txBody>
           </p:sp>
         </mc:Choice>
-        <mc:Fallback xmlns="">
+        <mc:Fallback>
           <p:sp>
             <p:nvSpPr>
               <p:cNvPr id="3" name="Content Placeholder 2"/>
@@ -23072,13 +23155,13 @@
             </p:nvSpPr>
             <p:spPr>
               <a:xfrm>
-                <a:off x="152400" y="1026452"/>
-                <a:ext cx="11887200" cy="5678785"/>
+                <a:off x="152400" y="874052"/>
+                <a:ext cx="6062133" cy="5678785"/>
               </a:xfrm>
-              <a:blipFill rotWithShape="0">
-                <a:blip r:embed="rId3"/>
+              <a:blipFill rotWithShape="1">
+                <a:blip r:embed="rId2"/>
                 <a:stretch>
-                  <a:fillRect l="-513" t="-322"/>
+                  <a:fillRect l="-1006" t="-536"/>
                 </a:stretch>
               </a:blipFill>
             </p:spPr>
@@ -23120,12 +23203,12 @@
           <a:lstStyle/>
           <a:p>
             <a:r>
-              <a:rPr lang="en-US" sz="2400" b="1" dirty="0" err="1" smtClean="0"/>
-              <a:t>Selcted</a:t>
-            </a:r>
-            <a:r>
               <a:rPr lang="en-US" sz="2400" b="1" dirty="0" smtClean="0"/>
-              <a:t> Cylinder Specs</a:t>
+              <a:t>Selected </a:t>
+            </a:r>
+            <a:r>
+              <a:rPr lang="en-US" sz="2400" b="1" dirty="0" smtClean="0"/>
+              <a:t>Cylinder Specs</a:t>
             </a:r>
             <a:r>
               <a:rPr lang="en-US" sz="2400" dirty="0" smtClean="0"/>
@@ -23185,11 +23268,19 @@
             </a:r>
             <a:r>
               <a:rPr lang="en-US" sz="2400" dirty="0" err="1" smtClean="0"/>
-              <a:t>lbf</a:t>
+              <a:t>lb</a:t>
+            </a:r>
+            <a:r>
+              <a:rPr lang="en-US" sz="2400" baseline="-25000" dirty="0" err="1" smtClean="0"/>
+              <a:t>f</a:t>
             </a:r>
             <a:r>
               <a:rPr lang="en-US" sz="2400" dirty="0" smtClean="0"/>
-              <a:t> max output</a:t>
+              <a:t> </a:t>
+            </a:r>
+            <a:r>
+              <a:rPr lang="en-US" sz="2400" dirty="0" smtClean="0"/>
+              <a:t>max output</a:t>
             </a:r>
           </a:p>
           <a:p>
@@ -23261,7 +23352,11 @@
           <a:p>
             <a:r>
               <a:rPr lang="en-US" dirty="0" smtClean="0"/>
-              <a:t>Directional Control Valves</a:t>
+              <a:t>Directional Control </a:t>
+            </a:r>
+            <a:r>
+              <a:rPr lang="en-US" dirty="0" smtClean="0"/>
+              <a:t>Valves (DCV)</a:t>
             </a:r>
             <a:endParaRPr lang="en-US" dirty="0"/>
           </a:p>
@@ -23646,7 +23741,7 @@
         </p:nvSpPr>
         <p:spPr>
           <a:xfrm>
-            <a:off x="812800" y="3810001"/>
+            <a:off x="651434" y="3810000"/>
             <a:ext cx="9582411" cy="2031325"/>
           </a:xfrm>
           <a:prstGeom prst="rect">
@@ -23667,7 +23762,19 @@
             </a:pPr>
             <a:r>
               <a:rPr lang="en-US" sz="2800" dirty="0" smtClean="0"/>
-              <a:t>Specifications determined by: </a:t>
+              <a:t>Specifications </a:t>
+            </a:r>
+            <a:r>
+              <a:rPr lang="en-US" sz="2800" dirty="0" smtClean="0"/>
+              <a:t>limited</a:t>
+            </a:r>
+            <a:r>
+              <a:rPr lang="en-US" sz="2800" dirty="0" smtClean="0"/>
+              <a:t> </a:t>
+            </a:r>
+            <a:r>
+              <a:rPr lang="en-US" sz="2800" dirty="0" smtClean="0"/>
+              <a:t>by: </a:t>
             </a:r>
           </a:p>
           <a:p>
@@ -23737,13 +23844,13 @@
         </p:nvSpPr>
         <p:spPr>
           <a:xfrm>
-            <a:off x="609602" y="381000"/>
-            <a:ext cx="8839199" cy="5029200"/>
+            <a:off x="626535" y="211666"/>
+            <a:ext cx="9397998" cy="5494867"/>
           </a:xfrm>
         </p:spPr>
         <p:txBody>
           <a:bodyPr>
-            <a:normAutofit/>
+            <a:normAutofit fontScale="92500" lnSpcReduction="10000"/>
           </a:bodyPr>
           <a:lstStyle/>
           <a:p>
@@ -23751,15 +23858,15 @@
               <a:buNone/>
             </a:pPr>
             <a:r>
-              <a:rPr lang="en-US" dirty="0" smtClean="0"/>
+              <a:rPr lang="en-US" sz="3900" dirty="0" smtClean="0"/>
               <a:t>Remaining Pneumatic </a:t>
             </a:r>
             <a:r>
-              <a:rPr lang="en-US" dirty="0"/>
+              <a:rPr lang="en-US" sz="3900" dirty="0"/>
               <a:t>components </a:t>
             </a:r>
             <a:r>
-              <a:rPr lang="en-US" dirty="0" smtClean="0"/>
+              <a:rPr lang="en-US" sz="3900" dirty="0" smtClean="0"/>
               <a:t>include:</a:t>
             </a:r>
           </a:p>
@@ -23770,12 +23877,36 @@
             <a:endParaRPr lang="en-US" dirty="0" smtClean="0"/>
           </a:p>
           <a:p>
+            <a:pPr marL="0" indent="0">
+              <a:buNone/>
+            </a:pPr>
             <a:r>
               <a:rPr lang="en-US" sz="3000" dirty="0" smtClean="0"/>
-              <a:t>Receiver Tank</a:t>
-            </a:r>
-          </a:p>
-          <a:p>
+              <a:t>Receiver </a:t>
+            </a:r>
+            <a:r>
+              <a:rPr lang="en-US" sz="3000" dirty="0" smtClean="0"/>
+              <a:t>Tank</a:t>
+            </a:r>
+          </a:p>
+          <a:p>
+            <a:pPr marL="0" indent="0">
+              <a:buNone/>
+            </a:pPr>
+            <a:r>
+              <a:rPr lang="en-US" sz="3000" dirty="0" smtClean="0"/>
+              <a:t>-</a:t>
+            </a:r>
+            <a:r>
+              <a:rPr lang="en-US" sz="2800" dirty="0" smtClean="0"/>
+              <a:t>Sized depending on additional flow needs</a:t>
+            </a:r>
+            <a:endParaRPr lang="en-US" sz="2800" dirty="0" smtClean="0"/>
+          </a:p>
+          <a:p>
+            <a:pPr marL="0" indent="0">
+              <a:buNone/>
+            </a:pPr>
             <a:r>
               <a:rPr lang="en-US" sz="3000" dirty="0" smtClean="0"/>
               <a:t>Solenoid </a:t>
@@ -23788,8 +23919,26 @@
               <a:rPr lang="en-US" sz="3000" dirty="0" smtClean="0"/>
               <a:t>alve </a:t>
             </a:r>
-          </a:p>
-          <a:p>
+            <a:endParaRPr lang="en-US" sz="3000" dirty="0" smtClean="0"/>
+          </a:p>
+          <a:p>
+            <a:pPr marL="0" indent="0">
+              <a:buNone/>
+            </a:pPr>
+            <a:r>
+              <a:rPr lang="en-US" sz="3000" dirty="0" smtClean="0"/>
+              <a:t>-</a:t>
+            </a:r>
+            <a:r>
+              <a:rPr lang="en-US" sz="2800" dirty="0" smtClean="0"/>
+              <a:t>Main on/off switch of fluid flow to system</a:t>
+            </a:r>
+            <a:endParaRPr lang="en-US" sz="2800" dirty="0" smtClean="0"/>
+          </a:p>
+          <a:p>
+            <a:pPr marL="0" indent="0">
+              <a:buNone/>
+            </a:pPr>
             <a:r>
               <a:rPr lang="en-US" sz="3000" dirty="0" smtClean="0"/>
               <a:t>Pressure </a:t>
@@ -23803,23 +23952,38 @@
               <a:t>elief </a:t>
             </a:r>
             <a:r>
-              <a:rPr lang="en-US" sz="3000" dirty="0"/>
-              <a:t>V</a:t>
-            </a:r>
-            <a:r>
               <a:rPr lang="en-US" sz="3000" dirty="0" smtClean="0"/>
-              <a:t>alve</a:t>
-            </a:r>
-          </a:p>
-          <a:p>
-            <a:r>
-              <a:rPr lang="en-US" sz="3000" dirty="0"/>
-              <a:t>T</a:t>
-            </a:r>
+              <a:t>Valve</a:t>
+            </a:r>
+          </a:p>
+          <a:p>
+            <a:pPr marL="0" indent="0">
+              <a:buNone/>
+            </a:pPr>
             <a:r>
               <a:rPr lang="en-US" sz="3000" dirty="0" smtClean="0"/>
-              <a:t>ubing</a:t>
-            </a:r>
+              <a:t>-</a:t>
+            </a:r>
+            <a:r>
+              <a:rPr lang="en-US" sz="2800" dirty="0" smtClean="0"/>
+              <a:t>Dictates upper pressure limit</a:t>
+            </a:r>
+            <a:endParaRPr lang="en-US" sz="2800" dirty="0" smtClean="0"/>
+          </a:p>
+          <a:p>
+            <a:pPr marL="0" indent="0">
+              <a:buNone/>
+            </a:pPr>
+            <a:r>
+              <a:rPr lang="en-US" sz="3000" dirty="0" smtClean="0"/>
+              <a:t>Tubing</a:t>
+            </a:r>
+          </a:p>
+          <a:p>
+            <a:pPr marL="0" indent="0">
+              <a:buNone/>
+            </a:pPr>
+            <a:endParaRPr lang="en-US" sz="3000" dirty="0" smtClean="0"/>
           </a:p>
         </p:txBody>
       </p:sp>
@@ -23844,7 +24008,7 @@
         </p:blipFill>
         <p:spPr bwMode="auto">
           <a:xfrm>
-            <a:off x="6705601" y="1752600"/>
+            <a:off x="7662334" y="1109132"/>
             <a:ext cx="4267201" cy="2514600"/>
           </a:xfrm>
           <a:prstGeom prst="rect">
@@ -23854,6 +24018,47 @@
           <a:ln>
             <a:noFill/>
           </a:ln>
+        </p:spPr>
+      </p:pic>
+      <p:pic>
+        <p:nvPicPr>
+          <p:cNvPr id="1026" name="Picture 2" descr="http://www.automationdirect.com/images/overviews/nitra_poly_tubing_200.jpg"/>
+          <p:cNvPicPr>
+            <a:picLocks noChangeAspect="1" noChangeArrowheads="1"/>
+          </p:cNvPicPr>
+          <p:nvPr/>
+        </p:nvPicPr>
+        <p:blipFill>
+          <a:blip r:embed="rId3">
+            <a:extLst>
+              <a:ext uri="{28A0092B-C50C-407E-A947-70E740481C1C}">
+                <a14:useLocalDpi xmlns:a14="http://schemas.microsoft.com/office/drawing/2010/main" val="0"/>
+              </a:ext>
+            </a:extLst>
+          </a:blip>
+          <a:srcRect/>
+          <a:stretch>
+            <a:fillRect/>
+          </a:stretch>
+        </p:blipFill>
+        <p:spPr bwMode="auto">
+          <a:xfrm>
+            <a:off x="7662334" y="3746500"/>
+            <a:ext cx="2683932" cy="2683932"/>
+          </a:xfrm>
+          <a:prstGeom prst="rect">
+            <a:avLst/>
+          </a:prstGeom>
+          <a:noFill/>
+          <a:extLst>
+            <a:ext uri="{909E8E84-426E-40DD-AFC4-6F175D3DCCD1}">
+              <a14:hiddenFill xmlns:a14="http://schemas.microsoft.com/office/drawing/2010/main">
+                <a:solidFill>
+                  <a:srgbClr val="FFFFFF"/>
+                </a:solidFill>
+              </a14:hiddenFill>
+            </a:ext>
+          </a:extLst>
         </p:spPr>
       </p:pic>
     </p:spTree>
@@ -23896,7 +24101,12 @@
             <p:ph type="title"/>
           </p:nvPr>
         </p:nvSpPr>
-        <p:spPr/>
+        <p:spPr>
+          <a:xfrm>
+            <a:off x="1124480" y="135467"/>
+            <a:ext cx="9905998" cy="1478570"/>
+          </a:xfrm>
+        </p:spPr>
         <p:txBody>
           <a:bodyPr/>
           <a:lstStyle/>
@@ -23919,7 +24129,12 @@
             <p:ph idx="1"/>
           </p:nvPr>
         </p:nvSpPr>
-        <p:spPr/>
+        <p:spPr>
+          <a:xfrm>
+            <a:off x="880534" y="1913468"/>
+            <a:ext cx="10183811" cy="4080934"/>
+          </a:xfrm>
+        </p:spPr>
         <p:txBody>
           <a:bodyPr/>
           <a:lstStyle/>
@@ -23928,17 +24143,66 @@
               <a:buNone/>
             </a:pPr>
             <a:r>
-              <a:rPr lang="en-US" dirty="0" smtClean="0"/>
-              <a:t>Air Cylinders (8):</a:t>
-            </a:r>
+              <a:rPr lang="en-US" sz="2800" dirty="0" smtClean="0"/>
+              <a:t>Air Cylinders (8</a:t>
+            </a:r>
+            <a:r>
+              <a:rPr lang="en-US" sz="2800" dirty="0" smtClean="0"/>
+              <a:t>): 2 inch </a:t>
+            </a:r>
+            <a:r>
+              <a:rPr lang="en-US" sz="2800" dirty="0"/>
+              <a:t>b</a:t>
+            </a:r>
+            <a:r>
+              <a:rPr lang="en-US" sz="2800" dirty="0" smtClean="0"/>
+              <a:t>ore </a:t>
+            </a:r>
+            <a:r>
+              <a:rPr lang="en-US" sz="2800" dirty="0"/>
+              <a:t>d</a:t>
+            </a:r>
+            <a:r>
+              <a:rPr lang="en-US" sz="2800" dirty="0" smtClean="0"/>
+              <a:t>iameter, 3 inch </a:t>
+            </a:r>
+            <a:r>
+              <a:rPr lang="en-US" sz="2800" dirty="0"/>
+              <a:t>s</a:t>
+            </a:r>
+            <a:r>
+              <a:rPr lang="en-US" sz="2800" dirty="0" smtClean="0"/>
+              <a:t>troke length for shank, 4 inch stroke length fo</a:t>
+            </a:r>
+            <a:r>
+              <a:rPr lang="en-US" sz="2800" dirty="0" smtClean="0"/>
+              <a:t>r thigh</a:t>
+            </a:r>
+            <a:endParaRPr lang="en-US" sz="2800" dirty="0" smtClean="0"/>
           </a:p>
           <a:p>
             <a:pPr marL="0" indent="0">
               <a:buNone/>
             </a:pPr>
             <a:r>
-              <a:rPr lang="en-US" dirty="0" smtClean="0"/>
-              <a:t>Directional Control Valves (8):</a:t>
+              <a:rPr lang="en-US" sz="2800" dirty="0" smtClean="0"/>
+              <a:t>Directional Control Valves (8</a:t>
+            </a:r>
+            <a:r>
+              <a:rPr lang="en-US" sz="2800" dirty="0" smtClean="0"/>
+              <a:t>): 5 ports, 3 spool positions, </a:t>
+            </a:r>
+            <a:r>
+              <a:rPr lang="en-US" sz="2800" dirty="0" err="1" smtClean="0"/>
+              <a:t>C</a:t>
+            </a:r>
+            <a:r>
+              <a:rPr lang="en-US" sz="2800" baseline="-25000" dirty="0" err="1" smtClean="0"/>
+              <a:t>v</a:t>
+            </a:r>
+            <a:r>
+              <a:rPr lang="en-US" sz="2800" dirty="0" smtClean="0"/>
+              <a:t> = 0.67 (21 CFM)</a:t>
             </a:r>
           </a:p>
           <a:p>
@@ -23946,8 +24210,16 @@
               <a:buNone/>
             </a:pPr>
             <a:r>
-              <a:rPr lang="en-US" dirty="0" smtClean="0"/>
-              <a:t>Air Compressor:</a:t>
+              <a:rPr lang="en-US" sz="2800" dirty="0" smtClean="0"/>
+              <a:t>Air Compressor: 10 gallon, 5.3 CFM (At 90 psi), </a:t>
+            </a:r>
+            <a:r>
+              <a:rPr lang="en-US" sz="2800" dirty="0" smtClean="0"/>
+              <a:t>125 psi m</a:t>
+            </a:r>
+            <a:r>
+              <a:rPr lang="en-US" sz="2800" dirty="0" smtClean="0"/>
+              <a:t>aximum pressure </a:t>
             </a:r>
           </a:p>
           <a:p>
@@ -24000,7 +24272,7 @@
         </p:nvSpPr>
         <p:spPr>
           <a:xfrm>
-            <a:off x="1100470" y="250030"/>
+            <a:off x="1089416" y="173829"/>
             <a:ext cx="9905999" cy="969171"/>
           </a:xfrm>
         </p:spPr>
@@ -24010,7 +24282,11 @@
           <a:p>
             <a:r>
               <a:rPr lang="en-US" dirty="0" smtClean="0"/>
-              <a:t>Pneumatic Circuit</a:t>
+              <a:t>Pneumatic </a:t>
+            </a:r>
+            <a:r>
+              <a:rPr lang="en-US" dirty="0" smtClean="0"/>
+              <a:t>Circuit Segment</a:t>
             </a:r>
             <a:endParaRPr lang="en-US" dirty="0"/>
           </a:p>
@@ -25241,35 +25517,29 @@
           </a:p>
         </p:txBody>
       </p:sp>
-      <p:pic>
-        <p:nvPicPr>
-          <p:cNvPr id="4" name="Content Placeholder 3"/>
-          <p:cNvPicPr>
-            <a:picLocks noGrp="1" noChangeAspect="1"/>
-          </p:cNvPicPr>
+      <p:sp>
+        <p:nvSpPr>
+          <p:cNvPr id="3" name="Content Placeholder 2"/>
+          <p:cNvSpPr>
+            <a:spLocks noGrp="1"/>
+          </p:cNvSpPr>
           <p:nvPr>
             <p:ph idx="1"/>
           </p:nvPr>
-        </p:nvPicPr>
-        <p:blipFill>
-          <a:blip r:embed="rId2">
-            <a:extLst>
-              <a:ext uri="{28A0092B-C50C-407E-A947-70E740481C1C}">
-                <a14:useLocalDpi xmlns:a14="http://schemas.microsoft.com/office/drawing/2010/main" val="0"/>
-              </a:ext>
-            </a:extLst>
-          </a:blip>
-          <a:stretch>
-            <a:fillRect/>
-          </a:stretch>
-        </p:blipFill>
-        <p:spPr>
-          <a:xfrm>
-            <a:off x="2026000" y="1671516"/>
-            <a:ext cx="7109374" cy="4790955"/>
-          </a:xfrm>
-        </p:spPr>
-      </p:pic>
+        </p:nvSpPr>
+        <p:spPr/>
+        <p:txBody>
+          <a:bodyPr/>
+          <a:lstStyle/>
+          <a:p>
+            <a:r>
+              <a:rPr lang="en-US" dirty="0" smtClean="0"/>
+              <a:t>&lt;Diagram to be added here&gt;</a:t>
+            </a:r>
+            <a:endParaRPr lang="en-US" dirty="0"/>
+          </a:p>
+        </p:txBody>
+      </p:sp>
     </p:spTree>
     <p:extLst>
       <p:ext uri="{BB962C8B-B14F-4D97-AF65-F5344CB8AC3E}">
@@ -25866,7 +26136,7 @@
             <a:lstStyle/>
             <a:p>
               <a:pPr algn="ctr"/>
-              <a:endParaRPr lang="en-US">
+              <a:endParaRPr lang="en-US" dirty="0">
                 <a:solidFill>
                   <a:schemeClr val="bg1"/>
                 </a:solidFill>
@@ -25972,7 +26242,7 @@
                     </a:bodyPr>
                     <a:lstStyle/>
                     <a:p>
-                      <a:endParaRPr lang="en-US">
+                      <a:endParaRPr lang="en-US" dirty="0">
                         <a:solidFill>
                           <a:schemeClr val="bg1"/>
                         </a:solidFill>
@@ -26372,7 +26642,7 @@
                         </a:spcAft>
                       </a:pPr>
                       <a:r>
-                        <a:rPr lang="en-US" sz="1100">
+                        <a:rPr lang="en-US" sz="1100" dirty="0">
                           <a:solidFill>
                             <a:schemeClr val="bg1"/>
                           </a:solidFill>
@@ -26490,7 +26760,7 @@
                           </a:spcAft>
                         </a:pPr>
                         <a:r>
-                          <a:rPr lang="en-US" sz="1100">
+                          <a:rPr lang="en-US" sz="1100" dirty="0">
                             <a:solidFill>
                               <a:schemeClr val="bg1"/>
                             </a:solidFill>
@@ -26601,7 +26871,7 @@
                     </a:bodyPr>
                     <a:lstStyle/>
                     <a:p>
-                      <a:endParaRPr lang="en-US">
+                      <a:endParaRPr lang="en-US" dirty="0">
                         <a:solidFill>
                           <a:schemeClr val="bg1"/>
                         </a:solidFill>
@@ -26827,7 +27097,7 @@
                       </a:bodyPr>
                       <a:lstStyle/>
                       <a:p>
-                        <a:endParaRPr lang="en-US">
+                        <a:endParaRPr lang="en-US" dirty="0">
                           <a:solidFill>
                             <a:schemeClr val="bg1"/>
                           </a:solidFill>
@@ -27032,7 +27302,7 @@
                       </a:bodyPr>
                       <a:lstStyle/>
                       <a:p>
-                        <a:endParaRPr lang="en-US">
+                        <a:endParaRPr lang="en-US" dirty="0">
                           <a:solidFill>
                             <a:schemeClr val="bg1"/>
                           </a:solidFill>
@@ -27189,7 +27459,7 @@
                       </a:spcAft>
                     </a:pPr>
                     <a:r>
-                      <a:rPr lang="en-US" sz="1100">
+                      <a:rPr lang="en-US" sz="1100" dirty="0">
                         <a:solidFill>
                           <a:schemeClr val="bg1"/>
                         </a:solidFill>
@@ -27257,7 +27527,7 @@
                       </a:spcAft>
                     </a:pPr>
                     <a:r>
-                      <a:rPr lang="en-US" sz="1100">
+                      <a:rPr lang="en-US" sz="1100" dirty="0">
                         <a:solidFill>
                           <a:schemeClr val="bg1"/>
                         </a:solidFill>
@@ -27325,7 +27595,7 @@
                       </a:spcAft>
                     </a:pPr>
                     <a:r>
-                      <a:rPr lang="en-US" sz="1100">
+                      <a:rPr lang="en-US" sz="1100" dirty="0">
                         <a:solidFill>
                           <a:schemeClr val="bg1"/>
                         </a:solidFill>
@@ -27349,7 +27619,7 @@
                       </a:spcAft>
                     </a:pPr>
                     <a:r>
-                      <a:rPr lang="en-US" sz="1100">
+                      <a:rPr lang="en-US" sz="1100" dirty="0">
                         <a:solidFill>
                           <a:schemeClr val="bg1"/>
                         </a:solidFill>
@@ -27417,7 +27687,7 @@
                       </a:spcAft>
                     </a:pPr>
                     <a:r>
-                      <a:rPr lang="en-US" sz="1100">
+                      <a:rPr lang="en-US" sz="1100" dirty="0">
                         <a:solidFill>
                           <a:schemeClr val="bg1"/>
                         </a:solidFill>
@@ -27569,7 +27839,7 @@
                     </a:spcAft>
                   </a:pPr>
                   <a:r>
-                    <a:rPr lang="en-US" sz="1100">
+                    <a:rPr lang="en-US" sz="1100" dirty="0">
                       <a:solidFill>
                         <a:schemeClr val="bg1"/>
                       </a:solidFill>
@@ -28349,7 +28619,7 @@
   <a:extraClrSchemeLst/>
   <a:extLst>
     <a:ext uri="{05A4C25C-085E-4340-85A3-A5531E510DB2}">
-      <thm15:themeFamily xmlns:thm15="http://schemas.microsoft.com/office/thememl/2012/main" name="Circuit" id="{0AC2F7E7-15F5-431C-B2A2-456FE929F56C}" vid="{14971C58-AB76-4A2A-B231-5F8CA03CF491}"/>
+      <thm15:themeFamily xmlns:thm15="http://schemas.microsoft.com/office/thememl/2012/main" xmlns="" name="Circuit" id="{0AC2F7E7-15F5-431C-B2A2-456FE929F56C}" vid="{14971C58-AB76-4A2A-B231-5F8CA03CF491}"/>
     </a:ext>
   </a:extLst>
 </a:theme>

</xml_diff>

<commit_message>
Updatedd leg animation and title page
</commit_message>
<xml_diff>
--- a/Documentation/Presentation/Design Presentation/Design Presentation.pptx
+++ b/Documentation/Presentation/Design Presentation/Design Presentation.pptx
@@ -151,7 +151,7 @@
   </p:defaultTextStyle>
   <p:extLst>
     <p:ext uri="{EFAFB233-063F-42B5-8137-9DF3F51BA10A}">
-      <p15:sldGuideLst xmlns:p15="http://schemas.microsoft.com/office/powerpoint/2012/main" xmlns="">
+      <p15:sldGuideLst xmlns:p15="http://schemas.microsoft.com/office/powerpoint/2012/main">
         <p15:guide id="1" orient="horz" pos="2160">
           <p15:clr>
             <a:srgbClr val="A4A3A4"/>
@@ -12567,6 +12567,85 @@
           </a:prstGeom>
         </p:spPr>
       </p:pic>
+      <p:pic>
+        <p:nvPicPr>
+          <p:cNvPr id="7" name="Picture 6"/>
+          <p:cNvPicPr/>
+          <p:nvPr/>
+        </p:nvPicPr>
+        <p:blipFill>
+          <a:blip r:embed="rId5" cstate="print">
+            <a:extLst>
+              <a:ext uri="{28A0092B-C50C-407E-A947-70E740481C1C}">
+                <a14:useLocalDpi xmlns:a14="http://schemas.microsoft.com/office/drawing/2010/main" val="0"/>
+              </a:ext>
+            </a:extLst>
+          </a:blip>
+          <a:stretch>
+            <a:fillRect/>
+          </a:stretch>
+        </p:blipFill>
+        <p:spPr>
+          <a:xfrm>
+            <a:off x="7886937" y="3141780"/>
+            <a:ext cx="3543062" cy="2957094"/>
+          </a:xfrm>
+          <a:prstGeom prst="rect">
+            <a:avLst/>
+          </a:prstGeom>
+          <a:ln>
+            <a:solidFill>
+              <a:schemeClr val="bg1"/>
+            </a:solidFill>
+          </a:ln>
+        </p:spPr>
+      </p:pic>
+      <p:pic>
+        <p:nvPicPr>
+          <p:cNvPr id="9" name="Picture 8"/>
+          <p:cNvPicPr/>
+          <p:nvPr/>
+        </p:nvPicPr>
+        <p:blipFill rotWithShape="1">
+          <a:blip r:embed="rId6">
+            <a:extLst>
+              <a:ext uri="{BEBA8EAE-BF5A-486C-A8C5-ECC9F3942E4B}">
+                <a14:imgProps xmlns:a14="http://schemas.microsoft.com/office/drawing/2010/main">
+                  <a14:imgLayer r:embed="rId7">
+                    <a14:imgEffect>
+                      <a14:sharpenSoften amount="50000"/>
+                    </a14:imgEffect>
+                  </a14:imgLayer>
+                </a14:imgProps>
+              </a:ext>
+              <a:ext uri="{28A0092B-C50C-407E-A947-70E740481C1C}">
+                <a14:useLocalDpi xmlns:a14="http://schemas.microsoft.com/office/drawing/2010/main" val="0"/>
+              </a:ext>
+            </a:extLst>
+          </a:blip>
+          <a:srcRect l="11132" r="28321" b="27402"/>
+          <a:stretch/>
+        </p:blipFill>
+        <p:spPr bwMode="auto">
+          <a:xfrm>
+            <a:off x="4048866" y="134177"/>
+            <a:ext cx="1759585" cy="1158240"/>
+          </a:xfrm>
+          <a:prstGeom prst="rect">
+            <a:avLst/>
+          </a:prstGeom>
+          <a:ln>
+            <a:solidFill>
+              <a:schemeClr val="bg1"/>
+            </a:solidFill>
+          </a:ln>
+          <a:extLst>
+            <a:ext uri="{53640926-AAD7-44D8-BBD7-CCE9431645EC}">
+              <a14:shadowObscured xmlns:a14="http://schemas.microsoft.com/office/drawing/2010/main"/>
+            </a:ext>
+          </a:extLst>
+        </p:spPr>
+      </p:pic>
     </p:spTree>
     <p:extLst>
       <p:ext uri="{BB962C8B-B14F-4D97-AF65-F5344CB8AC3E}">
@@ -12716,7 +12795,7 @@
                         <m:fPr>
                           <m:ctrlPr>
                             <a:rPr lang="en-US" i="1" smtClean="0">
-                              <a:latin typeface="Cambria Math"/>
+                              <a:latin typeface="Cambria Math" panose="02040503050406030204" pitchFamily="18" charset="0"/>
                             </a:rPr>
                           </m:ctrlPr>
                         </m:fPr>
@@ -12743,7 +12822,7 @@
                             <m:sSubPr>
                               <m:ctrlPr>
                                 <a:rPr lang="en-US" i="1">
-                                  <a:latin typeface="Cambria Math"/>
+                                  <a:latin typeface="Cambria Math" panose="02040503050406030204" pitchFamily="18" charset="0"/>
                                 </a:rPr>
                               </m:ctrlPr>
                             </m:sSubPr>
@@ -12780,7 +12859,7 @@
                             <m:sSubPr>
                               <m:ctrlPr>
                                 <a:rPr lang="en-US" i="1">
-                                  <a:latin typeface="Cambria Math"/>
+                                  <a:latin typeface="Cambria Math" panose="02040503050406030204" pitchFamily="18" charset="0"/>
                                 </a:rPr>
                               </m:ctrlPr>
                             </m:sSubPr>
@@ -12817,7 +12896,7 @@
                             <m:sSubPr>
                               <m:ctrlPr>
                                 <a:rPr lang="en-US" i="1">
-                                  <a:latin typeface="Cambria Math"/>
+                                  <a:latin typeface="Cambria Math" panose="02040503050406030204" pitchFamily="18" charset="0"/>
                                 </a:rPr>
                               </m:ctrlPr>
                             </m:sSubPr>
@@ -12880,7 +12959,7 @@
                       <m:fPr>
                         <m:ctrlPr>
                           <a:rPr lang="en-US" i="1">
-                            <a:latin typeface="Cambria Math"/>
+                            <a:latin typeface="Cambria Math" panose="02040503050406030204" pitchFamily="18" charset="0"/>
                           </a:rPr>
                         </m:ctrlPr>
                       </m:fPr>
@@ -12909,7 +12988,7 @@
                           <m:sSubPr>
                             <m:ctrlPr>
                               <a:rPr lang="en-US" i="1">
-                                <a:latin typeface="Cambria Math"/>
+                                <a:latin typeface="Cambria Math" panose="02040503050406030204" pitchFamily="18" charset="0"/>
                               </a:rPr>
                             </m:ctrlPr>
                           </m:sSubPr>
@@ -12936,7 +13015,7 @@
                       <m:fPr>
                         <m:ctrlPr>
                           <a:rPr lang="en-US" i="1">
-                            <a:latin typeface="Cambria Math"/>
+                            <a:latin typeface="Cambria Math" panose="02040503050406030204" pitchFamily="18" charset="0"/>
                           </a:rPr>
                         </m:ctrlPr>
                       </m:fPr>
@@ -12951,7 +13030,7 @@
                           <m:sSubPr>
                             <m:ctrlPr>
                               <a:rPr lang="en-US" i="1">
-                                <a:latin typeface="Cambria Math"/>
+                                <a:latin typeface="Cambria Math" panose="02040503050406030204" pitchFamily="18" charset="0"/>
                               </a:rPr>
                             </m:ctrlPr>
                           </m:sSubPr>
@@ -12998,7 +13077,7 @@
                       <m:fPr>
                         <m:ctrlPr>
                           <a:rPr lang="en-US" i="1">
-                            <a:latin typeface="Cambria Math"/>
+                            <a:latin typeface="Cambria Math" panose="02040503050406030204" pitchFamily="18" charset="0"/>
                           </a:rPr>
                         </m:ctrlPr>
                       </m:fPr>
@@ -13027,7 +13106,7 @@
                           <m:sSubPr>
                             <m:ctrlPr>
                               <a:rPr lang="en-US" i="1">
-                                <a:latin typeface="Cambria Math"/>
+                                <a:latin typeface="Cambria Math" panose="02040503050406030204" pitchFamily="18" charset="0"/>
                               </a:rPr>
                             </m:ctrlPr>
                           </m:sSubPr>
@@ -13054,7 +13133,7 @@
                       <m:fPr>
                         <m:ctrlPr>
                           <a:rPr lang="en-US" i="1">
-                            <a:latin typeface="Cambria Math"/>
+                            <a:latin typeface="Cambria Math" panose="02040503050406030204" pitchFamily="18" charset="0"/>
                           </a:rPr>
                         </m:ctrlPr>
                       </m:fPr>
@@ -13069,7 +13148,7 @@
                           <m:sSubPr>
                             <m:ctrlPr>
                               <a:rPr lang="en-US" i="1">
-                                <a:latin typeface="Cambria Math"/>
+                                <a:latin typeface="Cambria Math" panose="02040503050406030204" pitchFamily="18" charset="0"/>
                               </a:rPr>
                             </m:ctrlPr>
                           </m:sSubPr>
@@ -13116,7 +13195,7 @@
                       <m:fPr>
                         <m:ctrlPr>
                           <a:rPr lang="en-US" i="1">
-                            <a:latin typeface="Cambria Math"/>
+                            <a:latin typeface="Cambria Math" panose="02040503050406030204" pitchFamily="18" charset="0"/>
                           </a:rPr>
                         </m:ctrlPr>
                       </m:fPr>
@@ -13145,7 +13224,7 @@
                           <m:sSubPr>
                             <m:ctrlPr>
                               <a:rPr lang="en-US" i="1">
-                                <a:latin typeface="Cambria Math"/>
+                                <a:latin typeface="Cambria Math" panose="02040503050406030204" pitchFamily="18" charset="0"/>
                               </a:rPr>
                             </m:ctrlPr>
                           </m:sSubPr>
@@ -13172,7 +13251,7 @@
                       <m:fPr>
                         <m:ctrlPr>
                           <a:rPr lang="en-US" i="1">
-                            <a:latin typeface="Cambria Math"/>
+                            <a:latin typeface="Cambria Math" panose="02040503050406030204" pitchFamily="18" charset="0"/>
                           </a:rPr>
                         </m:ctrlPr>
                       </m:fPr>
@@ -13187,7 +13266,7 @@
                           <m:sSubPr>
                             <m:ctrlPr>
                               <a:rPr lang="en-US" i="1">
-                                <a:latin typeface="Cambria Math"/>
+                                <a:latin typeface="Cambria Math" panose="02040503050406030204" pitchFamily="18" charset="0"/>
                               </a:rPr>
                             </m:ctrlPr>
                           </m:sSubPr>
@@ -13249,7 +13328,7 @@
                         <m:dPr>
                           <m:ctrlPr>
                             <a:rPr lang="en-US" i="1">
-                              <a:latin typeface="Cambria Math"/>
+                              <a:latin typeface="Cambria Math" panose="02040503050406030204" pitchFamily="18" charset="0"/>
                             </a:rPr>
                           </m:ctrlPr>
                         </m:dPr>
@@ -13260,7 +13339,7 @@
                               <m:endChr m:val="]"/>
                               <m:ctrlPr>
                                 <a:rPr lang="en-US" i="1">
-                                  <a:latin typeface="Cambria Math"/>
+                                  <a:latin typeface="Cambria Math" panose="02040503050406030204" pitchFamily="18" charset="0"/>
                                 </a:rPr>
                               </m:ctrlPr>
                             </m:dPr>
@@ -13269,7 +13348,7 @@
                                 <m:fPr>
                                   <m:ctrlPr>
                                     <a:rPr lang="en-US" i="1">
-                                      <a:latin typeface="Cambria Math"/>
+                                      <a:latin typeface="Cambria Math" panose="02040503050406030204" pitchFamily="18" charset="0"/>
                                     </a:rPr>
                                   </m:ctrlPr>
                                 </m:fPr>
@@ -13298,7 +13377,7 @@
                                     <m:sSubPr>
                                       <m:ctrlPr>
                                         <a:rPr lang="en-US" i="1">
-                                          <a:latin typeface="Cambria Math"/>
+                                          <a:latin typeface="Cambria Math" panose="02040503050406030204" pitchFamily="18" charset="0"/>
                                         </a:rPr>
                                       </m:ctrlPr>
                                     </m:sSubPr>
@@ -13329,7 +13408,7 @@
                               <m:endChr m:val="]"/>
                               <m:ctrlPr>
                                 <a:rPr lang="en-US" i="1">
-                                  <a:latin typeface="Cambria Math"/>
+                                  <a:latin typeface="Cambria Math" panose="02040503050406030204" pitchFamily="18" charset="0"/>
                                 </a:rPr>
                               </m:ctrlPr>
                             </m:dPr>
@@ -13338,7 +13417,7 @@
                                 <m:fPr>
                                   <m:ctrlPr>
                                     <a:rPr lang="en-US" i="1">
-                                      <a:latin typeface="Cambria Math"/>
+                                      <a:latin typeface="Cambria Math" panose="02040503050406030204" pitchFamily="18" charset="0"/>
                                     </a:rPr>
                                   </m:ctrlPr>
                                 </m:fPr>
@@ -13367,7 +13446,7 @@
                                     <m:sSubPr>
                                       <m:ctrlPr>
                                         <a:rPr lang="en-US" i="1">
-                                          <a:latin typeface="Cambria Math"/>
+                                          <a:latin typeface="Cambria Math" panose="02040503050406030204" pitchFamily="18" charset="0"/>
                                         </a:rPr>
                                       </m:ctrlPr>
                                     </m:sSubPr>
@@ -13398,7 +13477,7 @@
                               <m:endChr m:val="]"/>
                               <m:ctrlPr>
                                 <a:rPr lang="en-US" i="1">
-                                  <a:latin typeface="Cambria Math"/>
+                                  <a:latin typeface="Cambria Math" panose="02040503050406030204" pitchFamily="18" charset="0"/>
                                 </a:rPr>
                               </m:ctrlPr>
                             </m:dPr>
@@ -13417,7 +13496,7 @@
                               <m:endChr m:val="]"/>
                               <m:ctrlPr>
                                 <a:rPr lang="en-US" i="1">
-                                  <a:latin typeface="Cambria Math"/>
+                                  <a:latin typeface="Cambria Math" panose="02040503050406030204" pitchFamily="18" charset="0"/>
                                 </a:rPr>
                               </m:ctrlPr>
                             </m:dPr>
@@ -13426,7 +13505,7 @@
                                 <m:fPr>
                                   <m:ctrlPr>
                                     <a:rPr lang="en-US" i="1">
-                                      <a:latin typeface="Cambria Math"/>
+                                      <a:latin typeface="Cambria Math" panose="02040503050406030204" pitchFamily="18" charset="0"/>
                                     </a:rPr>
                                   </m:ctrlPr>
                                 </m:fPr>
@@ -13455,7 +13534,7 @@
                                     <m:sSubPr>
                                       <m:ctrlPr>
                                         <a:rPr lang="en-US" i="1">
-                                          <a:latin typeface="Cambria Math"/>
+                                          <a:latin typeface="Cambria Math" panose="02040503050406030204" pitchFamily="18" charset="0"/>
                                         </a:rPr>
                                       </m:ctrlPr>
                                     </m:sSubPr>
@@ -13486,7 +13565,7 @@
                         <m:dPr>
                           <m:ctrlPr>
                             <a:rPr lang="en-US" i="1">
-                              <a:latin typeface="Cambria Math"/>
+                              <a:latin typeface="Cambria Math" panose="02040503050406030204" pitchFamily="18" charset="0"/>
                             </a:rPr>
                           </m:ctrlPr>
                         </m:dPr>
@@ -13495,7 +13574,7 @@
                             <m:eqArrPr>
                               <m:ctrlPr>
                                 <a:rPr lang="en-US" i="1">
-                                  <a:latin typeface="Cambria Math"/>
+                                  <a:latin typeface="Cambria Math" panose="02040503050406030204" pitchFamily="18" charset="0"/>
                                 </a:rPr>
                               </m:ctrlPr>
                             </m:eqArrPr>
@@ -13504,7 +13583,7 @@
                                 <m:fPr>
                                   <m:ctrlPr>
                                     <a:rPr lang="en-US" i="1">
-                                      <a:latin typeface="Cambria Math"/>
+                                      <a:latin typeface="Cambria Math" panose="02040503050406030204" pitchFamily="18" charset="0"/>
                                     </a:rPr>
                                   </m:ctrlPr>
                                 </m:fPr>
@@ -13519,7 +13598,7 @@
                                     <m:sSubPr>
                                       <m:ctrlPr>
                                         <a:rPr lang="en-US" i="1">
-                                          <a:latin typeface="Cambria Math"/>
+                                          <a:latin typeface="Cambria Math" panose="02040503050406030204" pitchFamily="18" charset="0"/>
                                         </a:rPr>
                                       </m:ctrlPr>
                                     </m:sSubPr>
@@ -13562,7 +13641,7 @@
                                 <m:fPr>
                                   <m:ctrlPr>
                                     <a:rPr lang="en-US" i="1">
-                                      <a:latin typeface="Cambria Math"/>
+                                      <a:latin typeface="Cambria Math" panose="02040503050406030204" pitchFamily="18" charset="0"/>
                                     </a:rPr>
                                   </m:ctrlPr>
                                 </m:fPr>
@@ -13577,7 +13656,7 @@
                                     <m:sSubPr>
                                       <m:ctrlPr>
                                         <a:rPr lang="en-US" i="1">
-                                          <a:latin typeface="Cambria Math"/>
+                                          <a:latin typeface="Cambria Math" panose="02040503050406030204" pitchFamily="18" charset="0"/>
                                         </a:rPr>
                                       </m:ctrlPr>
                                     </m:sSubPr>
@@ -13628,7 +13707,7 @@
                                 <m:fPr>
                                   <m:ctrlPr>
                                     <a:rPr lang="en-US" i="1">
-                                      <a:latin typeface="Cambria Math"/>
+                                      <a:latin typeface="Cambria Math" panose="02040503050406030204" pitchFamily="18" charset="0"/>
                                     </a:rPr>
                                   </m:ctrlPr>
                                 </m:fPr>
@@ -13643,7 +13722,7 @@
                                     <m:sSubPr>
                                       <m:ctrlPr>
                                         <a:rPr lang="en-US" i="1">
-                                          <a:latin typeface="Cambria Math"/>
+                                          <a:latin typeface="Cambria Math" panose="02040503050406030204" pitchFamily="18" charset="0"/>
                                         </a:rPr>
                                       </m:ctrlPr>
                                     </m:sSubPr>
@@ -13716,7 +13795,7 @@
                         <m:dPr>
                           <m:ctrlPr>
                             <a:rPr lang="en-US" i="1">
-                              <a:latin typeface="Cambria Math"/>
+                              <a:latin typeface="Cambria Math" panose="02040503050406030204" pitchFamily="18" charset="0"/>
                             </a:rPr>
                           </m:ctrlPr>
                         </m:dPr>
@@ -13733,7 +13812,7 @@
                         <m:dPr>
                           <m:ctrlPr>
                             <a:rPr lang="en-US" i="1">
-                              <a:latin typeface="Cambria Math"/>
+                              <a:latin typeface="Cambria Math" panose="02040503050406030204" pitchFamily="18" charset="0"/>
                             </a:rPr>
                           </m:ctrlPr>
                         </m:dPr>
@@ -13742,7 +13821,7 @@
                             <m:eqArrPr>
                               <m:ctrlPr>
                                 <a:rPr lang="en-US" i="1">
-                                  <a:latin typeface="Cambria Math"/>
+                                  <a:latin typeface="Cambria Math" panose="02040503050406030204" pitchFamily="18" charset="0"/>
                                 </a:rPr>
                               </m:ctrlPr>
                             </m:eqArrPr>
@@ -13751,7 +13830,7 @@
                                 <m:fPr>
                                   <m:ctrlPr>
                                     <a:rPr lang="en-US" i="1">
-                                      <a:latin typeface="Cambria Math"/>
+                                      <a:latin typeface="Cambria Math" panose="02040503050406030204" pitchFamily="18" charset="0"/>
                                     </a:rPr>
                                   </m:ctrlPr>
                                 </m:fPr>
@@ -13766,7 +13845,7 @@
                                     <m:sSubPr>
                                       <m:ctrlPr>
                                         <a:rPr lang="en-US" i="1">
-                                          <a:latin typeface="Cambria Math"/>
+                                          <a:latin typeface="Cambria Math" panose="02040503050406030204" pitchFamily="18" charset="0"/>
                                         </a:rPr>
                                       </m:ctrlPr>
                                     </m:sSubPr>
@@ -13809,7 +13888,7 @@
                                 <m:fPr>
                                   <m:ctrlPr>
                                     <a:rPr lang="en-US" i="1">
-                                      <a:latin typeface="Cambria Math"/>
+                                      <a:latin typeface="Cambria Math" panose="02040503050406030204" pitchFamily="18" charset="0"/>
                                     </a:rPr>
                                   </m:ctrlPr>
                                 </m:fPr>
@@ -13824,7 +13903,7 @@
                                     <m:sSubPr>
                                       <m:ctrlPr>
                                         <a:rPr lang="en-US" i="1">
-                                          <a:latin typeface="Cambria Math"/>
+                                          <a:latin typeface="Cambria Math" panose="02040503050406030204" pitchFamily="18" charset="0"/>
                                         </a:rPr>
                                       </m:ctrlPr>
                                     </m:sSubPr>
@@ -13875,7 +13954,7 @@
                                 <m:fPr>
                                   <m:ctrlPr>
                                     <a:rPr lang="en-US" i="1">
-                                      <a:latin typeface="Cambria Math"/>
+                                      <a:latin typeface="Cambria Math" panose="02040503050406030204" pitchFamily="18" charset="0"/>
                                     </a:rPr>
                                   </m:ctrlPr>
                                 </m:fPr>
@@ -13890,7 +13969,7 @@
                                     <m:sSubPr>
                                       <m:ctrlPr>
                                         <a:rPr lang="en-US" i="1">
-                                          <a:latin typeface="Cambria Math"/>
+                                          <a:latin typeface="Cambria Math" panose="02040503050406030204" pitchFamily="18" charset="0"/>
                                         </a:rPr>
                                       </m:ctrlPr>
                                     </m:sSubPr>
@@ -14135,7 +14214,7 @@
                           <m:endChr m:val="]"/>
                           <m:ctrlPr>
                             <a:rPr lang="en-US" i="1">
-                              <a:latin typeface="Cambria Math"/>
+                              <a:latin typeface="Cambria Math" panose="02040503050406030204" pitchFamily="18" charset="0"/>
                             </a:rPr>
                           </m:ctrlPr>
                         </m:dPr>
@@ -14144,7 +14223,7 @@
                             <m:eqArrPr>
                               <m:ctrlPr>
                                 <a:rPr lang="en-US" i="1">
-                                  <a:latin typeface="Cambria Math"/>
+                                  <a:latin typeface="Cambria Math" panose="02040503050406030204" pitchFamily="18" charset="0"/>
                                 </a:rPr>
                               </m:ctrlPr>
                             </m:eqArrPr>
@@ -14153,7 +14232,7 @@
                                 <m:eqArrPr>
                                   <m:ctrlPr>
                                     <a:rPr lang="en-US" i="1">
-                                      <a:latin typeface="Cambria Math"/>
+                                      <a:latin typeface="Cambria Math" panose="02040503050406030204" pitchFamily="18" charset="0"/>
                                     </a:rPr>
                                   </m:ctrlPr>
                                 </m:eqArrPr>
@@ -14178,7 +14257,7 @@
                                     <m:sSubPr>
                                       <m:ctrlPr>
                                         <a:rPr lang="en-US" i="1">
-                                          <a:latin typeface="Cambria Math"/>
+                                          <a:latin typeface="Cambria Math" panose="02040503050406030204" pitchFamily="18" charset="0"/>
                                         </a:rPr>
                                       </m:ctrlPr>
                                     </m:sSubPr>
@@ -14205,7 +14284,7 @@
                                     <m:sSubPr>
                                       <m:ctrlPr>
                                         <a:rPr lang="en-US" i="1">
-                                          <a:latin typeface="Cambria Math"/>
+                                          <a:latin typeface="Cambria Math" panose="02040503050406030204" pitchFamily="18" charset="0"/>
                                         </a:rPr>
                                       </m:ctrlPr>
                                     </m:sSubPr>
@@ -14238,7 +14317,7 @@
                                     <m:sSubPr>
                                       <m:ctrlPr>
                                         <a:rPr lang="en-US" i="1">
-                                          <a:latin typeface="Cambria Math"/>
+                                          <a:latin typeface="Cambria Math" panose="02040503050406030204" pitchFamily="18" charset="0"/>
                                         </a:rPr>
                                       </m:ctrlPr>
                                     </m:sSubPr>
@@ -14271,7 +14350,7 @@
                                     <m:sSubPr>
                                       <m:ctrlPr>
                                         <a:rPr lang="en-US" i="1">
-                                          <a:latin typeface="Cambria Math"/>
+                                          <a:latin typeface="Cambria Math" panose="02040503050406030204" pitchFamily="18" charset="0"/>
                                         </a:rPr>
                                       </m:ctrlPr>
                                     </m:sSubPr>
@@ -14304,7 +14383,7 @@
                                     <m:sSubPr>
                                       <m:ctrlPr>
                                         <a:rPr lang="en-US" i="1">
-                                          <a:latin typeface="Cambria Math"/>
+                                          <a:latin typeface="Cambria Math" panose="02040503050406030204" pitchFamily="18" charset="0"/>
                                         </a:rPr>
                                       </m:ctrlPr>
                                     </m:sSubPr>
@@ -14339,7 +14418,7 @@
                                 <m:sSubPr>
                                   <m:ctrlPr>
                                     <a:rPr lang="en-US" i="1">
-                                      <a:latin typeface="Cambria Math"/>
+                                      <a:latin typeface="Cambria Math" panose="02040503050406030204" pitchFamily="18" charset="0"/>
                                     </a:rPr>
                                   </m:ctrlPr>
                                 </m:sSubPr>
@@ -14372,7 +14451,7 @@
                                 <m:sSubPr>
                                   <m:ctrlPr>
                                     <a:rPr lang="en-US" i="1">
-                                      <a:latin typeface="Cambria Math"/>
+                                      <a:latin typeface="Cambria Math" panose="02040503050406030204" pitchFamily="18" charset="0"/>
                                     </a:rPr>
                                   </m:ctrlPr>
                                 </m:sSubPr>
@@ -14405,7 +14484,7 @@
                                 <m:sSubPr>
                                   <m:ctrlPr>
                                     <a:rPr lang="en-US" i="1">
-                                      <a:latin typeface="Cambria Math"/>
+                                      <a:latin typeface="Cambria Math" panose="02040503050406030204" pitchFamily="18" charset="0"/>
                                     </a:rPr>
                                   </m:ctrlPr>
                                 </m:sSubPr>
@@ -14438,7 +14517,7 @@
                                 <m:sSubPr>
                                   <m:ctrlPr>
                                     <a:rPr lang="en-US" i="1">
-                                      <a:latin typeface="Cambria Math"/>
+                                      <a:latin typeface="Cambria Math" panose="02040503050406030204" pitchFamily="18" charset="0"/>
                                     </a:rPr>
                                   </m:ctrlPr>
                                 </m:sSubPr>
@@ -14631,143 +14710,39 @@
           </a:p>
         </p:txBody>
       </p:sp>
-      <p:grpSp>
-        <p:nvGrpSpPr>
-          <p:cNvPr id="4" name="Group 3"/>
-          <p:cNvGrpSpPr/>
-          <p:nvPr/>
-        </p:nvGrpSpPr>
-        <p:grpSpPr>
+      <p:pic>
+        <p:nvPicPr>
+          <p:cNvPr id="8" name="Leg Animation">
+            <a:hlinkClick r:id="" action="ppaction://media"/>
+          </p:cNvPr>
+          <p:cNvPicPr>
+            <a:picLocks noChangeAspect="1"/>
+          </p:cNvPicPr>
+          <p:nvPr>
+            <a:videoFile r:link="rId2"/>
+            <p:extLst>
+              <p:ext uri="{DAA4B4D4-6D71-4841-9C94-3DE7FCFB9230}">
+                <p14:media xmlns:p14="http://schemas.microsoft.com/office/powerpoint/2010/main" r:embed="rId1"/>
+              </p:ext>
+            </p:extLst>
+          </p:nvPr>
+        </p:nvPicPr>
+        <p:blipFill>
+          <a:blip r:embed="rId4"/>
+          <a:stretch>
+            <a:fillRect/>
+          </a:stretch>
+        </p:blipFill>
+        <p:spPr>
           <a:xfrm>
-            <a:off x="6469810" y="1951211"/>
-            <a:ext cx="5119987" cy="3839990"/>
-            <a:chOff x="5375335" y="1775693"/>
-            <a:chExt cx="5672076" cy="4254057"/>
+            <a:off x="6777486" y="2249487"/>
+            <a:ext cx="4572000" cy="3048000"/>
           </a:xfrm>
-        </p:grpSpPr>
-        <p:pic>
-          <p:nvPicPr>
-            <p:cNvPr id="5" name="Picture 4"/>
-            <p:cNvPicPr>
-              <a:picLocks noChangeAspect="1"/>
-            </p:cNvPicPr>
-            <p:nvPr/>
-          </p:nvPicPr>
-          <p:blipFill>
-            <a:blip r:embed="rId2">
-              <a:extLst>
-                <a:ext uri="{28A0092B-C50C-407E-A947-70E740481C1C}">
-                  <a14:useLocalDpi xmlns:a14="http://schemas.microsoft.com/office/drawing/2010/main" val="0"/>
-                </a:ext>
-              </a:extLst>
-            </a:blip>
-            <a:stretch>
-              <a:fillRect/>
-            </a:stretch>
-          </p:blipFill>
-          <p:spPr>
-            <a:xfrm>
-              <a:off x="5375335" y="1775693"/>
-              <a:ext cx="5672076" cy="4254057"/>
-            </a:xfrm>
-            <a:prstGeom prst="rect">
-              <a:avLst/>
-            </a:prstGeom>
-          </p:spPr>
-        </p:pic>
-        <p:sp>
-          <p:nvSpPr>
-            <p:cNvPr id="6" name="Rectangle 5"/>
-            <p:cNvSpPr/>
-            <p:nvPr/>
-          </p:nvSpPr>
-          <p:spPr>
-            <a:xfrm>
-              <a:off x="7076999" y="1785671"/>
-              <a:ext cx="2268748" cy="302791"/>
-            </a:xfrm>
-            <a:prstGeom prst="rect">
-              <a:avLst/>
-            </a:prstGeom>
-            <a:solidFill>
-              <a:srgbClr val="C9CCC9"/>
-            </a:solidFill>
-            <a:ln>
-              <a:noFill/>
-            </a:ln>
-          </p:spPr>
-          <p:style>
-            <a:lnRef idx="2">
-              <a:schemeClr val="accent1">
-                <a:shade val="50000"/>
-              </a:schemeClr>
-            </a:lnRef>
-            <a:fillRef idx="1">
-              <a:schemeClr val="accent1"/>
-            </a:fillRef>
-            <a:effectRef idx="0">
-              <a:schemeClr val="accent1"/>
-            </a:effectRef>
-            <a:fontRef idx="minor">
-              <a:schemeClr val="lt1"/>
-            </a:fontRef>
-          </p:style>
-          <p:txBody>
-            <a:bodyPr rtlCol="0" anchor="ctr"/>
-            <a:lstStyle/>
-            <a:p>
-              <a:pPr algn="ctr"/>
-              <a:endParaRPr lang="en-US"/>
-            </a:p>
-          </p:txBody>
-        </p:sp>
-        <p:sp>
-          <p:nvSpPr>
-            <p:cNvPr id="7" name="Rectangle 6"/>
-            <p:cNvSpPr/>
-            <p:nvPr/>
-          </p:nvSpPr>
-          <p:spPr>
-            <a:xfrm>
-              <a:off x="5375335" y="5693435"/>
-              <a:ext cx="1241125" cy="334386"/>
-            </a:xfrm>
-            <a:prstGeom prst="rect">
-              <a:avLst/>
-            </a:prstGeom>
-            <a:solidFill>
-              <a:srgbClr val="C9CCC9"/>
-            </a:solidFill>
-            <a:ln>
-              <a:noFill/>
-            </a:ln>
-          </p:spPr>
-          <p:style>
-            <a:lnRef idx="2">
-              <a:schemeClr val="accent1">
-                <a:shade val="50000"/>
-              </a:schemeClr>
-            </a:lnRef>
-            <a:fillRef idx="1">
-              <a:schemeClr val="accent1"/>
-            </a:fillRef>
-            <a:effectRef idx="0">
-              <a:schemeClr val="accent1"/>
-            </a:effectRef>
-            <a:fontRef idx="minor">
-              <a:schemeClr val="lt1"/>
-            </a:fontRef>
-          </p:style>
-          <p:txBody>
-            <a:bodyPr rtlCol="0" anchor="ctr"/>
-            <a:lstStyle/>
-            <a:p>
-              <a:pPr algn="ctr"/>
-              <a:endParaRPr lang="en-US"/>
-            </a:p>
-          </p:txBody>
-        </p:sp>
-      </p:grpSp>
+          <a:prstGeom prst="rect">
+            <a:avLst/>
+          </a:prstGeom>
+        </p:spPr>
+      </p:pic>
     </p:spTree>
     <p:extLst>
       <p:ext uri="{BB962C8B-B14F-4D97-AF65-F5344CB8AC3E}">
@@ -14781,7 +14756,138 @@
   <p:timing>
     <p:tnLst>
       <p:par>
-        <p:cTn id="1" dur="indefinite" restart="never" nodeType="tmRoot"/>
+        <p:cTn id="1" dur="indefinite" restart="never" nodeType="tmRoot">
+          <p:childTnLst>
+            <p:seq concurrent="1" nextAc="seek">
+              <p:cTn id="2" dur="indefinite" nodeType="mainSeq">
+                <p:childTnLst>
+                  <p:par>
+                    <p:cTn id="3" fill="hold">
+                      <p:stCondLst>
+                        <p:cond delay="indefinite"/>
+                        <p:cond evt="onBegin" delay="0">
+                          <p:tn val="2"/>
+                        </p:cond>
+                      </p:stCondLst>
+                      <p:childTnLst>
+                        <p:par>
+                          <p:cTn id="4" fill="hold">
+                            <p:stCondLst>
+                              <p:cond delay="0"/>
+                            </p:stCondLst>
+                            <p:childTnLst>
+                              <p:par>
+                                <p:cTn id="5" presetID="1" presetClass="mediacall" presetSubtype="0" fill="hold" nodeType="afterEffect">
+                                  <p:stCondLst>
+                                    <p:cond delay="0"/>
+                                  </p:stCondLst>
+                                  <p:childTnLst>
+                                    <p:cmd type="call" cmd="playFrom(0.0)">
+                                      <p:cBhvr>
+                                        <p:cTn id="6" dur="34020" fill="hold"/>
+                                        <p:tgtEl>
+                                          <p:spTgt spid="8"/>
+                                        </p:tgtEl>
+                                      </p:cBhvr>
+                                    </p:cmd>
+                                  </p:childTnLst>
+                                </p:cTn>
+                              </p:par>
+                            </p:childTnLst>
+                          </p:cTn>
+                        </p:par>
+                      </p:childTnLst>
+                    </p:cTn>
+                  </p:par>
+                </p:childTnLst>
+              </p:cTn>
+              <p:prevCondLst>
+                <p:cond evt="onPrev" delay="0">
+                  <p:tgtEl>
+                    <p:sldTgt/>
+                  </p:tgtEl>
+                </p:cond>
+              </p:prevCondLst>
+              <p:nextCondLst>
+                <p:cond evt="onNext" delay="0">
+                  <p:tgtEl>
+                    <p:sldTgt/>
+                  </p:tgtEl>
+                </p:cond>
+              </p:nextCondLst>
+            </p:seq>
+            <p:video>
+              <p:cMediaNode vol="80000">
+                <p:cTn id="7" repeatCount="indefinite" fill="hold" display="0">
+                  <p:stCondLst>
+                    <p:cond delay="indefinite"/>
+                  </p:stCondLst>
+                </p:cTn>
+                <p:tgtEl>
+                  <p:spTgt spid="8"/>
+                </p:tgtEl>
+              </p:cMediaNode>
+            </p:video>
+            <p:seq concurrent="1" nextAc="seek">
+              <p:cTn id="8" restart="whenNotActive" fill="hold" evtFilter="cancelBubble" nodeType="interactiveSeq">
+                <p:stCondLst>
+                  <p:cond evt="onClick" delay="0">
+                    <p:tgtEl>
+                      <p:spTgt spid="8"/>
+                    </p:tgtEl>
+                  </p:cond>
+                </p:stCondLst>
+                <p:endSync evt="end" delay="0">
+                  <p:rtn val="all"/>
+                </p:endSync>
+                <p:childTnLst>
+                  <p:par>
+                    <p:cTn id="9" fill="hold">
+                      <p:stCondLst>
+                        <p:cond delay="0"/>
+                      </p:stCondLst>
+                      <p:childTnLst>
+                        <p:par>
+                          <p:cTn id="10" fill="hold">
+                            <p:stCondLst>
+                              <p:cond delay="0"/>
+                            </p:stCondLst>
+                            <p:childTnLst>
+                              <p:par>
+                                <p:cTn id="11" presetID="2" presetClass="mediacall" presetSubtype="0" fill="hold" nodeType="clickEffect">
+                                  <p:stCondLst>
+                                    <p:cond delay="0"/>
+                                  </p:stCondLst>
+                                  <p:childTnLst>
+                                    <p:cmd type="call" cmd="togglePause">
+                                      <p:cBhvr>
+                                        <p:cTn id="12" dur="1" fill="hold"/>
+                                        <p:tgtEl>
+                                          <p:spTgt spid="8"/>
+                                        </p:tgtEl>
+                                      </p:cBhvr>
+                                    </p:cmd>
+                                  </p:childTnLst>
+                                </p:cTn>
+                              </p:par>
+                            </p:childTnLst>
+                          </p:cTn>
+                        </p:par>
+                      </p:childTnLst>
+                    </p:cTn>
+                  </p:par>
+                </p:childTnLst>
+              </p:cTn>
+              <p:nextCondLst>
+                <p:cond evt="onClick" delay="0">
+                  <p:tgtEl>
+                    <p:spTgt spid="8"/>
+                  </p:tgtEl>
+                </p:cond>
+              </p:nextCondLst>
+            </p:seq>
+          </p:childTnLst>
+        </p:cTn>
       </p:par>
     </p:tnLst>
   </p:timing>
@@ -15019,7 +15125,7 @@
                         <m:sSubPr>
                           <m:ctrlPr>
                             <a:rPr lang="en-US" i="1" smtClean="0">
-                              <a:latin typeface="Cambria Math"/>
+                              <a:latin typeface="Cambria Math" panose="02040503050406030204" pitchFamily="18" charset="0"/>
                             </a:rPr>
                           </m:ctrlPr>
                         </m:sSubPr>
@@ -15062,7 +15168,7 @@
                         <m:sSubPr>
                           <m:ctrlPr>
                             <a:rPr lang="en-US" i="1">
-                              <a:latin typeface="Cambria Math"/>
+                              <a:latin typeface="Cambria Math" panose="02040503050406030204" pitchFamily="18" charset="0"/>
                             </a:rPr>
                           </m:ctrlPr>
                         </m:sSubPr>
@@ -15105,7 +15211,7 @@
                         <m:sSubPr>
                           <m:ctrlPr>
                             <a:rPr lang="en-US" i="1">
-                              <a:latin typeface="Cambria Math"/>
+                              <a:latin typeface="Cambria Math" panose="02040503050406030204" pitchFamily="18" charset="0"/>
                             </a:rPr>
                           </m:ctrlPr>
                         </m:sSubPr>
@@ -15148,7 +15254,7 @@
                         <m:sSubPr>
                           <m:ctrlPr>
                             <a:rPr lang="en-US" i="1">
-                              <a:latin typeface="Cambria Math"/>
+                              <a:latin typeface="Cambria Math" panose="02040503050406030204" pitchFamily="18" charset="0"/>
                             </a:rPr>
                           </m:ctrlPr>
                         </m:sSubPr>
@@ -15191,7 +15297,7 @@
                         <m:fPr>
                           <m:ctrlPr>
                             <a:rPr lang="en-US" b="0" i="1" smtClean="0">
-                              <a:latin typeface="Cambria Math"/>
+                              <a:latin typeface="Cambria Math" panose="02040503050406030204" pitchFamily="18" charset="0"/>
                             </a:rPr>
                           </m:ctrlPr>
                         </m:fPr>
@@ -15231,7 +15337,7 @@
                         <m:sSubPr>
                           <m:ctrlPr>
                             <a:rPr lang="en-US" i="1">
-                              <a:latin typeface="Cambria Math"/>
+                              <a:latin typeface="Cambria Math" panose="02040503050406030204" pitchFamily="18" charset="0"/>
                             </a:rPr>
                           </m:ctrlPr>
                         </m:sSubPr>
@@ -15274,7 +15380,7 @@
                         <m:sSubPr>
                           <m:ctrlPr>
                             <a:rPr lang="en-US" i="1">
-                              <a:latin typeface="Cambria Math"/>
+                              <a:latin typeface="Cambria Math" panose="02040503050406030204" pitchFamily="18" charset="0"/>
                             </a:rPr>
                           </m:ctrlPr>
                         </m:sSubPr>
@@ -15317,7 +15423,7 @@
                         <m:sSubPr>
                           <m:ctrlPr>
                             <a:rPr lang="en-US" i="1">
-                              <a:latin typeface="Cambria Math"/>
+                              <a:latin typeface="Cambria Math" panose="02040503050406030204" pitchFamily="18" charset="0"/>
                             </a:rPr>
                           </m:ctrlPr>
                         </m:sSubPr>
@@ -15360,7 +15466,7 @@
                         <m:sSubPr>
                           <m:ctrlPr>
                             <a:rPr lang="en-US" i="1">
-                              <a:latin typeface="Cambria Math"/>
+                              <a:latin typeface="Cambria Math" panose="02040503050406030204" pitchFamily="18" charset="0"/>
                             </a:rPr>
                           </m:ctrlPr>
                         </m:sSubPr>
@@ -15403,7 +15509,7 @@
                         <m:fPr>
                           <m:ctrlPr>
                             <a:rPr lang="en-US" b="0" i="1" smtClean="0">
-                              <a:latin typeface="Cambria Math"/>
+                              <a:latin typeface="Cambria Math" panose="02040503050406030204" pitchFamily="18" charset="0"/>
                             </a:rPr>
                           </m:ctrlPr>
                         </m:fPr>
@@ -17890,7 +17996,7 @@
                         <m:sSubPr>
                           <m:ctrlPr>
                             <a:rPr lang="en-US" i="1">
-                              <a:latin typeface="Cambria Math"/>
+                              <a:latin typeface="Cambria Math" panose="02040503050406030204" pitchFamily="18" charset="0"/>
                             </a:rPr>
                           </m:ctrlPr>
                         </m:sSubPr>
@@ -17933,7 +18039,7 @@
                         <m:sSubPr>
                           <m:ctrlPr>
                             <a:rPr lang="en-US" i="1">
-                              <a:latin typeface="Cambria Math"/>
+                              <a:latin typeface="Cambria Math" panose="02040503050406030204" pitchFamily="18" charset="0"/>
                             </a:rPr>
                           </m:ctrlPr>
                         </m:sSubPr>
@@ -17976,7 +18082,7 @@
                         <m:sSubPr>
                           <m:ctrlPr>
                             <a:rPr lang="en-US" i="1">
-                              <a:latin typeface="Cambria Math"/>
+                              <a:latin typeface="Cambria Math" panose="02040503050406030204" pitchFamily="18" charset="0"/>
                             </a:rPr>
                           </m:ctrlPr>
                         </m:sSubPr>
@@ -18019,7 +18125,7 @@
                         <m:fPr>
                           <m:ctrlPr>
                             <a:rPr lang="en-US" i="1" smtClean="0">
-                              <a:latin typeface="Cambria Math"/>
+                              <a:latin typeface="Cambria Math" panose="02040503050406030204" pitchFamily="18" charset="0"/>
                             </a:rPr>
                           </m:ctrlPr>
                         </m:fPr>
@@ -19284,7 +19390,7 @@
                         <m:sSubPr>
                           <m:ctrlPr>
                             <a:rPr lang="en-US" i="1" smtClean="0">
-                              <a:latin typeface="Cambria Math"/>
+                              <a:latin typeface="Cambria Math" panose="02040503050406030204" pitchFamily="18" charset="0"/>
                             </a:rPr>
                           </m:ctrlPr>
                         </m:sSubPr>
@@ -19315,7 +19421,7 @@
                         <m:sSubPr>
                           <m:ctrlPr>
                             <a:rPr lang="en-US" i="1">
-                              <a:latin typeface="Cambria Math"/>
+                              <a:latin typeface="Cambria Math" panose="02040503050406030204" pitchFamily="18" charset="0"/>
                             </a:rPr>
                           </m:ctrlPr>
                         </m:sSubPr>
@@ -19352,7 +19458,7 @@
                         <m:sSubPr>
                           <m:ctrlPr>
                             <a:rPr lang="en-US" i="1">
-                              <a:latin typeface="Cambria Math"/>
+                              <a:latin typeface="Cambria Math" panose="02040503050406030204" pitchFamily="18" charset="0"/>
                             </a:rPr>
                           </m:ctrlPr>
                         </m:sSubPr>
@@ -19383,7 +19489,7 @@
                         <m:sSubPr>
                           <m:ctrlPr>
                             <a:rPr lang="en-US" i="1">
-                              <a:latin typeface="Cambria Math"/>
+                              <a:latin typeface="Cambria Math" panose="02040503050406030204" pitchFamily="18" charset="0"/>
                             </a:rPr>
                           </m:ctrlPr>
                         </m:sSubPr>
@@ -19420,7 +19526,7 @@
                         <m:naryPr>
                           <m:ctrlPr>
                             <a:rPr lang="en-US" b="0" i="1" smtClean="0">
-                              <a:latin typeface="Cambria Math"/>
+                              <a:latin typeface="Cambria Math" panose="02040503050406030204" pitchFamily="18" charset="0"/>
                             </a:rPr>
                           </m:ctrlPr>
                         </m:naryPr>
@@ -19429,7 +19535,7 @@
                             <m:sSupPr>
                               <m:ctrlPr>
                                 <a:rPr lang="en-US" b="0" i="1" smtClean="0">
-                                  <a:latin typeface="Cambria Math"/>
+                                  <a:latin typeface="Cambria Math" panose="02040503050406030204" pitchFamily="18" charset="0"/>
                                 </a:rPr>
                               </m:ctrlPr>
                             </m:sSupPr>
@@ -19456,7 +19562,7 @@
                             <m:sSupPr>
                               <m:ctrlPr>
                                 <a:rPr lang="en-US" b="0" i="1" smtClean="0">
-                                  <a:latin typeface="Cambria Math"/>
+                                  <a:latin typeface="Cambria Math" panose="02040503050406030204" pitchFamily="18" charset="0"/>
                                 </a:rPr>
                               </m:ctrlPr>
                             </m:sSupPr>
@@ -19489,7 +19595,7 @@
                             <m:dPr>
                               <m:ctrlPr>
                                 <a:rPr lang="en-US" b="0" i="1" smtClean="0">
-                                  <a:latin typeface="Cambria Math"/>
+                                  <a:latin typeface="Cambria Math" panose="02040503050406030204" pitchFamily="18" charset="0"/>
                                 </a:rPr>
                               </m:ctrlPr>
                             </m:dPr>
@@ -20348,11 +20454,7 @@
           <a:p>
             <a:r>
               <a:rPr lang="en-US" dirty="0" smtClean="0"/>
-              <a:t>FEA </a:t>
-            </a:r>
-            <a:r>
-              <a:rPr lang="en-US" dirty="0" smtClean="0"/>
-              <a:t>of Components</a:t>
+              <a:t>FEA of Components</a:t>
             </a:r>
             <a:endParaRPr lang="en-US" dirty="0"/>
           </a:p>
@@ -20462,11 +20564,7 @@
           <a:p>
             <a:r>
               <a:rPr lang="en-US" dirty="0" smtClean="0"/>
-              <a:t>Lightweight design to reduce the overall forces on the </a:t>
-            </a:r>
-            <a:r>
-              <a:rPr lang="en-US" dirty="0" smtClean="0"/>
-              <a:t>legs</a:t>
+              <a:t>Lightweight design to reduce the overall forces on the legs</a:t>
             </a:r>
           </a:p>
           <a:p>
@@ -20820,6 +20918,13 @@
   <p:clrMapOvr>
     <a:masterClrMapping/>
   </p:clrMapOvr>
+  <p:timing>
+    <p:tnLst>
+      <p:par>
+        <p:cTn id="1" dur="indefinite" restart="never" nodeType="tmRoot"/>
+      </p:par>
+    </p:tnLst>
+  </p:timing>
 </p:sld>
 </file>
 
@@ -20909,11 +21014,7 @@
             <a:pPr lvl="1"/>
             <a:r>
               <a:rPr lang="en-US" dirty="0" smtClean="0"/>
-              <a:t>Prevents singularity point of knee </a:t>
-            </a:r>
-            <a:r>
-              <a:rPr lang="en-US" dirty="0" smtClean="0"/>
-              <a:t>piston</a:t>
+              <a:t>Prevents singularity point of knee piston</a:t>
             </a:r>
           </a:p>
           <a:p>
@@ -21101,6 +21202,13 @@
   <p:clrMapOvr>
     <a:masterClrMapping/>
   </p:clrMapOvr>
+  <p:timing>
+    <p:tnLst>
+      <p:par>
+        <p:cTn id="1" dur="indefinite" restart="never" nodeType="tmRoot"/>
+      </p:par>
+    </p:tnLst>
+  </p:timing>
 </p:sld>
 </file>
 
@@ -21215,6 +21323,13 @@
   <p:clrMapOvr>
     <a:masterClrMapping/>
   </p:clrMapOvr>
+  <p:timing>
+    <p:tnLst>
+      <p:par>
+        <p:cTn id="1" dur="indefinite" restart="never" nodeType="tmRoot"/>
+      </p:par>
+    </p:tnLst>
+  </p:timing>
 </p:sld>
 </file>
 
@@ -21425,6 +21540,13 @@
   <p:clrMapOvr>
     <a:masterClrMapping/>
   </p:clrMapOvr>
+  <p:timing>
+    <p:tnLst>
+      <p:par>
+        <p:cTn id="1" dur="indefinite" restart="never" nodeType="tmRoot"/>
+      </p:par>
+    </p:tnLst>
+  </p:timing>
 </p:sld>
 </file>
 
@@ -21536,6 +21658,13 @@
   <p:clrMapOvr>
     <a:masterClrMapping/>
   </p:clrMapOvr>
+  <p:timing>
+    <p:tnLst>
+      <p:par>
+        <p:cTn id="1" dur="indefinite" restart="never" nodeType="tmRoot"/>
+      </p:par>
+    </p:tnLst>
+  </p:timing>
 </p:sld>
 </file>
 
@@ -22832,7 +22961,7 @@
                         <m:sSubPr>
                           <m:ctrlPr>
                             <a:rPr lang="en-US" sz="3200" i="1">
-                              <a:latin typeface="Cambria Math"/>
+                              <a:latin typeface="Cambria Math" panose="02040503050406030204" pitchFamily="18" charset="0"/>
                             </a:rPr>
                           </m:ctrlPr>
                         </m:sSubPr>
@@ -22857,7 +22986,7 @@
                         <m:sSubPr>
                           <m:ctrlPr>
                             <a:rPr lang="en-US" sz="3200" i="1">
-                              <a:latin typeface="Cambria Math"/>
+                              <a:latin typeface="Cambria Math" panose="02040503050406030204" pitchFamily="18" charset="0"/>
                             </a:rPr>
                           </m:ctrlPr>
                         </m:sSubPr>
@@ -22888,7 +23017,7 @@
                         <m:sSubPr>
                           <m:ctrlPr>
                             <a:rPr lang="en-US" sz="3200" i="1">
-                              <a:latin typeface="Cambria Math"/>
+                              <a:latin typeface="Cambria Math" panose="02040503050406030204" pitchFamily="18" charset="0"/>
                             </a:rPr>
                           </m:ctrlPr>
                         </m:sSubPr>
@@ -22913,7 +23042,7 @@
                         <m:sSubPr>
                           <m:ctrlPr>
                             <a:rPr lang="en-US" sz="3200" i="1">
-                              <a:latin typeface="Cambria Math"/>
+                              <a:latin typeface="Cambria Math" panose="02040503050406030204" pitchFamily="18" charset="0"/>
                             </a:rPr>
                           </m:ctrlPr>
                         </m:sSubPr>
@@ -23369,7 +23498,7 @@
                       <m:fPr>
                         <m:ctrlPr>
                           <a:rPr lang="en-US" sz="2200" i="1">
-                            <a:latin typeface="Cambria Math"/>
+                            <a:latin typeface="Cambria Math" panose="02040503050406030204" pitchFamily="18" charset="0"/>
                           </a:rPr>
                         </m:ctrlPr>
                       </m:fPr>
@@ -23389,7 +23518,7 @@
                           <m:sSubPr>
                             <m:ctrlPr>
                               <a:rPr lang="en-US" sz="2200" i="1">
-                                <a:latin typeface="Cambria Math"/>
+                                <a:latin typeface="Cambria Math" panose="02040503050406030204" pitchFamily="18" charset="0"/>
                               </a:rPr>
                             </m:ctrlPr>
                           </m:sSubPr>
@@ -23428,7 +23557,7 @@
                       <m:fPr>
                         <m:ctrlPr>
                           <a:rPr lang="en-US" sz="2200" b="0" i="1" smtClean="0">
-                            <a:latin typeface="Cambria Math"/>
+                            <a:latin typeface="Cambria Math" panose="02040503050406030204" pitchFamily="18" charset="0"/>
                           </a:rPr>
                         </m:ctrlPr>
                       </m:fPr>
@@ -23443,7 +23572,7 @@
                           <m:sSubPr>
                             <m:ctrlPr>
                               <a:rPr lang="en-US" sz="2200" b="0" i="1" smtClean="0">
-                                <a:latin typeface="Cambria Math"/>
+                                <a:latin typeface="Cambria Math" panose="02040503050406030204" pitchFamily="18" charset="0"/>
                               </a:rPr>
                             </m:ctrlPr>
                           </m:sSubPr>
@@ -23476,7 +23605,7 @@
                           <m:sSupPr>
                             <m:ctrlPr>
                               <a:rPr lang="en-US" sz="2200" b="0" i="1" smtClean="0">
-                                <a:latin typeface="Cambria Math"/>
+                                <a:latin typeface="Cambria Math" panose="02040503050406030204" pitchFamily="18" charset="0"/>
                               </a:rPr>
                             </m:ctrlPr>
                           </m:sSupPr>
@@ -23584,7 +23713,7 @@
                       <m:fPr>
                         <m:ctrlPr>
                           <a:rPr lang="en-US" sz="2200" i="1">
-                            <a:latin typeface="Cambria Math"/>
+                            <a:latin typeface="Cambria Math" panose="02040503050406030204" pitchFamily="18" charset="0"/>
                           </a:rPr>
                         </m:ctrlPr>
                       </m:fPr>
@@ -23604,7 +23733,7 @@
                           <m:sSubPr>
                             <m:ctrlPr>
                               <a:rPr lang="en-US" sz="2200" i="1">
-                                <a:latin typeface="Cambria Math"/>
+                                <a:latin typeface="Cambria Math" panose="02040503050406030204" pitchFamily="18" charset="0"/>
                               </a:rPr>
                             </m:ctrlPr>
                           </m:sSubPr>
@@ -23641,7 +23770,7 @@
                           <m:sSubPr>
                             <m:ctrlPr>
                               <a:rPr lang="en-US" sz="2200" b="0" i="1" smtClean="0">
-                                <a:latin typeface="Cambria Math"/>
+                                <a:latin typeface="Cambria Math" panose="02040503050406030204" pitchFamily="18" charset="0"/>
                               </a:rPr>
                             </m:ctrlPr>
                           </m:sSubPr>
@@ -23674,7 +23803,7 @@
                       <m:fPr>
                         <m:ctrlPr>
                           <a:rPr lang="en-US" sz="2200" b="0" i="1" smtClean="0">
-                            <a:latin typeface="Cambria Math"/>
+                            <a:latin typeface="Cambria Math" panose="02040503050406030204" pitchFamily="18" charset="0"/>
                           </a:rPr>
                         </m:ctrlPr>
                       </m:fPr>
@@ -23689,7 +23818,7 @@
                           <m:sSubPr>
                             <m:ctrlPr>
                               <a:rPr lang="en-US" sz="2200" b="0" i="1" smtClean="0">
-                                <a:latin typeface="Cambria Math"/>
+                                <a:latin typeface="Cambria Math" panose="02040503050406030204" pitchFamily="18" charset="0"/>
                               </a:rPr>
                             </m:ctrlPr>
                           </m:sSubPr>
@@ -23722,7 +23851,7 @@
                           <m:sSupPr>
                             <m:ctrlPr>
                               <a:rPr lang="en-US" sz="2200" b="0" i="1" smtClean="0">
-                                <a:latin typeface="Cambria Math"/>
+                                <a:latin typeface="Cambria Math" panose="02040503050406030204" pitchFamily="18" charset="0"/>
                               </a:rPr>
                             </m:ctrlPr>
                           </m:sSupPr>
@@ -23753,7 +23882,7 @@
                           <m:sSupPr>
                             <m:ctrlPr>
                               <a:rPr lang="en-US" sz="2200" b="0" i="1" smtClean="0">
-                                <a:latin typeface="Cambria Math"/>
+                                <a:latin typeface="Cambria Math" panose="02040503050406030204" pitchFamily="18" charset="0"/>
                               </a:rPr>
                             </m:ctrlPr>
                           </m:sSupPr>
@@ -23863,7 +23992,7 @@
                       <m:sSubPr>
                         <m:ctrlPr>
                           <a:rPr lang="en-US" sz="2200" i="1">
-                            <a:latin typeface="Cambria Math"/>
+                            <a:latin typeface="Cambria Math" panose="02040503050406030204" pitchFamily="18" charset="0"/>
                           </a:rPr>
                         </m:ctrlPr>
                       </m:sSubPr>
@@ -23900,7 +24029,7 @@
                       <m:sSubPr>
                         <m:ctrlPr>
                           <a:rPr lang="en-US" sz="2200" i="1">
-                            <a:latin typeface="Cambria Math"/>
+                            <a:latin typeface="Cambria Math" panose="02040503050406030204" pitchFamily="18" charset="0"/>
                           </a:rPr>
                         </m:ctrlPr>
                       </m:sSubPr>
@@ -24015,7 +24144,7 @@
                         <m:fPr>
                           <m:ctrlPr>
                             <a:rPr lang="en-US" sz="2200" b="0" i="1" smtClean="0">
-                              <a:latin typeface="Cambria Math"/>
+                              <a:latin typeface="Cambria Math" panose="02040503050406030204" pitchFamily="18" charset="0"/>
                             </a:rPr>
                           </m:ctrlPr>
                         </m:fPr>
@@ -24024,7 +24153,7 @@
                             <m:dPr>
                               <m:ctrlPr>
                                 <a:rPr lang="en-US" sz="2200" b="0" i="1" smtClean="0">
-                                  <a:latin typeface="Cambria Math"/>
+                                  <a:latin typeface="Cambria Math" panose="02040503050406030204" pitchFamily="18" charset="0"/>
                                 </a:rPr>
                               </m:ctrlPr>
                             </m:dPr>
@@ -24045,7 +24174,7 @@
                                 <m:sSupPr>
                                   <m:ctrlPr>
                                     <a:rPr lang="en-US" sz="2200" b="0" i="1" smtClean="0">
-                                      <a:latin typeface="Cambria Math"/>
+                                      <a:latin typeface="Cambria Math" panose="02040503050406030204" pitchFamily="18" charset="0"/>
                                     </a:rPr>
                                   </m:ctrlPr>
                                 </m:sSupPr>
@@ -24072,7 +24201,7 @@
                             <m:dPr>
                               <m:ctrlPr>
                                 <a:rPr lang="en-US" sz="2200" b="0" i="1" smtClean="0">
-                                  <a:latin typeface="Cambria Math"/>
+                                  <a:latin typeface="Cambria Math" panose="02040503050406030204" pitchFamily="18" charset="0"/>
                                 </a:rPr>
                               </m:ctrlPr>
                             </m:dPr>
@@ -24095,7 +24224,7 @@
                             <m:dPr>
                               <m:ctrlPr>
                                 <a:rPr lang="en-US" sz="2200" b="0" i="1" smtClean="0">
-                                  <a:latin typeface="Cambria Math"/>
+                                  <a:latin typeface="Cambria Math" panose="02040503050406030204" pitchFamily="18" charset="0"/>
                                 </a:rPr>
                               </m:ctrlPr>
                             </m:dPr>
@@ -24112,7 +24241,7 @@
                             <m:dPr>
                               <m:ctrlPr>
                                 <a:rPr lang="en-US" sz="2200" b="0" i="1" smtClean="0">
-                                  <a:latin typeface="Cambria Math"/>
+                                  <a:latin typeface="Cambria Math" panose="02040503050406030204" pitchFamily="18" charset="0"/>
                                 </a:rPr>
                               </m:ctrlPr>
                             </m:dPr>
@@ -24121,7 +24250,7 @@
                                 <m:fPr>
                                   <m:ctrlPr>
                                     <a:rPr lang="en-US" sz="2200" b="0" i="1" smtClean="0">
-                                      <a:latin typeface="Cambria Math"/>
+                                      <a:latin typeface="Cambria Math" panose="02040503050406030204" pitchFamily="18" charset="0"/>
                                     </a:rPr>
                                   </m:ctrlPr>
                                 </m:fPr>
@@ -24174,7 +24303,7 @@
                             <m:dPr>
                               <m:ctrlPr>
                                 <a:rPr lang="en-US" sz="2200" i="1">
-                                  <a:latin typeface="Cambria Math"/>
+                                  <a:latin typeface="Cambria Math" panose="02040503050406030204" pitchFamily="18" charset="0"/>
                                 </a:rPr>
                               </m:ctrlPr>
                             </m:dPr>
@@ -24189,7 +24318,7 @@
                                 <m:fPr>
                                   <m:ctrlPr>
                                     <a:rPr lang="en-US" sz="2200" i="1">
-                                      <a:latin typeface="Cambria Math"/>
+                                      <a:latin typeface="Cambria Math" panose="02040503050406030204" pitchFamily="18" charset="0"/>
                                     </a:rPr>
                                   </m:ctrlPr>
                                 </m:fPr>
@@ -24204,7 +24333,7 @@
                                     <m:sSupPr>
                                       <m:ctrlPr>
                                         <a:rPr lang="en-US" sz="2200" i="1">
-                                          <a:latin typeface="Cambria Math"/>
+                                          <a:latin typeface="Cambria Math" panose="02040503050406030204" pitchFamily="18" charset="0"/>
                                         </a:rPr>
                                       </m:ctrlPr>
                                     </m:sSupPr>
@@ -24237,7 +24366,7 @@
                                     <m:sSupPr>
                                       <m:ctrlPr>
                                         <a:rPr lang="en-US" sz="2200" i="1">
-                                          <a:latin typeface="Cambria Math"/>
+                                          <a:latin typeface="Cambria Math" panose="02040503050406030204" pitchFamily="18" charset="0"/>
                                         </a:rPr>
                                       </m:ctrlPr>
                                     </m:sSupPr>
@@ -24315,7 +24444,7 @@
                       <m:fPr>
                         <m:ctrlPr>
                           <a:rPr lang="en-US" sz="2200" b="1" i="1" smtClean="0">
-                            <a:latin typeface="Cambria Math"/>
+                            <a:latin typeface="Cambria Math" panose="02040503050406030204" pitchFamily="18" charset="0"/>
                           </a:rPr>
                         </m:ctrlPr>
                       </m:fPr>
@@ -24324,7 +24453,7 @@
                           <m:sSupPr>
                             <m:ctrlPr>
                               <a:rPr lang="en-US" sz="2200" b="1" i="1" smtClean="0">
-                                <a:latin typeface="Cambria Math"/>
+                                <a:latin typeface="Cambria Math" panose="02040503050406030204" pitchFamily="18" charset="0"/>
                               </a:rPr>
                             </m:ctrlPr>
                           </m:sSupPr>
@@ -27169,6 +27298,13 @@
   <p:clrMapOvr>
     <a:masterClrMapping/>
   </p:clrMapOvr>
+  <p:timing>
+    <p:tnLst>
+      <p:par>
+        <p:cTn id="1" dur="indefinite" restart="never" nodeType="tmRoot"/>
+      </p:par>
+    </p:tnLst>
+  </p:timing>
 </p:sld>
 </file>
 
@@ -29999,7 +30135,7 @@
   <a:extraClrSchemeLst/>
   <a:extLst>
     <a:ext uri="{05A4C25C-085E-4340-85A3-A5531E510DB2}">
-      <thm15:themeFamily xmlns:thm15="http://schemas.microsoft.com/office/thememl/2012/main" xmlns="" name="Circuit" id="{0AC2F7E7-15F5-431C-B2A2-456FE929F56C}" vid="{14971C58-AB76-4A2A-B231-5F8CA03CF491}"/>
+      <thm15:themeFamily xmlns:thm15="http://schemas.microsoft.com/office/thememl/2012/main" name="Circuit" id="{0AC2F7E7-15F5-431C-B2A2-456FE929F56C}" vid="{14971C58-AB76-4A2A-B231-5F8CA03CF491}"/>
     </a:ext>
   </a:extLst>
 </a:theme>

</xml_diff>